<commit_message>
Add error message for image not crossing boundary
</commit_message>
<xml_diff>
--- a/doc/test/CropToSlide.pptx
+++ b/doc/test/CropToSlide.pptx
@@ -7,37 +7,36 @@
     <p:sldMasterId id="2147483672" r:id="rId3"/>
   </p:sldMasterIdLst>
   <p:notesMasterIdLst>
-    <p:notesMasterId r:id="rId32"/>
+    <p:notesMasterId r:id="rId31"/>
   </p:notesMasterIdLst>
   <p:sldIdLst>
     <p:sldId id="287" r:id="rId4"/>
     <p:sldId id="256" r:id="rId5"/>
-    <p:sldId id="292" r:id="rId6"/>
-    <p:sldId id="293" r:id="rId7"/>
-    <p:sldId id="308" r:id="rId8"/>
-    <p:sldId id="296" r:id="rId9"/>
-    <p:sldId id="310" r:id="rId10"/>
-    <p:sldId id="311" r:id="rId11"/>
-    <p:sldId id="305" r:id="rId12"/>
-    <p:sldId id="312" r:id="rId13"/>
-    <p:sldId id="319" r:id="rId14"/>
-    <p:sldId id="317" r:id="rId15"/>
-    <p:sldId id="315" r:id="rId16"/>
-    <p:sldId id="342" r:id="rId17"/>
-    <p:sldId id="321" r:id="rId18"/>
-    <p:sldId id="323" r:id="rId19"/>
-    <p:sldId id="343" r:id="rId20"/>
-    <p:sldId id="325" r:id="rId21"/>
-    <p:sldId id="326" r:id="rId22"/>
-    <p:sldId id="340" r:id="rId23"/>
-    <p:sldId id="328" r:id="rId24"/>
-    <p:sldId id="329" r:id="rId25"/>
-    <p:sldId id="341" r:id="rId26"/>
-    <p:sldId id="331" r:id="rId27"/>
-    <p:sldId id="332" r:id="rId28"/>
-    <p:sldId id="333" r:id="rId29"/>
-    <p:sldId id="334" r:id="rId30"/>
-    <p:sldId id="318" r:id="rId31"/>
+    <p:sldId id="296" r:id="rId6"/>
+    <p:sldId id="310" r:id="rId7"/>
+    <p:sldId id="311" r:id="rId8"/>
+    <p:sldId id="305" r:id="rId9"/>
+    <p:sldId id="312" r:id="rId10"/>
+    <p:sldId id="319" r:id="rId11"/>
+    <p:sldId id="317" r:id="rId12"/>
+    <p:sldId id="315" r:id="rId13"/>
+    <p:sldId id="342" r:id="rId14"/>
+    <p:sldId id="321" r:id="rId15"/>
+    <p:sldId id="323" r:id="rId16"/>
+    <p:sldId id="343" r:id="rId17"/>
+    <p:sldId id="325" r:id="rId18"/>
+    <p:sldId id="326" r:id="rId19"/>
+    <p:sldId id="340" r:id="rId20"/>
+    <p:sldId id="328" r:id="rId21"/>
+    <p:sldId id="329" r:id="rId22"/>
+    <p:sldId id="341" r:id="rId23"/>
+    <p:sldId id="331" r:id="rId24"/>
+    <p:sldId id="332" r:id="rId25"/>
+    <p:sldId id="333" r:id="rId26"/>
+    <p:sldId id="334" r:id="rId27"/>
+    <p:sldId id="292" r:id="rId28"/>
+    <p:sldId id="293" r:id="rId29"/>
+    <p:sldId id="318" r:id="rId30"/>
   </p:sldIdLst>
   <p:sldSz cx="9144000" cy="6858000" type="screen4x3"/>
   <p:notesSz cx="6858000" cy="9144000"/>
@@ -147,9 +146,6 @@
         <p14:section name="AutoCrop" id="{A3A2B0AB-762C-4281-AA7B-EF7E134E0DC4}">
           <p14:sldIdLst>
             <p14:sldId id="256"/>
-            <p14:sldId id="292"/>
-            <p14:sldId id="293"/>
-            <p14:sldId id="308"/>
             <p14:sldId id="296"/>
             <p14:sldId id="310"/>
             <p14:sldId id="311"/>
@@ -172,6 +168,8 @@
             <p14:sldId id="332"/>
             <p14:sldId id="333"/>
             <p14:sldId id="334"/>
+            <p14:sldId id="292"/>
+            <p14:sldId id="293"/>
             <p14:sldId id="318"/>
           </p14:sldIdLst>
         </p14:section>
@@ -277,7 +275,7 @@
           <a:p>
             <a:fld id="{26004F41-C1A1-4B0D-9EEE-5E3F0E5BC108}" type="datetimeFigureOut">
               <a:rPr lang="en-SG" smtClean="0"/>
-              <a:t>1/21/2017</a:t>
+              <a:t>3/12/2017</a:t>
             </a:fld>
             <a:endParaRPr lang="en-SG"/>
           </a:p>
@@ -726,7 +724,7 @@
           <a:p>
             <a:fld id="{699DC775-C286-4358-8C92-D7E584E969B3}" type="datetimeFigureOut">
               <a:rPr lang="en-US" smtClean="0"/>
-              <a:t>1/21/2017</a:t>
+              <a:t>3/12/2017</a:t>
             </a:fld>
             <a:endParaRPr lang="en-US"/>
           </a:p>
@@ -896,7 +894,7 @@
           <a:p>
             <a:fld id="{699DC775-C286-4358-8C92-D7E584E969B3}" type="datetimeFigureOut">
               <a:rPr lang="en-US" smtClean="0"/>
-              <a:t>1/21/2017</a:t>
+              <a:t>3/12/2017</a:t>
             </a:fld>
             <a:endParaRPr lang="en-US"/>
           </a:p>
@@ -1076,7 +1074,7 @@
           <a:p>
             <a:fld id="{699DC775-C286-4358-8C92-D7E584E969B3}" type="datetimeFigureOut">
               <a:rPr lang="en-US" smtClean="0"/>
-              <a:t>1/21/2017</a:t>
+              <a:t>3/12/2017</a:t>
             </a:fld>
             <a:endParaRPr lang="en-US"/>
           </a:p>
@@ -1318,7 +1316,7 @@
           <a:p>
             <a:fld id="{699DC775-C286-4358-8C92-D7E584E969B3}" type="datetimeFigureOut">
               <a:rPr lang="en-US" smtClean="0"/>
-              <a:t>1/21/2017</a:t>
+              <a:t>3/12/2017</a:t>
             </a:fld>
             <a:endParaRPr lang="en-US"/>
           </a:p>
@@ -1488,7 +1486,7 @@
           <a:p>
             <a:fld id="{699DC775-C286-4358-8C92-D7E584E969B3}" type="datetimeFigureOut">
               <a:rPr lang="en-US" smtClean="0"/>
-              <a:t>1/21/2017</a:t>
+              <a:t>3/12/2017</a:t>
             </a:fld>
             <a:endParaRPr lang="en-US"/>
           </a:p>
@@ -1734,7 +1732,7 @@
           <a:p>
             <a:fld id="{699DC775-C286-4358-8C92-D7E584E969B3}" type="datetimeFigureOut">
               <a:rPr lang="en-US" smtClean="0"/>
-              <a:t>1/21/2017</a:t>
+              <a:t>3/12/2017</a:t>
             </a:fld>
             <a:endParaRPr lang="en-US"/>
           </a:p>
@@ -2022,7 +2020,7 @@
           <a:p>
             <a:fld id="{699DC775-C286-4358-8C92-D7E584E969B3}" type="datetimeFigureOut">
               <a:rPr lang="en-US" smtClean="0"/>
-              <a:t>1/21/2017</a:t>
+              <a:t>3/12/2017</a:t>
             </a:fld>
             <a:endParaRPr lang="en-US"/>
           </a:p>
@@ -2444,7 +2442,7 @@
           <a:p>
             <a:fld id="{699DC775-C286-4358-8C92-D7E584E969B3}" type="datetimeFigureOut">
               <a:rPr lang="en-US" smtClean="0"/>
-              <a:t>1/21/2017</a:t>
+              <a:t>3/12/2017</a:t>
             </a:fld>
             <a:endParaRPr lang="en-US"/>
           </a:p>
@@ -2562,7 +2560,7 @@
           <a:p>
             <a:fld id="{699DC775-C286-4358-8C92-D7E584E969B3}" type="datetimeFigureOut">
               <a:rPr lang="en-US" smtClean="0"/>
-              <a:t>1/21/2017</a:t>
+              <a:t>3/12/2017</a:t>
             </a:fld>
             <a:endParaRPr lang="en-US"/>
           </a:p>
@@ -2657,7 +2655,7 @@
           <a:p>
             <a:fld id="{699DC775-C286-4358-8C92-D7E584E969B3}" type="datetimeFigureOut">
               <a:rPr lang="en-US" smtClean="0"/>
-              <a:t>1/21/2017</a:t>
+              <a:t>3/12/2017</a:t>
             </a:fld>
             <a:endParaRPr lang="en-US"/>
           </a:p>
@@ -2934,7 +2932,7 @@
           <a:p>
             <a:fld id="{699DC775-C286-4358-8C92-D7E584E969B3}" type="datetimeFigureOut">
               <a:rPr lang="en-US" smtClean="0"/>
-              <a:t>1/21/2017</a:t>
+              <a:t>3/12/2017</a:t>
             </a:fld>
             <a:endParaRPr lang="en-US"/>
           </a:p>
@@ -3104,7 +3102,7 @@
           <a:p>
             <a:fld id="{699DC775-C286-4358-8C92-D7E584E969B3}" type="datetimeFigureOut">
               <a:rPr lang="en-US" smtClean="0"/>
-              <a:t>1/21/2017</a:t>
+              <a:t>3/12/2017</a:t>
             </a:fld>
             <a:endParaRPr lang="en-US"/>
           </a:p>
@@ -3357,7 +3355,7 @@
           <a:p>
             <a:fld id="{699DC775-C286-4358-8C92-D7E584E969B3}" type="datetimeFigureOut">
               <a:rPr lang="en-US" smtClean="0"/>
-              <a:t>1/21/2017</a:t>
+              <a:t>3/12/2017</a:t>
             </a:fld>
             <a:endParaRPr lang="en-US"/>
           </a:p>
@@ -3527,7 +3525,7 @@
           <a:p>
             <a:fld id="{699DC775-C286-4358-8C92-D7E584E969B3}" type="datetimeFigureOut">
               <a:rPr lang="en-US" smtClean="0"/>
-              <a:t>1/21/2017</a:t>
+              <a:t>3/12/2017</a:t>
             </a:fld>
             <a:endParaRPr lang="en-US"/>
           </a:p>
@@ -3707,7 +3705,7 @@
           <a:p>
             <a:fld id="{699DC775-C286-4358-8C92-D7E584E969B3}" type="datetimeFigureOut">
               <a:rPr lang="en-US" smtClean="0"/>
-              <a:t>1/21/2017</a:t>
+              <a:t>3/12/2017</a:t>
             </a:fld>
             <a:endParaRPr lang="en-US"/>
           </a:p>
@@ -3957,7 +3955,7 @@
           <a:p>
             <a:fld id="{699DC775-C286-4358-8C92-D7E584E969B3}" type="datetimeFigureOut">
               <a:rPr lang="en-US" smtClean="0"/>
-              <a:t>1/21/2017</a:t>
+              <a:t>3/12/2017</a:t>
             </a:fld>
             <a:endParaRPr lang="en-US"/>
           </a:p>
@@ -4135,7 +4133,7 @@
           <a:p>
             <a:fld id="{699DC775-C286-4358-8C92-D7E584E969B3}" type="datetimeFigureOut">
               <a:rPr lang="en-US" smtClean="0"/>
-              <a:t>1/21/2017</a:t>
+              <a:t>3/12/2017</a:t>
             </a:fld>
             <a:endParaRPr lang="en-US"/>
           </a:p>
@@ -4389,7 +4387,7 @@
           <a:p>
             <a:fld id="{699DC775-C286-4358-8C92-D7E584E969B3}" type="datetimeFigureOut">
               <a:rPr lang="en-US" smtClean="0"/>
-              <a:t>1/21/2017</a:t>
+              <a:t>3/12/2017</a:t>
             </a:fld>
             <a:endParaRPr lang="en-US"/>
           </a:p>
@@ -4685,7 +4683,7 @@
           <a:p>
             <a:fld id="{699DC775-C286-4358-8C92-D7E584E969B3}" type="datetimeFigureOut">
               <a:rPr lang="en-US" smtClean="0"/>
-              <a:t>1/21/2017</a:t>
+              <a:t>3/12/2017</a:t>
             </a:fld>
             <a:endParaRPr lang="en-US"/>
           </a:p>
@@ -5115,7 +5113,7 @@
           <a:p>
             <a:fld id="{699DC775-C286-4358-8C92-D7E584E969B3}" type="datetimeFigureOut">
               <a:rPr lang="en-US" smtClean="0"/>
-              <a:t>1/21/2017</a:t>
+              <a:t>3/12/2017</a:t>
             </a:fld>
             <a:endParaRPr lang="en-US"/>
           </a:p>
@@ -5241,7 +5239,7 @@
           <a:p>
             <a:fld id="{699DC775-C286-4358-8C92-D7E584E969B3}" type="datetimeFigureOut">
               <a:rPr lang="en-US" smtClean="0"/>
-              <a:t>1/21/2017</a:t>
+              <a:t>3/12/2017</a:t>
             </a:fld>
             <a:endParaRPr lang="en-US"/>
           </a:p>
@@ -5344,7 +5342,7 @@
           <a:p>
             <a:fld id="{699DC775-C286-4358-8C92-D7E584E969B3}" type="datetimeFigureOut">
               <a:rPr lang="en-US" smtClean="0"/>
-              <a:t>1/21/2017</a:t>
+              <a:t>3/12/2017</a:t>
             </a:fld>
             <a:endParaRPr lang="en-US"/>
           </a:p>
@@ -5590,7 +5588,7 @@
           <a:p>
             <a:fld id="{699DC775-C286-4358-8C92-D7E584E969B3}" type="datetimeFigureOut">
               <a:rPr lang="en-US" smtClean="0"/>
-              <a:t>1/21/2017</a:t>
+              <a:t>3/12/2017</a:t>
             </a:fld>
             <a:endParaRPr lang="en-US"/>
           </a:p>
@@ -5875,7 +5873,7 @@
           <a:p>
             <a:fld id="{699DC775-C286-4358-8C92-D7E584E969B3}" type="datetimeFigureOut">
               <a:rPr lang="en-US" smtClean="0"/>
-              <a:t>1/21/2017</a:t>
+              <a:t>3/12/2017</a:t>
             </a:fld>
             <a:endParaRPr lang="en-US"/>
           </a:p>
@@ -6136,7 +6134,7 @@
           <a:p>
             <a:fld id="{699DC775-C286-4358-8C92-D7E584E969B3}" type="datetimeFigureOut">
               <a:rPr lang="en-US" smtClean="0"/>
-              <a:t>1/21/2017</a:t>
+              <a:t>3/12/2017</a:t>
             </a:fld>
             <a:endParaRPr lang="en-US"/>
           </a:p>
@@ -6314,7 +6312,7 @@
           <a:p>
             <a:fld id="{699DC775-C286-4358-8C92-D7E584E969B3}" type="datetimeFigureOut">
               <a:rPr lang="en-US" smtClean="0"/>
-              <a:t>1/21/2017</a:t>
+              <a:t>3/12/2017</a:t>
             </a:fld>
             <a:endParaRPr lang="en-US"/>
           </a:p>
@@ -6502,7 +6500,7 @@
           <a:p>
             <a:fld id="{699DC775-C286-4358-8C92-D7E584E969B3}" type="datetimeFigureOut">
               <a:rPr lang="en-US" smtClean="0"/>
-              <a:t>1/21/2017</a:t>
+              <a:t>3/12/2017</a:t>
             </a:fld>
             <a:endParaRPr lang="en-US"/>
           </a:p>
@@ -6790,7 +6788,7 @@
           <a:p>
             <a:fld id="{699DC775-C286-4358-8C92-D7E584E969B3}" type="datetimeFigureOut">
               <a:rPr lang="en-US" smtClean="0"/>
-              <a:t>1/21/2017</a:t>
+              <a:t>3/12/2017</a:t>
             </a:fld>
             <a:endParaRPr lang="en-US"/>
           </a:p>
@@ -7212,7 +7210,7 @@
           <a:p>
             <a:fld id="{699DC775-C286-4358-8C92-D7E584E969B3}" type="datetimeFigureOut">
               <a:rPr lang="en-US" smtClean="0"/>
-              <a:t>1/21/2017</a:t>
+              <a:t>3/12/2017</a:t>
             </a:fld>
             <a:endParaRPr lang="en-US"/>
           </a:p>
@@ -7330,7 +7328,7 @@
           <a:p>
             <a:fld id="{699DC775-C286-4358-8C92-D7E584E969B3}" type="datetimeFigureOut">
               <a:rPr lang="en-US" smtClean="0"/>
-              <a:t>1/21/2017</a:t>
+              <a:t>3/12/2017</a:t>
             </a:fld>
             <a:endParaRPr lang="en-US"/>
           </a:p>
@@ -7425,7 +7423,7 @@
           <a:p>
             <a:fld id="{699DC775-C286-4358-8C92-D7E584E969B3}" type="datetimeFigureOut">
               <a:rPr lang="en-US" smtClean="0"/>
-              <a:t>1/21/2017</a:t>
+              <a:t>3/12/2017</a:t>
             </a:fld>
             <a:endParaRPr lang="en-US"/>
           </a:p>
@@ -7702,7 +7700,7 @@
           <a:p>
             <a:fld id="{699DC775-C286-4358-8C92-D7E584E969B3}" type="datetimeFigureOut">
               <a:rPr lang="en-US" smtClean="0"/>
-              <a:t>1/21/2017</a:t>
+              <a:t>3/12/2017</a:t>
             </a:fld>
             <a:endParaRPr lang="en-US"/>
           </a:p>
@@ -7955,7 +7953,7 @@
           <a:p>
             <a:fld id="{699DC775-C286-4358-8C92-D7E584E969B3}" type="datetimeFigureOut">
               <a:rPr lang="en-US" smtClean="0"/>
-              <a:t>1/21/2017</a:t>
+              <a:t>3/12/2017</a:t>
             </a:fld>
             <a:endParaRPr lang="en-US"/>
           </a:p>
@@ -8168,7 +8166,7 @@
           <a:p>
             <a:fld id="{699DC775-C286-4358-8C92-D7E584E969B3}" type="datetimeFigureOut">
               <a:rPr lang="en-US" smtClean="0"/>
-              <a:t>1/21/2017</a:t>
+              <a:t>3/12/2017</a:t>
             </a:fld>
             <a:endParaRPr lang="en-US"/>
           </a:p>
@@ -8683,7 +8681,7 @@
           <a:p>
             <a:fld id="{699DC775-C286-4358-8C92-D7E584E969B3}" type="datetimeFigureOut">
               <a:rPr lang="en-US" smtClean="0"/>
-              <a:t>1/21/2017</a:t>
+              <a:t>3/12/2017</a:t>
             </a:fld>
             <a:endParaRPr lang="en-US"/>
           </a:p>
@@ -9196,7 +9194,7 @@
           <a:p>
             <a:fld id="{699DC775-C286-4358-8C92-D7E584E969B3}" type="datetimeFigureOut">
               <a:rPr lang="en-US" smtClean="0"/>
-              <a:t>1/21/2017</a:t>
+              <a:t>3/12/2017</a:t>
             </a:fld>
             <a:endParaRPr lang="en-US"/>
           </a:p>
@@ -9770,227 +9768,6 @@
       </p:grpSpPr>
       <p:pic>
         <p:nvPicPr>
-          <p:cNvPr id="5" name="selectMe"/>
-          <p:cNvPicPr>
-            <a:picLocks noChangeAspect="1"/>
-          </p:cNvPicPr>
-          <p:nvPr/>
-        </p:nvPicPr>
-        <p:blipFill>
-          <a:blip r:embed="rId2">
-            <a:extLst>
-              <a:ext uri="{28A0092B-C50C-407E-A947-70E740481C1C}">
-                <a14:useLocalDpi xmlns:a14="http://schemas.microsoft.com/office/drawing/2010/main" val="0"/>
-              </a:ext>
-            </a:extLst>
-          </a:blip>
-          <a:stretch>
-            <a:fillRect/>
-          </a:stretch>
-        </p:blipFill>
-        <p:spPr>
-          <a:xfrm>
-            <a:off x="-1676400" y="-2819400"/>
-            <a:ext cx="12420600" cy="8308702"/>
-          </a:xfrm>
-          <a:prstGeom prst="rect">
-            <a:avLst/>
-          </a:prstGeom>
-        </p:spPr>
-      </p:pic>
-    </p:spTree>
-    <p:extLst>
-      <p:ext uri="{BB962C8B-B14F-4D97-AF65-F5344CB8AC3E}">
-        <p14:creationId xmlns:p14="http://schemas.microsoft.com/office/powerpoint/2010/main" val="2566138312"/>
-      </p:ext>
-    </p:extLst>
-  </p:cSld>
-  <p:clrMapOvr>
-    <a:masterClrMapping/>
-  </p:clrMapOvr>
-</p:sld>
-</file>
-
-<file path=ppt/slides/slide11.xml><?xml version="1.0" encoding="utf-8"?>
-<p:sld xmlns:a="http://schemas.openxmlformats.org/drawingml/2006/main" xmlns:r="http://schemas.openxmlformats.org/officeDocument/2006/relationships" xmlns:p="http://schemas.openxmlformats.org/presentationml/2006/main">
-  <p:cSld>
-    <p:spTree>
-      <p:nvGrpSpPr>
-        <p:cNvPr id="1" name=""/>
-        <p:cNvGrpSpPr/>
-        <p:nvPr/>
-      </p:nvGrpSpPr>
-      <p:grpSpPr>
-        <a:xfrm>
-          <a:off x="0" y="0"/>
-          <a:ext cx="0" cy="0"/>
-          <a:chOff x="0" y="0"/>
-          <a:chExt cx="0" cy="0"/>
-        </a:xfrm>
-      </p:grpSpPr>
-      <p:pic>
-        <p:nvPicPr>
-          <p:cNvPr id="5" name="selectMe"/>
-          <p:cNvPicPr>
-            <a:picLocks noChangeAspect="1"/>
-          </p:cNvPicPr>
-          <p:nvPr/>
-        </p:nvPicPr>
-        <p:blipFill rotWithShape="1">
-          <a:blip r:embed="rId2">
-            <a:extLst>
-              <a:ext uri="{28A0092B-C50C-407E-A947-70E740481C1C}">
-                <a14:useLocalDpi xmlns:a14="http://schemas.microsoft.com/office/drawing/2010/main" val="0"/>
-              </a:ext>
-            </a:extLst>
-          </a:blip>
-          <a:srcRect l="13497" t="33933" r="12884"/>
-          <a:stretch/>
-        </p:blipFill>
-        <p:spPr>
-          <a:xfrm>
-            <a:off x="0" y="0"/>
-            <a:ext cx="9144000" cy="5489302"/>
-          </a:xfrm>
-          <a:prstGeom prst="rect">
-            <a:avLst/>
-          </a:prstGeom>
-        </p:spPr>
-      </p:pic>
-      <p:sp>
-        <p:nvSpPr>
-          <p:cNvPr id="3" name="text"/>
-          <p:cNvSpPr txBox="1"/>
-          <p:nvPr/>
-        </p:nvSpPr>
-        <p:spPr>
-          <a:xfrm>
-            <a:off x="8101022" y="0"/>
-            <a:ext cx="1042978" cy="369332"/>
-          </a:xfrm>
-          <a:prstGeom prst="rect">
-            <a:avLst/>
-          </a:prstGeom>
-          <a:noFill/>
-        </p:spPr>
-        <p:txBody>
-          <a:bodyPr wrap="none" rtlCol="0">
-            <a:spAutoFit/>
-          </a:bodyPr>
-          <a:lstStyle/>
-          <a:p>
-            <a:r>
-              <a:rPr lang="en-SG" dirty="0" smtClean="0"/>
-              <a:t>Expected</a:t>
-            </a:r>
-            <a:endParaRPr lang="en-SG" dirty="0"/>
-          </a:p>
-        </p:txBody>
-      </p:sp>
-    </p:spTree>
-    <p:extLst>
-      <p:ext uri="{BB962C8B-B14F-4D97-AF65-F5344CB8AC3E}">
-        <p14:creationId xmlns:p14="http://schemas.microsoft.com/office/powerpoint/2010/main" val="2188246822"/>
-      </p:ext>
-    </p:extLst>
-  </p:cSld>
-  <p:clrMapOvr>
-    <a:masterClrMapping/>
-  </p:clrMapOvr>
-</p:sld>
-</file>
-
-<file path=ppt/slides/slide12.xml><?xml version="1.0" encoding="utf-8"?>
-<p:sld xmlns:a="http://schemas.openxmlformats.org/drawingml/2006/main" xmlns:r="http://schemas.openxmlformats.org/officeDocument/2006/relationships" xmlns:p="http://schemas.openxmlformats.org/presentationml/2006/main">
-  <p:cSld>
-    <p:spTree>
-      <p:nvGrpSpPr>
-        <p:cNvPr id="1" name=""/>
-        <p:cNvGrpSpPr/>
-        <p:nvPr/>
-      </p:nvGrpSpPr>
-      <p:grpSpPr>
-        <a:xfrm>
-          <a:off x="0" y="0"/>
-          <a:ext cx="0" cy="0"/>
-          <a:chOff x="0" y="0"/>
-          <a:chExt cx="0" cy="0"/>
-        </a:xfrm>
-      </p:grpSpPr>
-      <p:sp>
-        <p:nvSpPr>
-          <p:cNvPr id="2" name="Title 1"/>
-          <p:cNvSpPr>
-            <a:spLocks noGrp="1"/>
-          </p:cNvSpPr>
-          <p:nvPr>
-            <p:ph type="title"/>
-          </p:nvPr>
-        </p:nvSpPr>
-        <p:spPr/>
-        <p:txBody>
-          <a:bodyPr/>
-          <a:lstStyle/>
-          <a:p>
-            <a:r>
-              <a:rPr lang="en-US" dirty="0" smtClean="0"/>
-              <a:t>Auto Crop:: rotated picture crosses one edge</a:t>
-            </a:r>
-            <a:endParaRPr lang="en-SG" dirty="0"/>
-          </a:p>
-        </p:txBody>
-      </p:sp>
-      <p:sp>
-        <p:nvSpPr>
-          <p:cNvPr id="3" name="Content Placeholder 2"/>
-          <p:cNvSpPr>
-            <a:spLocks noGrp="1"/>
-          </p:cNvSpPr>
-          <p:nvPr>
-            <p:ph idx="1"/>
-          </p:nvPr>
-        </p:nvSpPr>
-        <p:spPr/>
-        <p:txBody>
-          <a:bodyPr/>
-          <a:lstStyle/>
-          <a:p>
-            <a:endParaRPr lang="en-SG" dirty="0"/>
-          </a:p>
-        </p:txBody>
-      </p:sp>
-    </p:spTree>
-    <p:extLst>
-      <p:ext uri="{BB962C8B-B14F-4D97-AF65-F5344CB8AC3E}">
-        <p14:creationId xmlns:p14="http://schemas.microsoft.com/office/powerpoint/2010/main" val="3585701570"/>
-      </p:ext>
-    </p:extLst>
-  </p:cSld>
-  <p:clrMapOvr>
-    <a:masterClrMapping/>
-  </p:clrMapOvr>
-</p:sld>
-</file>
-
-<file path=ppt/slides/slide13.xml><?xml version="1.0" encoding="utf-8"?>
-<p:sld xmlns:a="http://schemas.openxmlformats.org/drawingml/2006/main" xmlns:r="http://schemas.openxmlformats.org/officeDocument/2006/relationships" xmlns:p="http://schemas.openxmlformats.org/presentationml/2006/main">
-  <p:cSld>
-    <p:spTree>
-      <p:nvGrpSpPr>
-        <p:cNvPr id="1" name=""/>
-        <p:cNvGrpSpPr/>
-        <p:nvPr/>
-      </p:nvGrpSpPr>
-      <p:grpSpPr>
-        <a:xfrm>
-          <a:off x="0" y="0"/>
-          <a:ext cx="0" cy="0"/>
-          <a:chOff x="0" y="0"/>
-          <a:chExt cx="0" cy="0"/>
-        </a:xfrm>
-      </p:grpSpPr>
-      <p:pic>
-        <p:nvPicPr>
           <p:cNvPr id="3" name="selectMe"/>
           <p:cNvPicPr>
             <a:picLocks noChangeAspect="1"/>
@@ -10032,7 +9809,7 @@
 </p:sld>
 </file>
 
-<file path=ppt/slides/slide14.xml><?xml version="1.0" encoding="utf-8"?>
+<file path=ppt/slides/slide11.xml><?xml version="1.0" encoding="utf-8"?>
 <p:sld xmlns:a="http://schemas.openxmlformats.org/drawingml/2006/main" xmlns:r="http://schemas.openxmlformats.org/officeDocument/2006/relationships" xmlns:p="http://schemas.openxmlformats.org/presentationml/2006/main">
   <p:cSld>
     <p:spTree>
@@ -10121,7 +9898,7 @@
 </p:sld>
 </file>
 
-<file path=ppt/slides/slide15.xml><?xml version="1.0" encoding="utf-8"?>
+<file path=ppt/slides/slide12.xml><?xml version="1.0" encoding="utf-8"?>
 <p:sld xmlns:a="http://schemas.openxmlformats.org/drawingml/2006/main" xmlns:r="http://schemas.openxmlformats.org/officeDocument/2006/relationships" xmlns:p="http://schemas.openxmlformats.org/presentationml/2006/main">
   <p:cSld>
     <p:spTree>
@@ -10193,7 +9970,7 @@
 </p:sld>
 </file>
 
-<file path=ppt/slides/slide16.xml><?xml version="1.0" encoding="utf-8"?>
+<file path=ppt/slides/slide13.xml><?xml version="1.0" encoding="utf-8"?>
 <p:sld xmlns:a="http://schemas.openxmlformats.org/drawingml/2006/main" xmlns:r="http://schemas.openxmlformats.org/officeDocument/2006/relationships" xmlns:p="http://schemas.openxmlformats.org/presentationml/2006/main">
   <p:cSld>
     <p:spTree>
@@ -10253,7 +10030,7 @@
 </p:sld>
 </file>
 
-<file path=ppt/slides/slide17.xml><?xml version="1.0" encoding="utf-8"?>
+<file path=ppt/slides/slide14.xml><?xml version="1.0" encoding="utf-8"?>
 <p:sld xmlns:a="http://schemas.openxmlformats.org/drawingml/2006/main" xmlns:r="http://schemas.openxmlformats.org/officeDocument/2006/relationships" xmlns:p="http://schemas.openxmlformats.org/presentationml/2006/main">
   <p:cSld>
     <p:spTree>
@@ -10342,7 +10119,7 @@
 </p:sld>
 </file>
 
-<file path=ppt/slides/slide18.xml><?xml version="1.0" encoding="utf-8"?>
+<file path=ppt/slides/slide15.xml><?xml version="1.0" encoding="utf-8"?>
 <p:sld xmlns:a="http://schemas.openxmlformats.org/drawingml/2006/main" xmlns:r="http://schemas.openxmlformats.org/officeDocument/2006/relationships" xmlns:p="http://schemas.openxmlformats.org/presentationml/2006/main">
   <p:cSld>
     <p:spTree>
@@ -10414,7 +10191,7 @@
 </p:sld>
 </file>
 
-<file path=ppt/slides/slide19.xml><?xml version="1.0" encoding="utf-8"?>
+<file path=ppt/slides/slide16.xml><?xml version="1.0" encoding="utf-8"?>
 <p:sld xmlns:a="http://schemas.openxmlformats.org/drawingml/2006/main" xmlns:r="http://schemas.openxmlformats.org/officeDocument/2006/relationships" xmlns:p="http://schemas.openxmlformats.org/presentationml/2006/main">
   <p:cSld>
     <p:spTree>
@@ -10564,184 +10341,7 @@
 </p:sld>
 </file>
 
-<file path=ppt/slides/slide2.xml><?xml version="1.0" encoding="utf-8"?>
-<p:sld xmlns:a="http://schemas.openxmlformats.org/drawingml/2006/main" xmlns:r="http://schemas.openxmlformats.org/officeDocument/2006/relationships" xmlns:p="http://schemas.openxmlformats.org/presentationml/2006/main">
-  <p:cSld>
-    <p:bg>
-      <p:bgPr>
-        <a:solidFill>
-          <a:schemeClr val="accent6">
-            <a:lumMod val="75000"/>
-          </a:schemeClr>
-        </a:solidFill>
-        <a:effectLst/>
-      </p:bgPr>
-    </p:bg>
-    <p:spTree>
-      <p:nvGrpSpPr>
-        <p:cNvPr id="1" name=""/>
-        <p:cNvGrpSpPr/>
-        <p:nvPr/>
-      </p:nvGrpSpPr>
-      <p:grpSpPr>
-        <a:xfrm>
-          <a:off x="0" y="0"/>
-          <a:ext cx="0" cy="0"/>
-          <a:chOff x="0" y="0"/>
-          <a:chExt cx="0" cy="0"/>
-        </a:xfrm>
-      </p:grpSpPr>
-      <p:sp>
-        <p:nvSpPr>
-          <p:cNvPr id="2" name="Title 1"/>
-          <p:cNvSpPr>
-            <a:spLocks noGrp="1"/>
-          </p:cNvSpPr>
-          <p:nvPr>
-            <p:ph type="title"/>
-          </p:nvPr>
-        </p:nvSpPr>
-        <p:spPr>
-          <a:xfrm>
-            <a:off x="381000" y="609600"/>
-            <a:ext cx="8229600" cy="1143000"/>
-          </a:xfrm>
-        </p:spPr>
-        <p:txBody>
-          <a:bodyPr>
-            <a:noAutofit/>
-          </a:bodyPr>
-          <a:lstStyle/>
-          <a:p>
-            <a:pPr algn="l"/>
-            <a:r>
-              <a:rPr lang="en-US" sz="7200" dirty="0" smtClean="0">
-                <a:solidFill>
-                  <a:schemeClr val="bg1"/>
-                </a:solidFill>
-              </a:rPr>
-              <a:t>Crop To Slide</a:t>
-            </a:r>
-            <a:endParaRPr lang="en-SG" sz="7200" dirty="0">
-              <a:solidFill>
-                <a:schemeClr val="bg1"/>
-              </a:solidFill>
-            </a:endParaRPr>
-          </a:p>
-        </p:txBody>
-      </p:sp>
-      <p:sp>
-        <p:nvSpPr>
-          <p:cNvPr id="3" name="text 5"/>
-          <p:cNvSpPr txBox="1"/>
-          <p:nvPr/>
-        </p:nvSpPr>
-        <p:spPr>
-          <a:xfrm>
-            <a:off x="542636" y="2819400"/>
-            <a:ext cx="7620000" cy="1938992"/>
-          </a:xfrm>
-          <a:prstGeom prst="rect">
-            <a:avLst/>
-          </a:prstGeom>
-          <a:noFill/>
-        </p:spPr>
-        <p:txBody>
-          <a:bodyPr wrap="square" rtlCol="0">
-            <a:spAutoFit/>
-          </a:bodyPr>
-          <a:lstStyle/>
-          <a:p>
-            <a:r>
-              <a:rPr lang="en-US" sz="2400" b="1" dirty="0" smtClean="0">
-                <a:solidFill>
-                  <a:schemeClr val="bg1"/>
-                </a:solidFill>
-              </a:rPr>
-              <a:t>Additional instructions:</a:t>
-            </a:r>
-          </a:p>
-          <a:p>
-            <a:pPr marL="285750" indent="-285750">
-              <a:buFont typeface="Arial" panose="020B0604020202020204" pitchFamily="34" charset="0"/>
-              <a:buChar char="•"/>
-            </a:pPr>
-            <a:r>
-              <a:rPr lang="en-US" sz="2400" dirty="0" smtClean="0">
-                <a:solidFill>
-                  <a:schemeClr val="bg1"/>
-                </a:solidFill>
-              </a:rPr>
-              <a:t>Select the picture(s).</a:t>
-            </a:r>
-          </a:p>
-          <a:p>
-            <a:pPr marL="285750" indent="-285750">
-              <a:buFont typeface="Arial" panose="020B0604020202020204" pitchFamily="34" charset="0"/>
-              <a:buChar char="•"/>
-            </a:pPr>
-            <a:r>
-              <a:rPr lang="en-US" sz="2400" dirty="0" smtClean="0">
-                <a:solidFill>
-                  <a:schemeClr val="bg1"/>
-                </a:solidFill>
-              </a:rPr>
-              <a:t>Click it and then select </a:t>
-            </a:r>
-            <a:r>
-              <a:rPr lang="en-US" sz="2400" b="1" dirty="0" smtClean="0">
-                <a:solidFill>
-                  <a:schemeClr val="bg1"/>
-                </a:solidFill>
-              </a:rPr>
-              <a:t>“Crop to Slide” </a:t>
-            </a:r>
-            <a:r>
-              <a:rPr lang="en-US" sz="2400" dirty="0" smtClean="0">
-                <a:solidFill>
-                  <a:schemeClr val="bg1"/>
-                </a:solidFill>
-              </a:rPr>
-              <a:t>in the context menu. </a:t>
-            </a:r>
-          </a:p>
-          <a:p>
-            <a:pPr marL="285750" indent="-285750">
-              <a:buFont typeface="Arial" panose="020B0604020202020204" pitchFamily="34" charset="0"/>
-              <a:buChar char="•"/>
-            </a:pPr>
-            <a:r>
-              <a:rPr lang="en-US" sz="2400" dirty="0" smtClean="0">
-                <a:solidFill>
-                  <a:schemeClr val="bg1"/>
-                </a:solidFill>
-              </a:rPr>
-              <a:t>Compare the result with the expected output.</a:t>
-            </a:r>
-          </a:p>
-        </p:txBody>
-      </p:sp>
-    </p:spTree>
-    <p:extLst>
-      <p:ext uri="{BB962C8B-B14F-4D97-AF65-F5344CB8AC3E}">
-        <p14:creationId xmlns:p14="http://schemas.microsoft.com/office/powerpoint/2010/main" val="1569131388"/>
-      </p:ext>
-    </p:extLst>
-  </p:cSld>
-  <p:clrMapOvr>
-    <a:masterClrMapping/>
-  </p:clrMapOvr>
-  <p:timing>
-    <p:tnLst>
-      <p:par>
-        <p:cTn id="1" dur="indefinite" restart="never" nodeType="tmRoot"/>
-      </p:par>
-    </p:tnLst>
-  </p:timing>
-</p:sld>
-</file>
-
-<file path=ppt/slides/slide20.xml><?xml version="1.0" encoding="utf-8"?>
+<file path=ppt/slides/slide17.xml><?xml version="1.0" encoding="utf-8"?>
 <p:sld xmlns:a="http://schemas.openxmlformats.org/drawingml/2006/main" xmlns:r="http://schemas.openxmlformats.org/officeDocument/2006/relationships" xmlns:p="http://schemas.openxmlformats.org/presentationml/2006/main">
   <p:cSld>
     <p:spTree>
@@ -10917,7 +10517,7 @@
 </p:sld>
 </file>
 
-<file path=ppt/slides/slide21.xml><?xml version="1.0" encoding="utf-8"?>
+<file path=ppt/slides/slide18.xml><?xml version="1.0" encoding="utf-8"?>
 <p:sld xmlns:a="http://schemas.openxmlformats.org/drawingml/2006/main" xmlns:r="http://schemas.openxmlformats.org/officeDocument/2006/relationships" xmlns:p="http://schemas.openxmlformats.org/presentationml/2006/main">
   <p:cSld>
     <p:spTree>
@@ -10989,7 +10589,7 @@
 </p:sld>
 </file>
 
-<file path=ppt/slides/slide22.xml><?xml version="1.0" encoding="utf-8"?>
+<file path=ppt/slides/slide19.xml><?xml version="1.0" encoding="utf-8"?>
 <p:sld xmlns:a="http://schemas.openxmlformats.org/drawingml/2006/main" xmlns:r="http://schemas.openxmlformats.org/officeDocument/2006/relationships" xmlns:p="http://schemas.openxmlformats.org/presentationml/2006/main">
   <p:cSld>
     <p:spTree>
@@ -11139,7 +10739,184 @@
 </p:sld>
 </file>
 
-<file path=ppt/slides/slide23.xml><?xml version="1.0" encoding="utf-8"?>
+<file path=ppt/slides/slide2.xml><?xml version="1.0" encoding="utf-8"?>
+<p:sld xmlns:a="http://schemas.openxmlformats.org/drawingml/2006/main" xmlns:r="http://schemas.openxmlformats.org/officeDocument/2006/relationships" xmlns:p="http://schemas.openxmlformats.org/presentationml/2006/main">
+  <p:cSld>
+    <p:bg>
+      <p:bgPr>
+        <a:solidFill>
+          <a:schemeClr val="accent6">
+            <a:lumMod val="75000"/>
+          </a:schemeClr>
+        </a:solidFill>
+        <a:effectLst/>
+      </p:bgPr>
+    </p:bg>
+    <p:spTree>
+      <p:nvGrpSpPr>
+        <p:cNvPr id="1" name=""/>
+        <p:cNvGrpSpPr/>
+        <p:nvPr/>
+      </p:nvGrpSpPr>
+      <p:grpSpPr>
+        <a:xfrm>
+          <a:off x="0" y="0"/>
+          <a:ext cx="0" cy="0"/>
+          <a:chOff x="0" y="0"/>
+          <a:chExt cx="0" cy="0"/>
+        </a:xfrm>
+      </p:grpSpPr>
+      <p:sp>
+        <p:nvSpPr>
+          <p:cNvPr id="2" name="Title 1"/>
+          <p:cNvSpPr>
+            <a:spLocks noGrp="1"/>
+          </p:cNvSpPr>
+          <p:nvPr>
+            <p:ph type="title"/>
+          </p:nvPr>
+        </p:nvSpPr>
+        <p:spPr>
+          <a:xfrm>
+            <a:off x="381000" y="609600"/>
+            <a:ext cx="8229600" cy="1143000"/>
+          </a:xfrm>
+        </p:spPr>
+        <p:txBody>
+          <a:bodyPr>
+            <a:noAutofit/>
+          </a:bodyPr>
+          <a:lstStyle/>
+          <a:p>
+            <a:pPr algn="l"/>
+            <a:r>
+              <a:rPr lang="en-US" sz="7200" dirty="0" smtClean="0">
+                <a:solidFill>
+                  <a:schemeClr val="bg1"/>
+                </a:solidFill>
+              </a:rPr>
+              <a:t>Crop To Slide</a:t>
+            </a:r>
+            <a:endParaRPr lang="en-SG" sz="7200" dirty="0">
+              <a:solidFill>
+                <a:schemeClr val="bg1"/>
+              </a:solidFill>
+            </a:endParaRPr>
+          </a:p>
+        </p:txBody>
+      </p:sp>
+      <p:sp>
+        <p:nvSpPr>
+          <p:cNvPr id="3" name="text 5"/>
+          <p:cNvSpPr txBox="1"/>
+          <p:nvPr/>
+        </p:nvSpPr>
+        <p:spPr>
+          <a:xfrm>
+            <a:off x="542636" y="2819400"/>
+            <a:ext cx="7620000" cy="1938992"/>
+          </a:xfrm>
+          <a:prstGeom prst="rect">
+            <a:avLst/>
+          </a:prstGeom>
+          <a:noFill/>
+        </p:spPr>
+        <p:txBody>
+          <a:bodyPr wrap="square" rtlCol="0">
+            <a:spAutoFit/>
+          </a:bodyPr>
+          <a:lstStyle/>
+          <a:p>
+            <a:r>
+              <a:rPr lang="en-US" sz="2400" b="1" dirty="0" smtClean="0">
+                <a:solidFill>
+                  <a:schemeClr val="bg1"/>
+                </a:solidFill>
+              </a:rPr>
+              <a:t>Additional instructions:</a:t>
+            </a:r>
+          </a:p>
+          <a:p>
+            <a:pPr marL="285750" indent="-285750">
+              <a:buFont typeface="Arial" panose="020B0604020202020204" pitchFamily="34" charset="0"/>
+              <a:buChar char="•"/>
+            </a:pPr>
+            <a:r>
+              <a:rPr lang="en-US" sz="2400" dirty="0" smtClean="0">
+                <a:solidFill>
+                  <a:schemeClr val="bg1"/>
+                </a:solidFill>
+              </a:rPr>
+              <a:t>Select the picture(s).</a:t>
+            </a:r>
+          </a:p>
+          <a:p>
+            <a:pPr marL="285750" indent="-285750">
+              <a:buFont typeface="Arial" panose="020B0604020202020204" pitchFamily="34" charset="0"/>
+              <a:buChar char="•"/>
+            </a:pPr>
+            <a:r>
+              <a:rPr lang="en-US" sz="2400" dirty="0" smtClean="0">
+                <a:solidFill>
+                  <a:schemeClr val="bg1"/>
+                </a:solidFill>
+              </a:rPr>
+              <a:t>Click it and then select </a:t>
+            </a:r>
+            <a:r>
+              <a:rPr lang="en-US" sz="2400" b="1" dirty="0" smtClean="0">
+                <a:solidFill>
+                  <a:schemeClr val="bg1"/>
+                </a:solidFill>
+              </a:rPr>
+              <a:t>“Crop to Slide” </a:t>
+            </a:r>
+            <a:r>
+              <a:rPr lang="en-US" sz="2400" dirty="0" smtClean="0">
+                <a:solidFill>
+                  <a:schemeClr val="bg1"/>
+                </a:solidFill>
+              </a:rPr>
+              <a:t>in the context menu. </a:t>
+            </a:r>
+          </a:p>
+          <a:p>
+            <a:pPr marL="285750" indent="-285750">
+              <a:buFont typeface="Arial" panose="020B0604020202020204" pitchFamily="34" charset="0"/>
+              <a:buChar char="•"/>
+            </a:pPr>
+            <a:r>
+              <a:rPr lang="en-US" sz="2400" dirty="0" smtClean="0">
+                <a:solidFill>
+                  <a:schemeClr val="bg1"/>
+                </a:solidFill>
+              </a:rPr>
+              <a:t>Compare the result with the expected output.</a:t>
+            </a:r>
+          </a:p>
+        </p:txBody>
+      </p:sp>
+    </p:spTree>
+    <p:extLst>
+      <p:ext uri="{BB962C8B-B14F-4D97-AF65-F5344CB8AC3E}">
+        <p14:creationId xmlns:p14="http://schemas.microsoft.com/office/powerpoint/2010/main" val="1569131388"/>
+      </p:ext>
+    </p:extLst>
+  </p:cSld>
+  <p:clrMapOvr>
+    <a:masterClrMapping/>
+  </p:clrMapOvr>
+  <p:timing>
+    <p:tnLst>
+      <p:par>
+        <p:cTn id="1" dur="indefinite" restart="never" nodeType="tmRoot"/>
+      </p:par>
+    </p:tnLst>
+  </p:timing>
+</p:sld>
+</file>
+
+<file path=ppt/slides/slide20.xml><?xml version="1.0" encoding="utf-8"?>
 <p:sld xmlns:a="http://schemas.openxmlformats.org/drawingml/2006/main" xmlns:r="http://schemas.openxmlformats.org/officeDocument/2006/relationships" xmlns:p="http://schemas.openxmlformats.org/presentationml/2006/main">
   <p:cSld>
     <p:spTree>
@@ -11315,7 +11092,7 @@
 </p:sld>
 </file>
 
-<file path=ppt/slides/slide24.xml><?xml version="1.0" encoding="utf-8"?>
+<file path=ppt/slides/slide21.xml><?xml version="1.0" encoding="utf-8"?>
 <p:sld xmlns:a="http://schemas.openxmlformats.org/drawingml/2006/main" xmlns:r="http://schemas.openxmlformats.org/officeDocument/2006/relationships" xmlns:p="http://schemas.openxmlformats.org/presentationml/2006/main">
   <p:cSld>
     <p:spTree>
@@ -11391,7 +11168,7 @@
 </p:sld>
 </file>
 
-<file path=ppt/slides/slide25.xml><?xml version="1.0" encoding="utf-8"?>
+<file path=ppt/slides/slide22.xml><?xml version="1.0" encoding="utf-8"?>
 <p:sld xmlns:a="http://schemas.openxmlformats.org/drawingml/2006/main" xmlns:r="http://schemas.openxmlformats.org/officeDocument/2006/relationships" xmlns:p="http://schemas.openxmlformats.org/presentationml/2006/main">
   <p:cSld>
     <p:spTree>
@@ -11461,7 +11238,7 @@
 </p:sld>
 </file>
 
-<file path=ppt/slides/slide26.xml><?xml version="1.0" encoding="utf-8"?>
+<file path=ppt/slides/slide23.xml><?xml version="1.0" encoding="utf-8"?>
 <p:sld xmlns:a="http://schemas.openxmlformats.org/drawingml/2006/main" xmlns:r="http://schemas.openxmlformats.org/officeDocument/2006/relationships" xmlns:p="http://schemas.openxmlformats.org/presentationml/2006/main">
   <p:cSld>
     <p:spTree>
@@ -11539,7 +11316,7 @@
 </p:sld>
 </file>
 
-<file path=ppt/slides/slide27.xml><?xml version="1.0" encoding="utf-8"?>
+<file path=ppt/slides/slide24.xml><?xml version="1.0" encoding="utf-8"?>
 <p:sld xmlns:a="http://schemas.openxmlformats.org/drawingml/2006/main" xmlns:r="http://schemas.openxmlformats.org/officeDocument/2006/relationships" xmlns:p="http://schemas.openxmlformats.org/presentationml/2006/main">
   <p:cSld>
     <p:spTree>
@@ -11569,100 +11346,7 @@
 </p:sld>
 </file>
 
-<file path=ppt/slides/slide28.xml><?xml version="1.0" encoding="utf-8"?>
-<p:sld xmlns:a="http://schemas.openxmlformats.org/drawingml/2006/main" xmlns:r="http://schemas.openxmlformats.org/officeDocument/2006/relationships" xmlns:p="http://schemas.openxmlformats.org/presentationml/2006/main" show="0">
-  <p:cSld>
-    <p:spTree>
-      <p:nvGrpSpPr>
-        <p:cNvPr id="1" name=""/>
-        <p:cNvGrpSpPr/>
-        <p:nvPr/>
-      </p:nvGrpSpPr>
-      <p:grpSpPr>
-        <a:xfrm>
-          <a:off x="0" y="0"/>
-          <a:ext cx="0" cy="0"/>
-          <a:chOff x="0" y="0"/>
-          <a:chExt cx="0" cy="0"/>
-        </a:xfrm>
-      </p:grpSpPr>
-      <p:sp>
-        <p:nvSpPr>
-          <p:cNvPr id="2" name="标题 1"/>
-          <p:cNvSpPr>
-            <a:spLocks noGrp="1"/>
-          </p:cNvSpPr>
-          <p:nvPr>
-            <p:ph type="title"/>
-          </p:nvPr>
-        </p:nvSpPr>
-        <p:spPr/>
-        <p:txBody>
-          <a:bodyPr/>
-          <a:lstStyle/>
-          <a:p>
-            <a:endParaRPr lang="en-SG"/>
-          </a:p>
-        </p:txBody>
-      </p:sp>
-      <p:pic>
-        <p:nvPicPr>
-          <p:cNvPr id="4" name="内容占位符 3"/>
-          <p:cNvPicPr>
-            <a:picLocks noGrp="1"/>
-          </p:cNvPicPr>
-          <p:nvPr>
-            <p:ph idx="1"/>
-          </p:nvPr>
-        </p:nvPicPr>
-        <p:blipFill>
-          <a:blip r:embed="rId2">
-            <a:extLst>
-              <a:ext uri="{28A0092B-C50C-407E-A947-70E740481C1C}">
-                <a14:useLocalDpi xmlns:a14="http://schemas.microsoft.com/office/drawing/2010/main" val="0"/>
-              </a:ext>
-            </a:extLst>
-          </a:blip>
-          <a:stretch>
-            <a:fillRect/>
-          </a:stretch>
-        </p:blipFill>
-        <p:spPr>
-          <a:xfrm>
-            <a:off x="1074665" y="1600200"/>
-            <a:ext cx="6994670" cy="4525963"/>
-          </a:xfrm>
-        </p:spPr>
-      </p:pic>
-    </p:spTree>
-    <p:extLst>
-      <p:ext uri="{BB962C8B-B14F-4D97-AF65-F5344CB8AC3E}">
-        <p14:creationId xmlns:p14="http://schemas.microsoft.com/office/powerpoint/2010/main" val="2234878813"/>
-      </p:ext>
-    </p:extLst>
-  </p:cSld>
-  <p:clrMapOvr>
-    <a:masterClrMapping/>
-  </p:clrMapOvr>
-  <mc:AlternateContent xmlns:mc="http://schemas.openxmlformats.org/markup-compatibility/2006" xmlns:p14="http://schemas.microsoft.com/office/powerpoint/2010/main">
-    <mc:Choice Requires="p14">
-      <p:transition spd="slow" p14:dur="2000"/>
-    </mc:Choice>
-    <mc:Fallback xmlns="">
-      <p:transition spd="slow"/>
-    </mc:Fallback>
-  </mc:AlternateContent>
-  <p:timing>
-    <p:tnLst>
-      <p:par>
-        <p:cTn id="1" dur="indefinite" restart="never" nodeType="tmRoot"/>
-      </p:par>
-    </p:tnLst>
-  </p:timing>
-</p:sld>
-</file>
-
-<file path=ppt/slides/slide3.xml><?xml version="1.0" encoding="utf-8"?>
+<file path=ppt/slides/slide25.xml><?xml version="1.0" encoding="utf-8"?>
 <p:sld xmlns:a="http://schemas.openxmlformats.org/drawingml/2006/main" xmlns:r="http://schemas.openxmlformats.org/officeDocument/2006/relationships" xmlns:p="http://schemas.openxmlformats.org/presentationml/2006/main">
   <p:cSld>
     <p:spTree>
@@ -11734,7 +11418,7 @@
 </p:sld>
 </file>
 
-<file path=ppt/slides/slide4.xml><?xml version="1.0" encoding="utf-8"?>
+<file path=ppt/slides/slide26.xml><?xml version="1.0" encoding="utf-8"?>
 <p:sld xmlns:a="http://schemas.openxmlformats.org/drawingml/2006/main" xmlns:r="http://schemas.openxmlformats.org/officeDocument/2006/relationships" xmlns:p="http://schemas.openxmlformats.org/presentationml/2006/main">
   <p:cSld>
     <p:bg>
@@ -11802,17 +11486,9 @@
 </p:sld>
 </file>
 
-<file path=ppt/slides/slide5.xml><?xml version="1.0" encoding="utf-8"?>
-<p:sld xmlns:a="http://schemas.openxmlformats.org/drawingml/2006/main" xmlns:r="http://schemas.openxmlformats.org/officeDocument/2006/relationships" xmlns:p="http://schemas.openxmlformats.org/presentationml/2006/main">
+<file path=ppt/slides/slide27.xml><?xml version="1.0" encoding="utf-8"?>
+<p:sld xmlns:a="http://schemas.openxmlformats.org/drawingml/2006/main" xmlns:r="http://schemas.openxmlformats.org/officeDocument/2006/relationships" xmlns:p="http://schemas.openxmlformats.org/presentationml/2006/main" show="0">
   <p:cSld>
-    <p:bg>
-      <p:bgPr>
-        <a:solidFill>
-          <a:schemeClr val="bg1"/>
-        </a:solidFill>
-        <a:effectLst/>
-      </p:bgPr>
-    </p:bg>
     <p:spTree>
       <p:nvGrpSpPr>
         <p:cNvPr id="1" name=""/>
@@ -11827,15 +11503,36 @@
           <a:chExt cx="0" cy="0"/>
         </a:xfrm>
       </p:grpSpPr>
+      <p:sp>
+        <p:nvSpPr>
+          <p:cNvPr id="2" name="标题 1"/>
+          <p:cNvSpPr>
+            <a:spLocks noGrp="1"/>
+          </p:cNvSpPr>
+          <p:nvPr>
+            <p:ph type="title"/>
+          </p:nvPr>
+        </p:nvSpPr>
+        <p:spPr/>
+        <p:txBody>
+          <a:bodyPr/>
+          <a:lstStyle/>
+          <a:p>
+            <a:endParaRPr lang="en-SG"/>
+          </a:p>
+        </p:txBody>
+      </p:sp>
       <p:pic>
         <p:nvPicPr>
-          <p:cNvPr id="5" name="selectMe"/>
+          <p:cNvPr id="4" name="内容占位符 3"/>
           <p:cNvPicPr>
-            <a:picLocks noChangeAspect="1"/>
+            <a:picLocks noGrp="1"/>
           </p:cNvPicPr>
-          <p:nvPr/>
+          <p:nvPr>
+            <p:ph idx="1"/>
+          </p:nvPr>
         </p:nvPicPr>
-        <p:blipFill rotWithShape="1">
+        <p:blipFill>
           <a:blip r:embed="rId2">
             <a:extLst>
               <a:ext uri="{28A0092B-C50C-407E-A947-70E740481C1C}">
@@ -11843,63 +11540,46 @@
               </a:ext>
             </a:extLst>
           </a:blip>
-          <a:srcRect/>
-          <a:stretch/>
+          <a:stretch>
+            <a:fillRect/>
+          </a:stretch>
         </p:blipFill>
         <p:spPr>
           <a:xfrm>
-            <a:off x="457200" y="990600"/>
-            <a:ext cx="4572000" cy="3058418"/>
+            <a:off x="1074665" y="1600200"/>
+            <a:ext cx="6994670" cy="4525963"/>
           </a:xfrm>
-          <a:prstGeom prst="rect">
-            <a:avLst/>
-          </a:prstGeom>
         </p:spPr>
       </p:pic>
-      <p:sp>
-        <p:nvSpPr>
-          <p:cNvPr id="3" name="text"/>
-          <p:cNvSpPr txBox="1"/>
-          <p:nvPr/>
-        </p:nvSpPr>
-        <p:spPr>
-          <a:xfrm>
-            <a:off x="8101022" y="0"/>
-            <a:ext cx="1042978" cy="369332"/>
-          </a:xfrm>
-          <a:prstGeom prst="rect">
-            <a:avLst/>
-          </a:prstGeom>
-          <a:noFill/>
-        </p:spPr>
-        <p:txBody>
-          <a:bodyPr wrap="none" rtlCol="0">
-            <a:spAutoFit/>
-          </a:bodyPr>
-          <a:lstStyle/>
-          <a:p>
-            <a:r>
-              <a:rPr lang="en-SG" dirty="0" smtClean="0"/>
-              <a:t>Expected</a:t>
-            </a:r>
-            <a:endParaRPr lang="en-SG" dirty="0"/>
-          </a:p>
-        </p:txBody>
-      </p:sp>
     </p:spTree>
     <p:extLst>
       <p:ext uri="{BB962C8B-B14F-4D97-AF65-F5344CB8AC3E}">
-        <p14:creationId xmlns:p14="http://schemas.microsoft.com/office/powerpoint/2010/main" val="3283599107"/>
+        <p14:creationId xmlns:p14="http://schemas.microsoft.com/office/powerpoint/2010/main" val="2234878813"/>
       </p:ext>
     </p:extLst>
   </p:cSld>
   <p:clrMapOvr>
     <a:masterClrMapping/>
   </p:clrMapOvr>
+  <mc:AlternateContent xmlns:mc="http://schemas.openxmlformats.org/markup-compatibility/2006" xmlns:p14="http://schemas.microsoft.com/office/powerpoint/2010/main">
+    <mc:Choice Requires="p14">
+      <p:transition spd="slow" p14:dur="2000"/>
+    </mc:Choice>
+    <mc:Fallback xmlns="">
+      <p:transition spd="slow"/>
+    </mc:Fallback>
+  </mc:AlternateContent>
+  <p:timing>
+    <p:tnLst>
+      <p:par>
+        <p:cTn id="1" dur="indefinite" restart="never" nodeType="tmRoot"/>
+      </p:par>
+    </p:tnLst>
+  </p:timing>
 </p:sld>
 </file>
 
-<file path=ppt/slides/slide6.xml><?xml version="1.0" encoding="utf-8"?>
+<file path=ppt/slides/slide3.xml><?xml version="1.0" encoding="utf-8"?>
 <p:sld xmlns:a="http://schemas.openxmlformats.org/drawingml/2006/main" xmlns:r="http://schemas.openxmlformats.org/officeDocument/2006/relationships" xmlns:p="http://schemas.openxmlformats.org/presentationml/2006/main">
   <p:cSld>
     <p:spTree>
@@ -11952,7 +11632,7 @@
 </p:sld>
 </file>
 
-<file path=ppt/slides/slide7.xml><?xml version="1.0" encoding="utf-8"?>
+<file path=ppt/slides/slide4.xml><?xml version="1.0" encoding="utf-8"?>
 <p:sld xmlns:a="http://schemas.openxmlformats.org/drawingml/2006/main" xmlns:r="http://schemas.openxmlformats.org/officeDocument/2006/relationships" xmlns:p="http://schemas.openxmlformats.org/presentationml/2006/main">
   <p:cSld>
     <p:bg>
@@ -12020,7 +11700,7 @@
 </p:sld>
 </file>
 
-<file path=ppt/slides/slide8.xml><?xml version="1.0" encoding="utf-8"?>
+<file path=ppt/slides/slide5.xml><?xml version="1.0" encoding="utf-8"?>
 <p:sld xmlns:a="http://schemas.openxmlformats.org/drawingml/2006/main" xmlns:r="http://schemas.openxmlformats.org/officeDocument/2006/relationships" xmlns:p="http://schemas.openxmlformats.org/presentationml/2006/main">
   <p:cSld>
     <p:bg>
@@ -12117,6 +11797,227 @@
 </p:sld>
 </file>
 
+<file path=ppt/slides/slide6.xml><?xml version="1.0" encoding="utf-8"?>
+<p:sld xmlns:a="http://schemas.openxmlformats.org/drawingml/2006/main" xmlns:r="http://schemas.openxmlformats.org/officeDocument/2006/relationships" xmlns:p="http://schemas.openxmlformats.org/presentationml/2006/main">
+  <p:cSld>
+    <p:spTree>
+      <p:nvGrpSpPr>
+        <p:cNvPr id="1" name=""/>
+        <p:cNvGrpSpPr/>
+        <p:nvPr/>
+      </p:nvGrpSpPr>
+      <p:grpSpPr>
+        <a:xfrm>
+          <a:off x="0" y="0"/>
+          <a:ext cx="0" cy="0"/>
+          <a:chOff x="0" y="0"/>
+          <a:chExt cx="0" cy="0"/>
+        </a:xfrm>
+      </p:grpSpPr>
+      <p:sp>
+        <p:nvSpPr>
+          <p:cNvPr id="2" name="Title 1"/>
+          <p:cNvSpPr>
+            <a:spLocks noGrp="1"/>
+          </p:cNvSpPr>
+          <p:nvPr>
+            <p:ph type="title"/>
+          </p:nvPr>
+        </p:nvSpPr>
+        <p:spPr/>
+        <p:txBody>
+          <a:bodyPr/>
+          <a:lstStyle/>
+          <a:p>
+            <a:r>
+              <a:rPr lang="en-US" dirty="0" smtClean="0"/>
+              <a:t>Auto Crop:: picture crosses multiple edges</a:t>
+            </a:r>
+            <a:endParaRPr lang="en-SG" dirty="0"/>
+          </a:p>
+        </p:txBody>
+      </p:sp>
+      <p:sp>
+        <p:nvSpPr>
+          <p:cNvPr id="3" name="Content Placeholder 2"/>
+          <p:cNvSpPr>
+            <a:spLocks noGrp="1"/>
+          </p:cNvSpPr>
+          <p:nvPr>
+            <p:ph idx="1"/>
+          </p:nvPr>
+        </p:nvSpPr>
+        <p:spPr/>
+        <p:txBody>
+          <a:bodyPr/>
+          <a:lstStyle/>
+          <a:p>
+            <a:endParaRPr lang="en-SG" dirty="0"/>
+          </a:p>
+        </p:txBody>
+      </p:sp>
+    </p:spTree>
+    <p:extLst>
+      <p:ext uri="{BB962C8B-B14F-4D97-AF65-F5344CB8AC3E}">
+        <p14:creationId xmlns:p14="http://schemas.microsoft.com/office/powerpoint/2010/main" val="4026306467"/>
+      </p:ext>
+    </p:extLst>
+  </p:cSld>
+  <p:clrMapOvr>
+    <a:masterClrMapping/>
+  </p:clrMapOvr>
+</p:sld>
+</file>
+
+<file path=ppt/slides/slide7.xml><?xml version="1.0" encoding="utf-8"?>
+<p:sld xmlns:a="http://schemas.openxmlformats.org/drawingml/2006/main" xmlns:r="http://schemas.openxmlformats.org/officeDocument/2006/relationships" xmlns:p="http://schemas.openxmlformats.org/presentationml/2006/main">
+  <p:cSld>
+    <p:spTree>
+      <p:nvGrpSpPr>
+        <p:cNvPr id="1" name=""/>
+        <p:cNvGrpSpPr/>
+        <p:nvPr/>
+      </p:nvGrpSpPr>
+      <p:grpSpPr>
+        <a:xfrm>
+          <a:off x="0" y="0"/>
+          <a:ext cx="0" cy="0"/>
+          <a:chOff x="0" y="0"/>
+          <a:chExt cx="0" cy="0"/>
+        </a:xfrm>
+      </p:grpSpPr>
+      <p:pic>
+        <p:nvPicPr>
+          <p:cNvPr id="5" name="selectMe"/>
+          <p:cNvPicPr>
+            <a:picLocks noChangeAspect="1"/>
+          </p:cNvPicPr>
+          <p:nvPr/>
+        </p:nvPicPr>
+        <p:blipFill>
+          <a:blip r:embed="rId2">
+            <a:extLst>
+              <a:ext uri="{28A0092B-C50C-407E-A947-70E740481C1C}">
+                <a14:useLocalDpi xmlns:a14="http://schemas.microsoft.com/office/drawing/2010/main" val="0"/>
+              </a:ext>
+            </a:extLst>
+          </a:blip>
+          <a:stretch>
+            <a:fillRect/>
+          </a:stretch>
+        </p:blipFill>
+        <p:spPr>
+          <a:xfrm>
+            <a:off x="-1676400" y="-2819400"/>
+            <a:ext cx="12420600" cy="8308702"/>
+          </a:xfrm>
+          <a:prstGeom prst="rect">
+            <a:avLst/>
+          </a:prstGeom>
+        </p:spPr>
+      </p:pic>
+    </p:spTree>
+    <p:extLst>
+      <p:ext uri="{BB962C8B-B14F-4D97-AF65-F5344CB8AC3E}">
+        <p14:creationId xmlns:p14="http://schemas.microsoft.com/office/powerpoint/2010/main" val="2566138312"/>
+      </p:ext>
+    </p:extLst>
+  </p:cSld>
+  <p:clrMapOvr>
+    <a:masterClrMapping/>
+  </p:clrMapOvr>
+</p:sld>
+</file>
+
+<file path=ppt/slides/slide8.xml><?xml version="1.0" encoding="utf-8"?>
+<p:sld xmlns:a="http://schemas.openxmlformats.org/drawingml/2006/main" xmlns:r="http://schemas.openxmlformats.org/officeDocument/2006/relationships" xmlns:p="http://schemas.openxmlformats.org/presentationml/2006/main">
+  <p:cSld>
+    <p:spTree>
+      <p:nvGrpSpPr>
+        <p:cNvPr id="1" name=""/>
+        <p:cNvGrpSpPr/>
+        <p:nvPr/>
+      </p:nvGrpSpPr>
+      <p:grpSpPr>
+        <a:xfrm>
+          <a:off x="0" y="0"/>
+          <a:ext cx="0" cy="0"/>
+          <a:chOff x="0" y="0"/>
+          <a:chExt cx="0" cy="0"/>
+        </a:xfrm>
+      </p:grpSpPr>
+      <p:pic>
+        <p:nvPicPr>
+          <p:cNvPr id="5" name="selectMe"/>
+          <p:cNvPicPr>
+            <a:picLocks noChangeAspect="1"/>
+          </p:cNvPicPr>
+          <p:nvPr/>
+        </p:nvPicPr>
+        <p:blipFill rotWithShape="1">
+          <a:blip r:embed="rId2">
+            <a:extLst>
+              <a:ext uri="{28A0092B-C50C-407E-A947-70E740481C1C}">
+                <a14:useLocalDpi xmlns:a14="http://schemas.microsoft.com/office/drawing/2010/main" val="0"/>
+              </a:ext>
+            </a:extLst>
+          </a:blip>
+          <a:srcRect l="13497" t="33933" r="12884"/>
+          <a:stretch/>
+        </p:blipFill>
+        <p:spPr>
+          <a:xfrm>
+            <a:off x="0" y="0"/>
+            <a:ext cx="9144000" cy="5489302"/>
+          </a:xfrm>
+          <a:prstGeom prst="rect">
+            <a:avLst/>
+          </a:prstGeom>
+        </p:spPr>
+      </p:pic>
+      <p:sp>
+        <p:nvSpPr>
+          <p:cNvPr id="3" name="text"/>
+          <p:cNvSpPr txBox="1"/>
+          <p:nvPr/>
+        </p:nvSpPr>
+        <p:spPr>
+          <a:xfrm>
+            <a:off x="8101022" y="0"/>
+            <a:ext cx="1042978" cy="369332"/>
+          </a:xfrm>
+          <a:prstGeom prst="rect">
+            <a:avLst/>
+          </a:prstGeom>
+          <a:noFill/>
+        </p:spPr>
+        <p:txBody>
+          <a:bodyPr wrap="none" rtlCol="0">
+            <a:spAutoFit/>
+          </a:bodyPr>
+          <a:lstStyle/>
+          <a:p>
+            <a:r>
+              <a:rPr lang="en-SG" dirty="0" smtClean="0"/>
+              <a:t>Expected</a:t>
+            </a:r>
+            <a:endParaRPr lang="en-SG" dirty="0"/>
+          </a:p>
+        </p:txBody>
+      </p:sp>
+    </p:spTree>
+    <p:extLst>
+      <p:ext uri="{BB962C8B-B14F-4D97-AF65-F5344CB8AC3E}">
+        <p14:creationId xmlns:p14="http://schemas.microsoft.com/office/powerpoint/2010/main" val="2188246822"/>
+      </p:ext>
+    </p:extLst>
+  </p:cSld>
+  <p:clrMapOvr>
+    <a:masterClrMapping/>
+  </p:clrMapOvr>
+</p:sld>
+</file>
+
 <file path=ppt/slides/slide9.xml><?xml version="1.0" encoding="utf-8"?>
 <p:sld xmlns:a="http://schemas.openxmlformats.org/drawingml/2006/main" xmlns:r="http://schemas.openxmlformats.org/officeDocument/2006/relationships" xmlns:p="http://schemas.openxmlformats.org/presentationml/2006/main">
   <p:cSld>
@@ -12151,7 +12052,7 @@
           <a:p>
             <a:r>
               <a:rPr lang="en-US" dirty="0" smtClean="0"/>
-              <a:t>Auto Crop:: picture crosses multiple edges</a:t>
+              <a:t>Auto Crop:: rotated picture crosses one edge</a:t>
             </a:r>
             <a:endParaRPr lang="en-SG" dirty="0"/>
           </a:p>
@@ -12179,7 +12080,7 @@
     </p:spTree>
     <p:extLst>
       <p:ext uri="{BB962C8B-B14F-4D97-AF65-F5344CB8AC3E}">
-        <p14:creationId xmlns:p14="http://schemas.microsoft.com/office/powerpoint/2010/main" val="4026306467"/>
+        <p14:creationId xmlns:p14="http://schemas.microsoft.com/office/powerpoint/2010/main" val="3585701570"/>
       </p:ext>
     </p:extLst>
   </p:cSld>

</xml_diff>

<commit_message>
Crop to slide: support even cropping of non-picture objects #1179 (#1204)
* Convert to picture shape is shape type

* Fix error messages

* Add test case

* Convert to picture shape is shape type

* Fix error messages

* Add test case

* Change wrong method accessibility

* Move IsShape to Graphics
</commit_message>
<xml_diff>
--- a/doc/test/CropToSlide.pptx
+++ b/doc/test/CropToSlide.pptx
@@ -7,7 +7,7 @@
     <p:sldMasterId id="2147483672" r:id="rId3"/>
   </p:sldMasterIdLst>
   <p:notesMasterIdLst>
-    <p:notesMasterId r:id="rId32"/>
+    <p:notesMasterId r:id="rId35"/>
   </p:notesMasterIdLst>
   <p:sldIdLst>
     <p:sldId id="287" r:id="rId4"/>
@@ -32,12 +32,15 @@
     <p:sldId id="340" r:id="rId23"/>
     <p:sldId id="328" r:id="rId24"/>
     <p:sldId id="329" r:id="rId25"/>
-    <p:sldId id="341" r:id="rId26"/>
-    <p:sldId id="331" r:id="rId27"/>
-    <p:sldId id="332" r:id="rId28"/>
-    <p:sldId id="333" r:id="rId29"/>
-    <p:sldId id="334" r:id="rId30"/>
-    <p:sldId id="318" r:id="rId31"/>
+    <p:sldId id="344" r:id="rId26"/>
+    <p:sldId id="347" r:id="rId27"/>
+    <p:sldId id="346" r:id="rId28"/>
+    <p:sldId id="348" r:id="rId29"/>
+    <p:sldId id="331" r:id="rId30"/>
+    <p:sldId id="332" r:id="rId31"/>
+    <p:sldId id="333" r:id="rId32"/>
+    <p:sldId id="334" r:id="rId33"/>
+    <p:sldId id="318" r:id="rId34"/>
   </p:sldIdLst>
   <p:sldSz cx="9144000" cy="6858000" type="screen4x3"/>
   <p:notesSz cx="6858000" cy="9144000"/>
@@ -167,7 +170,10 @@
             <p14:sldId id="340"/>
             <p14:sldId id="328"/>
             <p14:sldId id="329"/>
-            <p14:sldId id="341"/>
+            <p14:sldId id="344"/>
+            <p14:sldId id="347"/>
+            <p14:sldId id="346"/>
+            <p14:sldId id="348"/>
             <p14:sldId id="331"/>
             <p14:sldId id="332"/>
             <p14:sldId id="333"/>
@@ -277,7 +283,7 @@
           <a:p>
             <a:fld id="{26004F41-C1A1-4B0D-9EEE-5E3F0E5BC108}" type="datetimeFigureOut">
               <a:rPr lang="en-SG" smtClean="0"/>
-              <a:t>1/21/2017</a:t>
+              <a:t>3/12/2017</a:t>
             </a:fld>
             <a:endParaRPr lang="en-SG"/>
           </a:p>
@@ -726,7 +732,7 @@
           <a:p>
             <a:fld id="{699DC775-C286-4358-8C92-D7E584E969B3}" type="datetimeFigureOut">
               <a:rPr lang="en-US" smtClean="0"/>
-              <a:t>1/21/2017</a:t>
+              <a:t>3/12/2017</a:t>
             </a:fld>
             <a:endParaRPr lang="en-US"/>
           </a:p>
@@ -896,7 +902,7 @@
           <a:p>
             <a:fld id="{699DC775-C286-4358-8C92-D7E584E969B3}" type="datetimeFigureOut">
               <a:rPr lang="en-US" smtClean="0"/>
-              <a:t>1/21/2017</a:t>
+              <a:t>3/12/2017</a:t>
             </a:fld>
             <a:endParaRPr lang="en-US"/>
           </a:p>
@@ -1076,7 +1082,7 @@
           <a:p>
             <a:fld id="{699DC775-C286-4358-8C92-D7E584E969B3}" type="datetimeFigureOut">
               <a:rPr lang="en-US" smtClean="0"/>
-              <a:t>1/21/2017</a:t>
+              <a:t>3/12/2017</a:t>
             </a:fld>
             <a:endParaRPr lang="en-US"/>
           </a:p>
@@ -1318,7 +1324,7 @@
           <a:p>
             <a:fld id="{699DC775-C286-4358-8C92-D7E584E969B3}" type="datetimeFigureOut">
               <a:rPr lang="en-US" smtClean="0"/>
-              <a:t>1/21/2017</a:t>
+              <a:t>3/12/2017</a:t>
             </a:fld>
             <a:endParaRPr lang="en-US"/>
           </a:p>
@@ -1488,7 +1494,7 @@
           <a:p>
             <a:fld id="{699DC775-C286-4358-8C92-D7E584E969B3}" type="datetimeFigureOut">
               <a:rPr lang="en-US" smtClean="0"/>
-              <a:t>1/21/2017</a:t>
+              <a:t>3/12/2017</a:t>
             </a:fld>
             <a:endParaRPr lang="en-US"/>
           </a:p>
@@ -1734,7 +1740,7 @@
           <a:p>
             <a:fld id="{699DC775-C286-4358-8C92-D7E584E969B3}" type="datetimeFigureOut">
               <a:rPr lang="en-US" smtClean="0"/>
-              <a:t>1/21/2017</a:t>
+              <a:t>3/12/2017</a:t>
             </a:fld>
             <a:endParaRPr lang="en-US"/>
           </a:p>
@@ -2022,7 +2028,7 @@
           <a:p>
             <a:fld id="{699DC775-C286-4358-8C92-D7E584E969B3}" type="datetimeFigureOut">
               <a:rPr lang="en-US" smtClean="0"/>
-              <a:t>1/21/2017</a:t>
+              <a:t>3/12/2017</a:t>
             </a:fld>
             <a:endParaRPr lang="en-US"/>
           </a:p>
@@ -2444,7 +2450,7 @@
           <a:p>
             <a:fld id="{699DC775-C286-4358-8C92-D7E584E969B3}" type="datetimeFigureOut">
               <a:rPr lang="en-US" smtClean="0"/>
-              <a:t>1/21/2017</a:t>
+              <a:t>3/12/2017</a:t>
             </a:fld>
             <a:endParaRPr lang="en-US"/>
           </a:p>
@@ -2562,7 +2568,7 @@
           <a:p>
             <a:fld id="{699DC775-C286-4358-8C92-D7E584E969B3}" type="datetimeFigureOut">
               <a:rPr lang="en-US" smtClean="0"/>
-              <a:t>1/21/2017</a:t>
+              <a:t>3/12/2017</a:t>
             </a:fld>
             <a:endParaRPr lang="en-US"/>
           </a:p>
@@ -2657,7 +2663,7 @@
           <a:p>
             <a:fld id="{699DC775-C286-4358-8C92-D7E584E969B3}" type="datetimeFigureOut">
               <a:rPr lang="en-US" smtClean="0"/>
-              <a:t>1/21/2017</a:t>
+              <a:t>3/12/2017</a:t>
             </a:fld>
             <a:endParaRPr lang="en-US"/>
           </a:p>
@@ -2934,7 +2940,7 @@
           <a:p>
             <a:fld id="{699DC775-C286-4358-8C92-D7E584E969B3}" type="datetimeFigureOut">
               <a:rPr lang="en-US" smtClean="0"/>
-              <a:t>1/21/2017</a:t>
+              <a:t>3/12/2017</a:t>
             </a:fld>
             <a:endParaRPr lang="en-US"/>
           </a:p>
@@ -3104,7 +3110,7 @@
           <a:p>
             <a:fld id="{699DC775-C286-4358-8C92-D7E584E969B3}" type="datetimeFigureOut">
               <a:rPr lang="en-US" smtClean="0"/>
-              <a:t>1/21/2017</a:t>
+              <a:t>3/12/2017</a:t>
             </a:fld>
             <a:endParaRPr lang="en-US"/>
           </a:p>
@@ -3357,7 +3363,7 @@
           <a:p>
             <a:fld id="{699DC775-C286-4358-8C92-D7E584E969B3}" type="datetimeFigureOut">
               <a:rPr lang="en-US" smtClean="0"/>
-              <a:t>1/21/2017</a:t>
+              <a:t>3/12/2017</a:t>
             </a:fld>
             <a:endParaRPr lang="en-US"/>
           </a:p>
@@ -3527,7 +3533,7 @@
           <a:p>
             <a:fld id="{699DC775-C286-4358-8C92-D7E584E969B3}" type="datetimeFigureOut">
               <a:rPr lang="en-US" smtClean="0"/>
-              <a:t>1/21/2017</a:t>
+              <a:t>3/12/2017</a:t>
             </a:fld>
             <a:endParaRPr lang="en-US"/>
           </a:p>
@@ -3707,7 +3713,7 @@
           <a:p>
             <a:fld id="{699DC775-C286-4358-8C92-D7E584E969B3}" type="datetimeFigureOut">
               <a:rPr lang="en-US" smtClean="0"/>
-              <a:t>1/21/2017</a:t>
+              <a:t>3/12/2017</a:t>
             </a:fld>
             <a:endParaRPr lang="en-US"/>
           </a:p>
@@ -3957,7 +3963,7 @@
           <a:p>
             <a:fld id="{699DC775-C286-4358-8C92-D7E584E969B3}" type="datetimeFigureOut">
               <a:rPr lang="en-US" smtClean="0"/>
-              <a:t>1/21/2017</a:t>
+              <a:t>3/12/2017</a:t>
             </a:fld>
             <a:endParaRPr lang="en-US"/>
           </a:p>
@@ -4135,7 +4141,7 @@
           <a:p>
             <a:fld id="{699DC775-C286-4358-8C92-D7E584E969B3}" type="datetimeFigureOut">
               <a:rPr lang="en-US" smtClean="0"/>
-              <a:t>1/21/2017</a:t>
+              <a:t>3/12/2017</a:t>
             </a:fld>
             <a:endParaRPr lang="en-US"/>
           </a:p>
@@ -4389,7 +4395,7 @@
           <a:p>
             <a:fld id="{699DC775-C286-4358-8C92-D7E584E969B3}" type="datetimeFigureOut">
               <a:rPr lang="en-US" smtClean="0"/>
-              <a:t>1/21/2017</a:t>
+              <a:t>3/12/2017</a:t>
             </a:fld>
             <a:endParaRPr lang="en-US"/>
           </a:p>
@@ -4685,7 +4691,7 @@
           <a:p>
             <a:fld id="{699DC775-C286-4358-8C92-D7E584E969B3}" type="datetimeFigureOut">
               <a:rPr lang="en-US" smtClean="0"/>
-              <a:t>1/21/2017</a:t>
+              <a:t>3/12/2017</a:t>
             </a:fld>
             <a:endParaRPr lang="en-US"/>
           </a:p>
@@ -5115,7 +5121,7 @@
           <a:p>
             <a:fld id="{699DC775-C286-4358-8C92-D7E584E969B3}" type="datetimeFigureOut">
               <a:rPr lang="en-US" smtClean="0"/>
-              <a:t>1/21/2017</a:t>
+              <a:t>3/12/2017</a:t>
             </a:fld>
             <a:endParaRPr lang="en-US"/>
           </a:p>
@@ -5241,7 +5247,7 @@
           <a:p>
             <a:fld id="{699DC775-C286-4358-8C92-D7E584E969B3}" type="datetimeFigureOut">
               <a:rPr lang="en-US" smtClean="0"/>
-              <a:t>1/21/2017</a:t>
+              <a:t>3/12/2017</a:t>
             </a:fld>
             <a:endParaRPr lang="en-US"/>
           </a:p>
@@ -5344,7 +5350,7 @@
           <a:p>
             <a:fld id="{699DC775-C286-4358-8C92-D7E584E969B3}" type="datetimeFigureOut">
               <a:rPr lang="en-US" smtClean="0"/>
-              <a:t>1/21/2017</a:t>
+              <a:t>3/12/2017</a:t>
             </a:fld>
             <a:endParaRPr lang="en-US"/>
           </a:p>
@@ -5590,7 +5596,7 @@
           <a:p>
             <a:fld id="{699DC775-C286-4358-8C92-D7E584E969B3}" type="datetimeFigureOut">
               <a:rPr lang="en-US" smtClean="0"/>
-              <a:t>1/21/2017</a:t>
+              <a:t>3/12/2017</a:t>
             </a:fld>
             <a:endParaRPr lang="en-US"/>
           </a:p>
@@ -5875,7 +5881,7 @@
           <a:p>
             <a:fld id="{699DC775-C286-4358-8C92-D7E584E969B3}" type="datetimeFigureOut">
               <a:rPr lang="en-US" smtClean="0"/>
-              <a:t>1/21/2017</a:t>
+              <a:t>3/12/2017</a:t>
             </a:fld>
             <a:endParaRPr lang="en-US"/>
           </a:p>
@@ -6136,7 +6142,7 @@
           <a:p>
             <a:fld id="{699DC775-C286-4358-8C92-D7E584E969B3}" type="datetimeFigureOut">
               <a:rPr lang="en-US" smtClean="0"/>
-              <a:t>1/21/2017</a:t>
+              <a:t>3/12/2017</a:t>
             </a:fld>
             <a:endParaRPr lang="en-US"/>
           </a:p>
@@ -6314,7 +6320,7 @@
           <a:p>
             <a:fld id="{699DC775-C286-4358-8C92-D7E584E969B3}" type="datetimeFigureOut">
               <a:rPr lang="en-US" smtClean="0"/>
-              <a:t>1/21/2017</a:t>
+              <a:t>3/12/2017</a:t>
             </a:fld>
             <a:endParaRPr lang="en-US"/>
           </a:p>
@@ -6502,7 +6508,7 @@
           <a:p>
             <a:fld id="{699DC775-C286-4358-8C92-D7E584E969B3}" type="datetimeFigureOut">
               <a:rPr lang="en-US" smtClean="0"/>
-              <a:t>1/21/2017</a:t>
+              <a:t>3/12/2017</a:t>
             </a:fld>
             <a:endParaRPr lang="en-US"/>
           </a:p>
@@ -6790,7 +6796,7 @@
           <a:p>
             <a:fld id="{699DC775-C286-4358-8C92-D7E584E969B3}" type="datetimeFigureOut">
               <a:rPr lang="en-US" smtClean="0"/>
-              <a:t>1/21/2017</a:t>
+              <a:t>3/12/2017</a:t>
             </a:fld>
             <a:endParaRPr lang="en-US"/>
           </a:p>
@@ -7212,7 +7218,7 @@
           <a:p>
             <a:fld id="{699DC775-C286-4358-8C92-D7E584E969B3}" type="datetimeFigureOut">
               <a:rPr lang="en-US" smtClean="0"/>
-              <a:t>1/21/2017</a:t>
+              <a:t>3/12/2017</a:t>
             </a:fld>
             <a:endParaRPr lang="en-US"/>
           </a:p>
@@ -7330,7 +7336,7 @@
           <a:p>
             <a:fld id="{699DC775-C286-4358-8C92-D7E584E969B3}" type="datetimeFigureOut">
               <a:rPr lang="en-US" smtClean="0"/>
-              <a:t>1/21/2017</a:t>
+              <a:t>3/12/2017</a:t>
             </a:fld>
             <a:endParaRPr lang="en-US"/>
           </a:p>
@@ -7425,7 +7431,7 @@
           <a:p>
             <a:fld id="{699DC775-C286-4358-8C92-D7E584E969B3}" type="datetimeFigureOut">
               <a:rPr lang="en-US" smtClean="0"/>
-              <a:t>1/21/2017</a:t>
+              <a:t>3/12/2017</a:t>
             </a:fld>
             <a:endParaRPr lang="en-US"/>
           </a:p>
@@ -7702,7 +7708,7 @@
           <a:p>
             <a:fld id="{699DC775-C286-4358-8C92-D7E584E969B3}" type="datetimeFigureOut">
               <a:rPr lang="en-US" smtClean="0"/>
-              <a:t>1/21/2017</a:t>
+              <a:t>3/12/2017</a:t>
             </a:fld>
             <a:endParaRPr lang="en-US"/>
           </a:p>
@@ -7955,7 +7961,7 @@
           <a:p>
             <a:fld id="{699DC775-C286-4358-8C92-D7E584E969B3}" type="datetimeFigureOut">
               <a:rPr lang="en-US" smtClean="0"/>
-              <a:t>1/21/2017</a:t>
+              <a:t>3/12/2017</a:t>
             </a:fld>
             <a:endParaRPr lang="en-US"/>
           </a:p>
@@ -8168,7 +8174,7 @@
           <a:p>
             <a:fld id="{699DC775-C286-4358-8C92-D7E584E969B3}" type="datetimeFigureOut">
               <a:rPr lang="en-US" smtClean="0"/>
-              <a:t>1/21/2017</a:t>
+              <a:t>3/12/2017</a:t>
             </a:fld>
             <a:endParaRPr lang="en-US"/>
           </a:p>
@@ -8683,7 +8689,7 @@
           <a:p>
             <a:fld id="{699DC775-C286-4358-8C92-D7E584E969B3}" type="datetimeFigureOut">
               <a:rPr lang="en-US" smtClean="0"/>
-              <a:t>1/21/2017</a:t>
+              <a:t>3/12/2017</a:t>
             </a:fld>
             <a:endParaRPr lang="en-US"/>
           </a:p>
@@ -9196,7 +9202,7 @@
           <a:p>
             <a:fld id="{699DC775-C286-4358-8C92-D7E584E969B3}" type="datetimeFigureOut">
               <a:rPr lang="en-US" smtClean="0"/>
-              <a:t>1/21/2017</a:t>
+              <a:t>3/12/2017</a:t>
             </a:fld>
             <a:endParaRPr lang="en-US"/>
           </a:p>
@@ -11165,7 +11171,7 @@
           <p:nvPr/>
         </p:nvPicPr>
         <p:blipFill rotWithShape="1">
-          <a:blip r:embed="rId2" r:link="rId3">
+          <a:blip r:embed="rId2">
             <a:extLst>
               <a:ext uri="{28A0092B-C50C-407E-A947-70E740481C1C}">
                 <a14:useLocalDpi xmlns:a14="http://schemas.microsoft.com/office/drawing/2010/main" val="0"/>
@@ -11194,7 +11200,7 @@
           <p:nvPr/>
         </p:nvPicPr>
         <p:blipFill rotWithShape="1">
-          <a:blip r:embed="rId2" r:link="rId3">
+          <a:blip r:embed="rId3">
             <a:extLst>
               <a:ext uri="{28A0092B-C50C-407E-A947-70E740481C1C}">
                 <a14:useLocalDpi xmlns:a14="http://schemas.microsoft.com/office/drawing/2010/main" val="0"/>
@@ -11223,7 +11229,7 @@
           <p:nvPr/>
         </p:nvPicPr>
         <p:blipFill rotWithShape="1">
-          <a:blip r:embed="rId2" r:link="rId3">
+          <a:blip r:embed="rId4">
             <a:extLst>
               <a:ext uri="{28A0092B-C50C-407E-A947-70E740481C1C}">
                 <a14:useLocalDpi xmlns:a14="http://schemas.microsoft.com/office/drawing/2010/main" val="0"/>
@@ -11252,7 +11258,7 @@
           <p:nvPr/>
         </p:nvPicPr>
         <p:blipFill rotWithShape="1">
-          <a:blip r:embed="rId2" r:link="rId3">
+          <a:blip r:embed="rId5">
             <a:extLst>
               <a:ext uri="{28A0092B-C50C-407E-A947-70E740481C1C}">
                 <a14:useLocalDpi xmlns:a14="http://schemas.microsoft.com/office/drawing/2010/main" val="0"/>
@@ -11305,7 +11311,7 @@
     </p:spTree>
     <p:extLst>
       <p:ext uri="{BB962C8B-B14F-4D97-AF65-F5344CB8AC3E}">
-        <p14:creationId xmlns:p14="http://schemas.microsoft.com/office/powerpoint/2010/main" val="1913838108"/>
+        <p14:creationId xmlns:p14="http://schemas.microsoft.com/office/powerpoint/2010/main" val="2070176171"/>
       </p:ext>
     </p:extLst>
   </p:cSld>
@@ -11349,7 +11355,7 @@
           <a:p>
             <a:r>
               <a:rPr lang="en-US" dirty="0" smtClean="0"/>
-              <a:t>Auto Crop:: non-picture selected</a:t>
+              <a:t>Auto Crop:: multiple shapes rotated</a:t>
             </a:r>
             <a:endParaRPr lang="en-SG" dirty="0"/>
           </a:p>
@@ -11370,10 +11376,6 @@
           <a:bodyPr/>
           <a:lstStyle/>
           <a:p>
-            <a:r>
-              <a:rPr lang="en-SG" dirty="0" smtClean="0"/>
-              <a:t>Gives error message</a:t>
-            </a:r>
             <a:endParaRPr lang="en-SG" dirty="0"/>
           </a:p>
         </p:txBody>
@@ -11381,7 +11383,7 @@
     </p:spTree>
     <p:extLst>
       <p:ext uri="{BB962C8B-B14F-4D97-AF65-F5344CB8AC3E}">
-        <p14:creationId xmlns:p14="http://schemas.microsoft.com/office/powerpoint/2010/main" val="222051412"/>
+        <p14:creationId xmlns:p14="http://schemas.microsoft.com/office/powerpoint/2010/main" val="1042912398"/>
       </p:ext>
     </p:extLst>
   </p:cSld>
@@ -11410,14 +11412,14 @@
       </p:grpSpPr>
       <p:sp>
         <p:nvSpPr>
-          <p:cNvPr id="2" name="selectMe"/>
+          <p:cNvPr id="2" name="selectMe4"/>
           <p:cNvSpPr/>
           <p:nvPr/>
         </p:nvSpPr>
         <p:spPr>
-          <a:xfrm>
-            <a:off x="2514600" y="1828800"/>
-            <a:ext cx="2971800" cy="2209800"/>
+          <a:xfrm rot="19387656">
+            <a:off x="2643164" y="-2070185"/>
+            <a:ext cx="4611369" cy="3368511"/>
           </a:xfrm>
           <a:prstGeom prst="rect">
             <a:avLst/>
@@ -11448,10 +11450,130 @@
           </a:p>
         </p:txBody>
       </p:sp>
+      <p:sp>
+        <p:nvSpPr>
+          <p:cNvPr id="7" name="selectMe3"/>
+          <p:cNvSpPr/>
+          <p:nvPr/>
+        </p:nvSpPr>
+        <p:spPr>
+          <a:xfrm rot="19387656">
+            <a:off x="-1812786" y="1275197"/>
+            <a:ext cx="4611369" cy="3368511"/>
+          </a:xfrm>
+          <a:prstGeom prst="rect">
+            <a:avLst/>
+          </a:prstGeom>
+        </p:spPr>
+        <p:style>
+          <a:lnRef idx="2">
+            <a:schemeClr val="accent1">
+              <a:shade val="50000"/>
+            </a:schemeClr>
+          </a:lnRef>
+          <a:fillRef idx="1">
+            <a:schemeClr val="accent1"/>
+          </a:fillRef>
+          <a:effectRef idx="0">
+            <a:schemeClr val="accent1"/>
+          </a:effectRef>
+          <a:fontRef idx="minor">
+            <a:schemeClr val="lt1"/>
+          </a:fontRef>
+        </p:style>
+        <p:txBody>
+          <a:bodyPr rtlCol="0" anchor="ctr"/>
+          <a:lstStyle/>
+          <a:p>
+            <a:pPr algn="ctr"/>
+            <a:endParaRPr lang="en-SG"/>
+          </a:p>
+        </p:txBody>
+      </p:sp>
+      <p:sp>
+        <p:nvSpPr>
+          <p:cNvPr id="8" name="selectMe2"/>
+          <p:cNvSpPr/>
+          <p:nvPr/>
+        </p:nvSpPr>
+        <p:spPr>
+          <a:xfrm rot="19387656">
+            <a:off x="5654816" y="1579996"/>
+            <a:ext cx="4611369" cy="3368511"/>
+          </a:xfrm>
+          <a:prstGeom prst="rect">
+            <a:avLst/>
+          </a:prstGeom>
+        </p:spPr>
+        <p:style>
+          <a:lnRef idx="2">
+            <a:schemeClr val="accent1">
+              <a:shade val="50000"/>
+            </a:schemeClr>
+          </a:lnRef>
+          <a:fillRef idx="1">
+            <a:schemeClr val="accent1"/>
+          </a:fillRef>
+          <a:effectRef idx="0">
+            <a:schemeClr val="accent1"/>
+          </a:effectRef>
+          <a:fontRef idx="minor">
+            <a:schemeClr val="lt1"/>
+          </a:fontRef>
+        </p:style>
+        <p:txBody>
+          <a:bodyPr rtlCol="0" anchor="ctr"/>
+          <a:lstStyle/>
+          <a:p>
+            <a:pPr algn="ctr"/>
+            <a:endParaRPr lang="en-SG"/>
+          </a:p>
+        </p:txBody>
+      </p:sp>
+      <p:sp>
+        <p:nvSpPr>
+          <p:cNvPr id="9" name="selectMe1"/>
+          <p:cNvSpPr/>
+          <p:nvPr/>
+        </p:nvSpPr>
+        <p:spPr>
+          <a:xfrm rot="19387656">
+            <a:off x="1235215" y="4925379"/>
+            <a:ext cx="4611369" cy="3368511"/>
+          </a:xfrm>
+          <a:prstGeom prst="rect">
+            <a:avLst/>
+          </a:prstGeom>
+        </p:spPr>
+        <p:style>
+          <a:lnRef idx="2">
+            <a:schemeClr val="accent1">
+              <a:shade val="50000"/>
+            </a:schemeClr>
+          </a:lnRef>
+          <a:fillRef idx="1">
+            <a:schemeClr val="accent1"/>
+          </a:fillRef>
+          <a:effectRef idx="0">
+            <a:schemeClr val="accent1"/>
+          </a:effectRef>
+          <a:fontRef idx="minor">
+            <a:schemeClr val="lt1"/>
+          </a:fontRef>
+        </p:style>
+        <p:txBody>
+          <a:bodyPr rtlCol="0" anchor="ctr"/>
+          <a:lstStyle/>
+          <a:p>
+            <a:pPr algn="ctr"/>
+            <a:endParaRPr lang="en-SG"/>
+          </a:p>
+        </p:txBody>
+      </p:sp>
     </p:spTree>
     <p:extLst>
       <p:ext uri="{BB962C8B-B14F-4D97-AF65-F5344CB8AC3E}">
-        <p14:creationId xmlns:p14="http://schemas.microsoft.com/office/powerpoint/2010/main" val="619584222"/>
+        <p14:creationId xmlns:p14="http://schemas.microsoft.com/office/powerpoint/2010/main" val="3288374396"/>
       </p:ext>
     </p:extLst>
   </p:cSld>
@@ -11480,6 +11602,317 @@
       </p:grpSpPr>
       <p:sp>
         <p:nvSpPr>
+          <p:cNvPr id="6" name="text"/>
+          <p:cNvSpPr txBox="1"/>
+          <p:nvPr/>
+        </p:nvSpPr>
+        <p:spPr>
+          <a:xfrm>
+            <a:off x="8101022" y="0"/>
+            <a:ext cx="1042978" cy="369332"/>
+          </a:xfrm>
+          <a:prstGeom prst="rect">
+            <a:avLst/>
+          </a:prstGeom>
+          <a:noFill/>
+        </p:spPr>
+        <p:txBody>
+          <a:bodyPr wrap="none" rtlCol="0">
+            <a:spAutoFit/>
+          </a:bodyPr>
+          <a:lstStyle/>
+          <a:p>
+            <a:r>
+              <a:rPr lang="en-SG" dirty="0" smtClean="0"/>
+              <a:t>Expected</a:t>
+            </a:r>
+            <a:endParaRPr lang="en-SG" dirty="0"/>
+          </a:p>
+        </p:txBody>
+      </p:sp>
+      <p:pic>
+        <p:nvPicPr>
+          <p:cNvPr id="3" name="selectMe4"/>
+          <p:cNvPicPr>
+            <a:picLocks/>
+          </p:cNvPicPr>
+          <p:nvPr/>
+        </p:nvPicPr>
+        <p:blipFill rotWithShape="1">
+          <a:blip r:embed="rId2">
+            <a:extLst>
+              <a:ext uri="{28A0092B-C50C-407E-A947-70E740481C1C}">
+                <a14:useLocalDpi xmlns:a14="http://schemas.microsoft.com/office/drawing/2010/main" val="0"/>
+              </a:ext>
+            </a:extLst>
+          </a:blip>
+          <a:srcRect t="57066"/>
+          <a:stretch/>
+        </p:blipFill>
+        <p:spPr>
+          <a:xfrm>
+            <a:off x="2093749" y="0"/>
+            <a:ext cx="5710199" cy="2344922"/>
+          </a:xfrm>
+          <a:prstGeom prst="rect">
+            <a:avLst/>
+          </a:prstGeom>
+        </p:spPr>
+      </p:pic>
+      <p:pic>
+        <p:nvPicPr>
+          <p:cNvPr id="4" name="selectMe3"/>
+          <p:cNvPicPr>
+            <a:picLocks/>
+          </p:cNvPicPr>
+          <p:nvPr/>
+        </p:nvPicPr>
+        <p:blipFill rotWithShape="1">
+          <a:blip r:embed="rId3">
+            <a:extLst>
+              <a:ext uri="{28A0092B-C50C-407E-A947-70E740481C1C}">
+                <a14:useLocalDpi xmlns:a14="http://schemas.microsoft.com/office/drawing/2010/main" val="0"/>
+              </a:ext>
+            </a:extLst>
+          </a:blip>
+          <a:srcRect l="41368"/>
+          <a:stretch/>
+        </p:blipFill>
+        <p:spPr>
+          <a:xfrm>
+            <a:off x="0" y="228601"/>
+            <a:ext cx="3347998" cy="5461703"/>
+          </a:xfrm>
+          <a:prstGeom prst="rect">
+            <a:avLst/>
+          </a:prstGeom>
+        </p:spPr>
+      </p:pic>
+      <p:pic>
+        <p:nvPicPr>
+          <p:cNvPr id="5" name="selectMe1"/>
+          <p:cNvPicPr>
+            <a:picLocks/>
+          </p:cNvPicPr>
+          <p:nvPr/>
+        </p:nvPicPr>
+        <p:blipFill rotWithShape="1">
+          <a:blip r:embed="rId4">
+            <a:extLst>
+              <a:ext uri="{28A0092B-C50C-407E-A947-70E740481C1C}">
+                <a14:useLocalDpi xmlns:a14="http://schemas.microsoft.com/office/drawing/2010/main" val="0"/>
+              </a:ext>
+            </a:extLst>
+          </a:blip>
+          <a:srcRect b="45452"/>
+          <a:stretch/>
+        </p:blipFill>
+        <p:spPr>
+          <a:xfrm>
+            <a:off x="685800" y="3878783"/>
+            <a:ext cx="5710199" cy="2979217"/>
+          </a:xfrm>
+          <a:prstGeom prst="rect">
+            <a:avLst/>
+          </a:prstGeom>
+        </p:spPr>
+      </p:pic>
+      <p:pic>
+        <p:nvPicPr>
+          <p:cNvPr id="10" name="selectMe2"/>
+          <p:cNvPicPr>
+            <a:picLocks/>
+          </p:cNvPicPr>
+          <p:nvPr/>
+        </p:nvPicPr>
+        <p:blipFill rotWithShape="1">
+          <a:blip r:embed="rId5">
+            <a:extLst>
+              <a:ext uri="{28A0092B-C50C-407E-A947-70E740481C1C}">
+                <a14:useLocalDpi xmlns:a14="http://schemas.microsoft.com/office/drawing/2010/main" val="0"/>
+              </a:ext>
+            </a:extLst>
+          </a:blip>
+          <a:srcRect r="29274"/>
+          <a:stretch/>
+        </p:blipFill>
+        <p:spPr>
+          <a:xfrm>
+            <a:off x="5105401" y="533400"/>
+            <a:ext cx="4038598" cy="5461703"/>
+          </a:xfrm>
+          <a:prstGeom prst="rect">
+            <a:avLst/>
+          </a:prstGeom>
+        </p:spPr>
+      </p:pic>
+    </p:spTree>
+    <p:extLst>
+      <p:ext uri="{BB962C8B-B14F-4D97-AF65-F5344CB8AC3E}">
+        <p14:creationId xmlns:p14="http://schemas.microsoft.com/office/powerpoint/2010/main" val="1208042629"/>
+      </p:ext>
+    </p:extLst>
+  </p:cSld>
+  <p:clrMapOvr>
+    <a:masterClrMapping/>
+  </p:clrMapOvr>
+</p:sld>
+</file>
+
+<file path=ppt/slides/slide27.xml><?xml version="1.0" encoding="utf-8"?>
+<p:sld xmlns:a="http://schemas.openxmlformats.org/drawingml/2006/main" xmlns:r="http://schemas.openxmlformats.org/officeDocument/2006/relationships" xmlns:p="http://schemas.openxmlformats.org/presentationml/2006/main">
+  <p:cSld>
+    <p:spTree>
+      <p:nvGrpSpPr>
+        <p:cNvPr id="1" name=""/>
+        <p:cNvGrpSpPr/>
+        <p:nvPr/>
+      </p:nvGrpSpPr>
+      <p:grpSpPr>
+        <a:xfrm>
+          <a:off x="0" y="0"/>
+          <a:ext cx="0" cy="0"/>
+          <a:chOff x="0" y="0"/>
+          <a:chExt cx="0" cy="0"/>
+        </a:xfrm>
+      </p:grpSpPr>
+      <p:sp>
+        <p:nvSpPr>
+          <p:cNvPr id="2" name="Title 1"/>
+          <p:cNvSpPr>
+            <a:spLocks noGrp="1"/>
+          </p:cNvSpPr>
+          <p:nvPr>
+            <p:ph type="title"/>
+          </p:nvPr>
+        </p:nvSpPr>
+        <p:spPr/>
+        <p:txBody>
+          <a:bodyPr/>
+          <a:lstStyle/>
+          <a:p>
+            <a:r>
+              <a:rPr lang="en-US" dirty="0" smtClean="0"/>
+              <a:t>Auto Crop:: non-picture/shape selected</a:t>
+            </a:r>
+            <a:endParaRPr lang="en-SG" dirty="0"/>
+          </a:p>
+        </p:txBody>
+      </p:sp>
+      <p:sp>
+        <p:nvSpPr>
+          <p:cNvPr id="3" name="Content Placeholder 2"/>
+          <p:cNvSpPr>
+            <a:spLocks noGrp="1"/>
+          </p:cNvSpPr>
+          <p:nvPr>
+            <p:ph idx="1"/>
+          </p:nvPr>
+        </p:nvSpPr>
+        <p:spPr/>
+        <p:txBody>
+          <a:bodyPr/>
+          <a:lstStyle/>
+          <a:p>
+            <a:r>
+              <a:rPr lang="en-SG" dirty="0" smtClean="0"/>
+              <a:t>Gives error message</a:t>
+            </a:r>
+            <a:endParaRPr lang="en-SG" dirty="0"/>
+          </a:p>
+        </p:txBody>
+      </p:sp>
+    </p:spTree>
+    <p:extLst>
+      <p:ext uri="{BB962C8B-B14F-4D97-AF65-F5344CB8AC3E}">
+        <p14:creationId xmlns:p14="http://schemas.microsoft.com/office/powerpoint/2010/main" val="222051412"/>
+      </p:ext>
+    </p:extLst>
+  </p:cSld>
+  <p:clrMapOvr>
+    <a:masterClrMapping/>
+  </p:clrMapOvr>
+</p:sld>
+</file>
+
+<file path=ppt/slides/slide28.xml><?xml version="1.0" encoding="utf-8"?>
+<p:sld xmlns:a="http://schemas.openxmlformats.org/drawingml/2006/main" xmlns:r="http://schemas.openxmlformats.org/officeDocument/2006/relationships" xmlns:p="http://schemas.openxmlformats.org/presentationml/2006/main">
+  <p:cSld>
+    <p:spTree>
+      <p:nvGrpSpPr>
+        <p:cNvPr id="1" name=""/>
+        <p:cNvGrpSpPr/>
+        <p:nvPr/>
+      </p:nvGrpSpPr>
+      <p:grpSpPr>
+        <a:xfrm>
+          <a:off x="0" y="0"/>
+          <a:ext cx="0" cy="0"/>
+          <a:chOff x="0" y="0"/>
+          <a:chExt cx="0" cy="0"/>
+        </a:xfrm>
+      </p:grpSpPr>
+      <p:sp>
+        <p:nvSpPr>
+          <p:cNvPr id="4" name="selectMe"/>
+          <p:cNvSpPr txBox="1"/>
+          <p:nvPr/>
+        </p:nvSpPr>
+        <p:spPr>
+          <a:xfrm>
+            <a:off x="3276600" y="2438400"/>
+            <a:ext cx="3150799" cy="369332"/>
+          </a:xfrm>
+          <a:prstGeom prst="rect">
+            <a:avLst/>
+          </a:prstGeom>
+          <a:noFill/>
+        </p:spPr>
+        <p:txBody>
+          <a:bodyPr wrap="none" rtlCol="0">
+            <a:spAutoFit/>
+          </a:bodyPr>
+          <a:lstStyle/>
+          <a:p>
+            <a:r>
+              <a:rPr lang="en-SG" dirty="0" smtClean="0"/>
+              <a:t>Some non-picture/shape object</a:t>
+            </a:r>
+          </a:p>
+        </p:txBody>
+      </p:sp>
+    </p:spTree>
+    <p:extLst>
+      <p:ext uri="{BB962C8B-B14F-4D97-AF65-F5344CB8AC3E}">
+        <p14:creationId xmlns:p14="http://schemas.microsoft.com/office/powerpoint/2010/main" val="619584222"/>
+      </p:ext>
+    </p:extLst>
+  </p:cSld>
+  <p:clrMapOvr>
+    <a:masterClrMapping/>
+  </p:clrMapOvr>
+</p:sld>
+</file>
+
+<file path=ppt/slides/slide29.xml><?xml version="1.0" encoding="utf-8"?>
+<p:sld xmlns:a="http://schemas.openxmlformats.org/drawingml/2006/main" xmlns:r="http://schemas.openxmlformats.org/officeDocument/2006/relationships" xmlns:p="http://schemas.openxmlformats.org/presentationml/2006/main">
+  <p:cSld>
+    <p:spTree>
+      <p:nvGrpSpPr>
+        <p:cNvPr id="1" name=""/>
+        <p:cNvGrpSpPr/>
+        <p:nvPr/>
+      </p:nvGrpSpPr>
+      <p:grpSpPr>
+        <a:xfrm>
+          <a:off x="0" y="0"/>
+          <a:ext cx="0" cy="0"/>
+          <a:chOff x="0" y="0"/>
+          <a:chExt cx="0" cy="0"/>
+        </a:xfrm>
+      </p:grpSpPr>
+      <p:sp>
+        <p:nvSpPr>
           <p:cNvPr id="2" name="Title 1"/>
           <p:cNvSpPr>
             <a:spLocks noGrp="1"/>
@@ -11539,7 +11972,79 @@
 </p:sld>
 </file>
 
-<file path=ppt/slides/slide27.xml><?xml version="1.0" encoding="utf-8"?>
+<file path=ppt/slides/slide3.xml><?xml version="1.0" encoding="utf-8"?>
+<p:sld xmlns:a="http://schemas.openxmlformats.org/drawingml/2006/main" xmlns:r="http://schemas.openxmlformats.org/officeDocument/2006/relationships" xmlns:p="http://schemas.openxmlformats.org/presentationml/2006/main">
+  <p:cSld>
+    <p:spTree>
+      <p:nvGrpSpPr>
+        <p:cNvPr id="1" name=""/>
+        <p:cNvGrpSpPr/>
+        <p:nvPr/>
+      </p:nvGrpSpPr>
+      <p:grpSpPr>
+        <a:xfrm>
+          <a:off x="0" y="0"/>
+          <a:ext cx="0" cy="0"/>
+          <a:chOff x="0" y="0"/>
+          <a:chExt cx="0" cy="0"/>
+        </a:xfrm>
+      </p:grpSpPr>
+      <p:sp>
+        <p:nvSpPr>
+          <p:cNvPr id="2" name="Title 1"/>
+          <p:cNvSpPr>
+            <a:spLocks noGrp="1"/>
+          </p:cNvSpPr>
+          <p:nvPr>
+            <p:ph type="title"/>
+          </p:nvPr>
+        </p:nvSpPr>
+        <p:spPr/>
+        <p:txBody>
+          <a:bodyPr/>
+          <a:lstStyle/>
+          <a:p>
+            <a:r>
+              <a:rPr lang="en-US" dirty="0" smtClean="0"/>
+              <a:t>Auto Crop:: picture in slide</a:t>
+            </a:r>
+            <a:endParaRPr lang="en-SG" dirty="0"/>
+          </a:p>
+        </p:txBody>
+      </p:sp>
+      <p:sp>
+        <p:nvSpPr>
+          <p:cNvPr id="3" name="Content Placeholder 2"/>
+          <p:cNvSpPr>
+            <a:spLocks noGrp="1"/>
+          </p:cNvSpPr>
+          <p:nvPr>
+            <p:ph idx="1"/>
+          </p:nvPr>
+        </p:nvSpPr>
+        <p:spPr/>
+        <p:txBody>
+          <a:bodyPr/>
+          <a:lstStyle/>
+          <a:p>
+            <a:endParaRPr lang="en-SG" dirty="0"/>
+          </a:p>
+        </p:txBody>
+      </p:sp>
+    </p:spTree>
+    <p:extLst>
+      <p:ext uri="{BB962C8B-B14F-4D97-AF65-F5344CB8AC3E}">
+        <p14:creationId xmlns:p14="http://schemas.microsoft.com/office/powerpoint/2010/main" val="1286891872"/>
+      </p:ext>
+    </p:extLst>
+  </p:cSld>
+  <p:clrMapOvr>
+    <a:masterClrMapping/>
+  </p:clrMapOvr>
+</p:sld>
+</file>
+
+<file path=ppt/slides/slide30.xml><?xml version="1.0" encoding="utf-8"?>
 <p:sld xmlns:a="http://schemas.openxmlformats.org/drawingml/2006/main" xmlns:r="http://schemas.openxmlformats.org/officeDocument/2006/relationships" xmlns:p="http://schemas.openxmlformats.org/presentationml/2006/main">
   <p:cSld>
     <p:spTree>
@@ -11569,7 +12074,7 @@
 </p:sld>
 </file>
 
-<file path=ppt/slides/slide28.xml><?xml version="1.0" encoding="utf-8"?>
+<file path=ppt/slides/slide31.xml><?xml version="1.0" encoding="utf-8"?>
 <p:sld xmlns:a="http://schemas.openxmlformats.org/drawingml/2006/main" xmlns:r="http://schemas.openxmlformats.org/officeDocument/2006/relationships" xmlns:p="http://schemas.openxmlformats.org/presentationml/2006/main" show="0">
   <p:cSld>
     <p:spTree>
@@ -11659,78 +12164,6 @@
       </p:par>
     </p:tnLst>
   </p:timing>
-</p:sld>
-</file>
-
-<file path=ppt/slides/slide3.xml><?xml version="1.0" encoding="utf-8"?>
-<p:sld xmlns:a="http://schemas.openxmlformats.org/drawingml/2006/main" xmlns:r="http://schemas.openxmlformats.org/officeDocument/2006/relationships" xmlns:p="http://schemas.openxmlformats.org/presentationml/2006/main">
-  <p:cSld>
-    <p:spTree>
-      <p:nvGrpSpPr>
-        <p:cNvPr id="1" name=""/>
-        <p:cNvGrpSpPr/>
-        <p:nvPr/>
-      </p:nvGrpSpPr>
-      <p:grpSpPr>
-        <a:xfrm>
-          <a:off x="0" y="0"/>
-          <a:ext cx="0" cy="0"/>
-          <a:chOff x="0" y="0"/>
-          <a:chExt cx="0" cy="0"/>
-        </a:xfrm>
-      </p:grpSpPr>
-      <p:sp>
-        <p:nvSpPr>
-          <p:cNvPr id="2" name="Title 1"/>
-          <p:cNvSpPr>
-            <a:spLocks noGrp="1"/>
-          </p:cNvSpPr>
-          <p:nvPr>
-            <p:ph type="title"/>
-          </p:nvPr>
-        </p:nvSpPr>
-        <p:spPr/>
-        <p:txBody>
-          <a:bodyPr/>
-          <a:lstStyle/>
-          <a:p>
-            <a:r>
-              <a:rPr lang="en-US" dirty="0" smtClean="0"/>
-              <a:t>Auto Crop:: picture in slide</a:t>
-            </a:r>
-            <a:endParaRPr lang="en-SG" dirty="0"/>
-          </a:p>
-        </p:txBody>
-      </p:sp>
-      <p:sp>
-        <p:nvSpPr>
-          <p:cNvPr id="3" name="Content Placeholder 2"/>
-          <p:cNvSpPr>
-            <a:spLocks noGrp="1"/>
-          </p:cNvSpPr>
-          <p:nvPr>
-            <p:ph idx="1"/>
-          </p:nvPr>
-        </p:nvSpPr>
-        <p:spPr/>
-        <p:txBody>
-          <a:bodyPr/>
-          <a:lstStyle/>
-          <a:p>
-            <a:endParaRPr lang="en-SG" dirty="0"/>
-          </a:p>
-        </p:txBody>
-      </p:sp>
-    </p:spTree>
-    <p:extLst>
-      <p:ext uri="{BB962C8B-B14F-4D97-AF65-F5344CB8AC3E}">
-        <p14:creationId xmlns:p14="http://schemas.microsoft.com/office/powerpoint/2010/main" val="1286891872"/>
-      </p:ext>
-    </p:extLst>
-  </p:cSld>
-  <p:clrMapOvr>
-    <a:masterClrMapping/>
-  </p:clrMapOvr>
 </p:sld>
 </file>
 

</xml_diff>

<commit_message>
Give an informative message when no cropping was done #1219, #1181 (#1226)
* Add error message for image not crossing boundary

* Add error message for image not crossing boundary

* Crop to same dimension error message

* Remove unneeded return statements
</commit_message>
<xml_diff>
--- a/doc/test/CropToSlide.pptx
+++ b/doc/test/CropToSlide.pptx
@@ -7,40 +7,39 @@
     <p:sldMasterId id="2147483672" r:id="rId3"/>
   </p:sldMasterIdLst>
   <p:notesMasterIdLst>
-    <p:notesMasterId r:id="rId35"/>
+    <p:notesMasterId r:id="rId34"/>
   </p:notesMasterIdLst>
   <p:sldIdLst>
     <p:sldId id="287" r:id="rId4"/>
     <p:sldId id="256" r:id="rId5"/>
-    <p:sldId id="292" r:id="rId6"/>
-    <p:sldId id="293" r:id="rId7"/>
-    <p:sldId id="308" r:id="rId8"/>
-    <p:sldId id="296" r:id="rId9"/>
-    <p:sldId id="310" r:id="rId10"/>
-    <p:sldId id="311" r:id="rId11"/>
-    <p:sldId id="305" r:id="rId12"/>
-    <p:sldId id="312" r:id="rId13"/>
-    <p:sldId id="319" r:id="rId14"/>
-    <p:sldId id="317" r:id="rId15"/>
-    <p:sldId id="315" r:id="rId16"/>
-    <p:sldId id="342" r:id="rId17"/>
-    <p:sldId id="321" r:id="rId18"/>
-    <p:sldId id="323" r:id="rId19"/>
-    <p:sldId id="343" r:id="rId20"/>
-    <p:sldId id="325" r:id="rId21"/>
-    <p:sldId id="326" r:id="rId22"/>
-    <p:sldId id="340" r:id="rId23"/>
-    <p:sldId id="328" r:id="rId24"/>
-    <p:sldId id="329" r:id="rId25"/>
-    <p:sldId id="344" r:id="rId26"/>
-    <p:sldId id="347" r:id="rId27"/>
-    <p:sldId id="346" r:id="rId28"/>
-    <p:sldId id="348" r:id="rId29"/>
-    <p:sldId id="331" r:id="rId30"/>
-    <p:sldId id="332" r:id="rId31"/>
-    <p:sldId id="333" r:id="rId32"/>
-    <p:sldId id="334" r:id="rId33"/>
-    <p:sldId id="318" r:id="rId34"/>
+    <p:sldId id="296" r:id="rId6"/>
+    <p:sldId id="310" r:id="rId7"/>
+    <p:sldId id="311" r:id="rId8"/>
+    <p:sldId id="305" r:id="rId9"/>
+    <p:sldId id="312" r:id="rId10"/>
+    <p:sldId id="319" r:id="rId11"/>
+    <p:sldId id="317" r:id="rId12"/>
+    <p:sldId id="315" r:id="rId13"/>
+    <p:sldId id="342" r:id="rId14"/>
+    <p:sldId id="321" r:id="rId15"/>
+    <p:sldId id="323" r:id="rId16"/>
+    <p:sldId id="343" r:id="rId17"/>
+    <p:sldId id="325" r:id="rId18"/>
+    <p:sldId id="326" r:id="rId19"/>
+    <p:sldId id="340" r:id="rId20"/>
+    <p:sldId id="328" r:id="rId21"/>
+    <p:sldId id="329" r:id="rId22"/>
+    <p:sldId id="344" r:id="rId23"/>
+    <p:sldId id="347" r:id="rId24"/>
+    <p:sldId id="346" r:id="rId25"/>
+    <p:sldId id="348" r:id="rId26"/>
+    <p:sldId id="331" r:id="rId27"/>
+    <p:sldId id="332" r:id="rId28"/>
+    <p:sldId id="333" r:id="rId29"/>
+    <p:sldId id="334" r:id="rId30"/>
+    <p:sldId id="349" r:id="rId31"/>
+    <p:sldId id="352" r:id="rId32"/>
+    <p:sldId id="318" r:id="rId33"/>
   </p:sldIdLst>
   <p:sldSz cx="9144000" cy="6858000" type="screen4x3"/>
   <p:notesSz cx="6858000" cy="9144000"/>
@@ -150,9 +149,6 @@
         <p14:section name="AutoCrop" id="{A3A2B0AB-762C-4281-AA7B-EF7E134E0DC4}">
           <p14:sldIdLst>
             <p14:sldId id="256"/>
-            <p14:sldId id="292"/>
-            <p14:sldId id="293"/>
-            <p14:sldId id="308"/>
             <p14:sldId id="296"/>
             <p14:sldId id="310"/>
             <p14:sldId id="311"/>
@@ -178,6 +174,8 @@
             <p14:sldId id="332"/>
             <p14:sldId id="333"/>
             <p14:sldId id="334"/>
+            <p14:sldId id="349"/>
+            <p14:sldId id="352"/>
             <p14:sldId id="318"/>
           </p14:sldIdLst>
         </p14:section>
@@ -283,7 +281,7 @@
           <a:p>
             <a:fld id="{26004F41-C1A1-4B0D-9EEE-5E3F0E5BC108}" type="datetimeFigureOut">
               <a:rPr lang="en-SG" smtClean="0"/>
-              <a:t>3/12/2017</a:t>
+              <a:t>3/20/2017</a:t>
             </a:fld>
             <a:endParaRPr lang="en-SG"/>
           </a:p>
@@ -347,35 +345,35 @@
           <a:p>
             <a:pPr lvl="0"/>
             <a:r>
-              <a:rPr lang="zh-CN" altLang="en-US" smtClean="0"/>
+              <a:rPr lang="zh-CN" altLang="en-US"/>
               <a:t>单击此处编辑母版文本样式</a:t>
             </a:r>
           </a:p>
           <a:p>
             <a:pPr lvl="1"/>
             <a:r>
-              <a:rPr lang="zh-CN" altLang="en-US" smtClean="0"/>
+              <a:rPr lang="zh-CN" altLang="en-US"/>
               <a:t>第二级</a:t>
             </a:r>
           </a:p>
           <a:p>
             <a:pPr lvl="2"/>
             <a:r>
-              <a:rPr lang="zh-CN" altLang="en-US" smtClean="0"/>
+              <a:rPr lang="zh-CN" altLang="en-US"/>
               <a:t>第三级</a:t>
             </a:r>
           </a:p>
           <a:p>
             <a:pPr lvl="3"/>
             <a:r>
-              <a:rPr lang="zh-CN" altLang="en-US" smtClean="0"/>
+              <a:rPr lang="zh-CN" altLang="en-US"/>
               <a:t>第四级</a:t>
             </a:r>
           </a:p>
           <a:p>
             <a:pPr lvl="4"/>
             <a:r>
-              <a:rPr lang="zh-CN" altLang="en-US" smtClean="0"/>
+              <a:rPr lang="zh-CN" altLang="en-US"/>
               <a:t>第五级</a:t>
             </a:r>
             <a:endParaRPr lang="en-SG"/>
@@ -589,10 +587,9 @@
           <a:lstStyle/>
           <a:p>
             <a:r>
-              <a:rPr lang="en-US" smtClean="0"/>
+              <a:rPr lang="en-US"/>
               <a:t>Click to edit Master title style</a:t>
             </a:r>
-            <a:endParaRPr lang="en-US"/>
           </a:p>
         </p:txBody>
       </p:sp>
@@ -708,10 +705,9 @@
           </a:lstStyle>
           <a:p>
             <a:r>
-              <a:rPr lang="en-US" smtClean="0"/>
+              <a:rPr lang="en-US"/>
               <a:t>Click to edit Master subtitle style</a:t>
             </a:r>
-            <a:endParaRPr lang="en-US"/>
           </a:p>
         </p:txBody>
       </p:sp>
@@ -732,7 +728,7 @@
           <a:p>
             <a:fld id="{699DC775-C286-4358-8C92-D7E584E969B3}" type="datetimeFigureOut">
               <a:rPr lang="en-US" smtClean="0"/>
-              <a:t>3/12/2017</a:t>
+              <a:t>3/20/2017</a:t>
             </a:fld>
             <a:endParaRPr lang="en-US"/>
           </a:p>
@@ -826,10 +822,9 @@
           <a:lstStyle/>
           <a:p>
             <a:r>
-              <a:rPr lang="en-US" smtClean="0"/>
+              <a:rPr lang="en-US"/>
               <a:t>Click to edit Master title style</a:t>
             </a:r>
-            <a:endParaRPr lang="en-US"/>
           </a:p>
         </p:txBody>
       </p:sp>
@@ -850,38 +845,37 @@
           <a:p>
             <a:pPr lvl="0"/>
             <a:r>
-              <a:rPr lang="en-US" smtClean="0"/>
+              <a:rPr lang="en-US"/>
               <a:t>Click to edit Master text styles</a:t>
             </a:r>
           </a:p>
           <a:p>
             <a:pPr lvl="1"/>
             <a:r>
-              <a:rPr lang="en-US" smtClean="0"/>
+              <a:rPr lang="en-US"/>
               <a:t>Second level</a:t>
             </a:r>
           </a:p>
           <a:p>
             <a:pPr lvl="2"/>
             <a:r>
-              <a:rPr lang="en-US" smtClean="0"/>
+              <a:rPr lang="en-US"/>
               <a:t>Third level</a:t>
             </a:r>
           </a:p>
           <a:p>
             <a:pPr lvl="3"/>
             <a:r>
-              <a:rPr lang="en-US" smtClean="0"/>
+              <a:rPr lang="en-US"/>
               <a:t>Fourth level</a:t>
             </a:r>
           </a:p>
           <a:p>
             <a:pPr lvl="4"/>
             <a:r>
-              <a:rPr lang="en-US" smtClean="0"/>
+              <a:rPr lang="en-US"/>
               <a:t>Fifth level</a:t>
             </a:r>
-            <a:endParaRPr lang="en-US"/>
           </a:p>
         </p:txBody>
       </p:sp>
@@ -902,7 +896,7 @@
           <a:p>
             <a:fld id="{699DC775-C286-4358-8C92-D7E584E969B3}" type="datetimeFigureOut">
               <a:rPr lang="en-US" smtClean="0"/>
-              <a:t>3/12/2017</a:t>
+              <a:t>3/20/2017</a:t>
             </a:fld>
             <a:endParaRPr lang="en-US"/>
           </a:p>
@@ -1001,10 +995,9 @@
           <a:lstStyle/>
           <a:p>
             <a:r>
-              <a:rPr lang="en-US" smtClean="0"/>
+              <a:rPr lang="en-US"/>
               <a:t>Click to edit Master title style</a:t>
             </a:r>
-            <a:endParaRPr lang="en-US"/>
           </a:p>
         </p:txBody>
       </p:sp>
@@ -1030,38 +1023,37 @@
           <a:p>
             <a:pPr lvl="0"/>
             <a:r>
-              <a:rPr lang="en-US" smtClean="0"/>
+              <a:rPr lang="en-US"/>
               <a:t>Click to edit Master text styles</a:t>
             </a:r>
           </a:p>
           <a:p>
             <a:pPr lvl="1"/>
             <a:r>
-              <a:rPr lang="en-US" smtClean="0"/>
+              <a:rPr lang="en-US"/>
               <a:t>Second level</a:t>
             </a:r>
           </a:p>
           <a:p>
             <a:pPr lvl="2"/>
             <a:r>
-              <a:rPr lang="en-US" smtClean="0"/>
+              <a:rPr lang="en-US"/>
               <a:t>Third level</a:t>
             </a:r>
           </a:p>
           <a:p>
             <a:pPr lvl="3"/>
             <a:r>
-              <a:rPr lang="en-US" smtClean="0"/>
+              <a:rPr lang="en-US"/>
               <a:t>Fourth level</a:t>
             </a:r>
           </a:p>
           <a:p>
             <a:pPr lvl="4"/>
             <a:r>
-              <a:rPr lang="en-US" smtClean="0"/>
+              <a:rPr lang="en-US"/>
               <a:t>Fifth level</a:t>
             </a:r>
-            <a:endParaRPr lang="en-US"/>
           </a:p>
         </p:txBody>
       </p:sp>
@@ -1082,7 +1074,7 @@
           <a:p>
             <a:fld id="{699DC775-C286-4358-8C92-D7E584E969B3}" type="datetimeFigureOut">
               <a:rPr lang="en-US" smtClean="0"/>
-              <a:t>3/12/2017</a:t>
+              <a:t>3/20/2017</a:t>
             </a:fld>
             <a:endParaRPr lang="en-US"/>
           </a:p>
@@ -1181,10 +1173,9 @@
           <a:lstStyle/>
           <a:p>
             <a:r>
-              <a:rPr lang="en-US" smtClean="0"/>
+              <a:rPr lang="en-US"/>
               <a:t>Click to edit Master title style</a:t>
             </a:r>
-            <a:endParaRPr lang="en-US"/>
           </a:p>
         </p:txBody>
       </p:sp>
@@ -1300,10 +1291,9 @@
           </a:lstStyle>
           <a:p>
             <a:r>
-              <a:rPr lang="en-US" smtClean="0"/>
+              <a:rPr lang="en-US"/>
               <a:t>Click to edit Master subtitle style</a:t>
             </a:r>
-            <a:endParaRPr lang="en-US"/>
           </a:p>
         </p:txBody>
       </p:sp>
@@ -1324,7 +1314,7 @@
           <a:p>
             <a:fld id="{699DC775-C286-4358-8C92-D7E584E969B3}" type="datetimeFigureOut">
               <a:rPr lang="en-US" smtClean="0"/>
-              <a:t>3/12/2017</a:t>
+              <a:t>3/20/2017</a:t>
             </a:fld>
             <a:endParaRPr lang="en-US"/>
           </a:p>
@@ -1418,10 +1408,9 @@
           <a:lstStyle/>
           <a:p>
             <a:r>
-              <a:rPr lang="en-US" smtClean="0"/>
+              <a:rPr lang="en-US"/>
               <a:t>Click to edit Master title style</a:t>
             </a:r>
-            <a:endParaRPr lang="en-US"/>
           </a:p>
         </p:txBody>
       </p:sp>
@@ -1442,38 +1431,37 @@
           <a:p>
             <a:pPr lvl="0"/>
             <a:r>
-              <a:rPr lang="en-US" smtClean="0"/>
+              <a:rPr lang="en-US"/>
               <a:t>Click to edit Master text styles</a:t>
             </a:r>
           </a:p>
           <a:p>
             <a:pPr lvl="1"/>
             <a:r>
-              <a:rPr lang="en-US" smtClean="0"/>
+              <a:rPr lang="en-US"/>
               <a:t>Second level</a:t>
             </a:r>
           </a:p>
           <a:p>
             <a:pPr lvl="2"/>
             <a:r>
-              <a:rPr lang="en-US" smtClean="0"/>
+              <a:rPr lang="en-US"/>
               <a:t>Third level</a:t>
             </a:r>
           </a:p>
           <a:p>
             <a:pPr lvl="3"/>
             <a:r>
-              <a:rPr lang="en-US" smtClean="0"/>
+              <a:rPr lang="en-US"/>
               <a:t>Fourth level</a:t>
             </a:r>
           </a:p>
           <a:p>
             <a:pPr lvl="4"/>
             <a:r>
-              <a:rPr lang="en-US" smtClean="0"/>
+              <a:rPr lang="en-US"/>
               <a:t>Fifth level</a:t>
             </a:r>
-            <a:endParaRPr lang="en-US"/>
           </a:p>
         </p:txBody>
       </p:sp>
@@ -1494,7 +1482,7 @@
           <a:p>
             <a:fld id="{699DC775-C286-4358-8C92-D7E584E969B3}" type="datetimeFigureOut">
               <a:rPr lang="en-US" smtClean="0"/>
-              <a:t>3/12/2017</a:t>
+              <a:t>3/20/2017</a:t>
             </a:fld>
             <a:endParaRPr lang="en-US"/>
           </a:p>
@@ -1597,10 +1585,9 @@
           </a:lstStyle>
           <a:p>
             <a:r>
-              <a:rPr lang="en-US" smtClean="0"/>
+              <a:rPr lang="en-US"/>
               <a:t>Click to edit Master title style</a:t>
             </a:r>
-            <a:endParaRPr lang="en-US"/>
           </a:p>
         </p:txBody>
       </p:sp>
@@ -1717,7 +1704,7 @@
           <a:p>
             <a:pPr lvl="0"/>
             <a:r>
-              <a:rPr lang="en-US" smtClean="0"/>
+              <a:rPr lang="en-US"/>
               <a:t>Click to edit Master text styles</a:t>
             </a:r>
           </a:p>
@@ -1740,7 +1727,7 @@
           <a:p>
             <a:fld id="{699DC775-C286-4358-8C92-D7E584E969B3}" type="datetimeFigureOut">
               <a:rPr lang="en-US" smtClean="0"/>
-              <a:t>3/12/2017</a:t>
+              <a:t>3/20/2017</a:t>
             </a:fld>
             <a:endParaRPr lang="en-US"/>
           </a:p>
@@ -1834,10 +1821,9 @@
           <a:lstStyle/>
           <a:p>
             <a:r>
-              <a:rPr lang="en-US" smtClean="0"/>
+              <a:rPr lang="en-US"/>
               <a:t>Click to edit Master title style</a:t>
             </a:r>
-            <a:endParaRPr lang="en-US"/>
           </a:p>
         </p:txBody>
       </p:sp>
@@ -1891,38 +1877,37 @@
           <a:p>
             <a:pPr lvl="0"/>
             <a:r>
-              <a:rPr lang="en-US" smtClean="0"/>
+              <a:rPr lang="en-US"/>
               <a:t>Click to edit Master text styles</a:t>
             </a:r>
           </a:p>
           <a:p>
             <a:pPr lvl="1"/>
             <a:r>
-              <a:rPr lang="en-US" smtClean="0"/>
+              <a:rPr lang="en-US"/>
               <a:t>Second level</a:t>
             </a:r>
           </a:p>
           <a:p>
             <a:pPr lvl="2"/>
             <a:r>
-              <a:rPr lang="en-US" smtClean="0"/>
+              <a:rPr lang="en-US"/>
               <a:t>Third level</a:t>
             </a:r>
           </a:p>
           <a:p>
             <a:pPr lvl="3"/>
             <a:r>
-              <a:rPr lang="en-US" smtClean="0"/>
+              <a:rPr lang="en-US"/>
               <a:t>Fourth level</a:t>
             </a:r>
           </a:p>
           <a:p>
             <a:pPr lvl="4"/>
             <a:r>
-              <a:rPr lang="en-US" smtClean="0"/>
+              <a:rPr lang="en-US"/>
               <a:t>Fifth level</a:t>
             </a:r>
-            <a:endParaRPr lang="en-US"/>
           </a:p>
         </p:txBody>
       </p:sp>
@@ -1976,38 +1961,37 @@
           <a:p>
             <a:pPr lvl="0"/>
             <a:r>
-              <a:rPr lang="en-US" smtClean="0"/>
+              <a:rPr lang="en-US"/>
               <a:t>Click to edit Master text styles</a:t>
             </a:r>
           </a:p>
           <a:p>
             <a:pPr lvl="1"/>
             <a:r>
-              <a:rPr lang="en-US" smtClean="0"/>
+              <a:rPr lang="en-US"/>
               <a:t>Second level</a:t>
             </a:r>
           </a:p>
           <a:p>
             <a:pPr lvl="2"/>
             <a:r>
-              <a:rPr lang="en-US" smtClean="0"/>
+              <a:rPr lang="en-US"/>
               <a:t>Third level</a:t>
             </a:r>
           </a:p>
           <a:p>
             <a:pPr lvl="3"/>
             <a:r>
-              <a:rPr lang="en-US" smtClean="0"/>
+              <a:rPr lang="en-US"/>
               <a:t>Fourth level</a:t>
             </a:r>
           </a:p>
           <a:p>
             <a:pPr lvl="4"/>
             <a:r>
-              <a:rPr lang="en-US" smtClean="0"/>
+              <a:rPr lang="en-US"/>
               <a:t>Fifth level</a:t>
             </a:r>
-            <a:endParaRPr lang="en-US"/>
           </a:p>
         </p:txBody>
       </p:sp>
@@ -2028,7 +2012,7 @@
           <a:p>
             <a:fld id="{699DC775-C286-4358-8C92-D7E584E969B3}" type="datetimeFigureOut">
               <a:rPr lang="en-US" smtClean="0"/>
-              <a:t>3/12/2017</a:t>
+              <a:t>3/20/2017</a:t>
             </a:fld>
             <a:endParaRPr lang="en-US"/>
           </a:p>
@@ -2126,10 +2110,9 @@
           </a:lstStyle>
           <a:p>
             <a:r>
-              <a:rPr lang="en-US" smtClean="0"/>
+              <a:rPr lang="en-US"/>
               <a:t>Click to edit Master title style</a:t>
             </a:r>
-            <a:endParaRPr lang="en-US"/>
           </a:p>
         </p:txBody>
       </p:sp>
@@ -2192,7 +2175,7 @@
           <a:p>
             <a:pPr lvl="0"/>
             <a:r>
-              <a:rPr lang="en-US" smtClean="0"/>
+              <a:rPr lang="en-US"/>
               <a:t>Click to edit Master text styles</a:t>
             </a:r>
           </a:p>
@@ -2248,38 +2231,37 @@
           <a:p>
             <a:pPr lvl="0"/>
             <a:r>
-              <a:rPr lang="en-US" smtClean="0"/>
+              <a:rPr lang="en-US"/>
               <a:t>Click to edit Master text styles</a:t>
             </a:r>
           </a:p>
           <a:p>
             <a:pPr lvl="1"/>
             <a:r>
-              <a:rPr lang="en-US" smtClean="0"/>
+              <a:rPr lang="en-US"/>
               <a:t>Second level</a:t>
             </a:r>
           </a:p>
           <a:p>
             <a:pPr lvl="2"/>
             <a:r>
-              <a:rPr lang="en-US" smtClean="0"/>
+              <a:rPr lang="en-US"/>
               <a:t>Third level</a:t>
             </a:r>
           </a:p>
           <a:p>
             <a:pPr lvl="3"/>
             <a:r>
-              <a:rPr lang="en-US" smtClean="0"/>
+              <a:rPr lang="en-US"/>
               <a:t>Fourth level</a:t>
             </a:r>
           </a:p>
           <a:p>
             <a:pPr lvl="4"/>
             <a:r>
-              <a:rPr lang="en-US" smtClean="0"/>
+              <a:rPr lang="en-US"/>
               <a:t>Fifth level</a:t>
             </a:r>
-            <a:endParaRPr lang="en-US"/>
           </a:p>
         </p:txBody>
       </p:sp>
@@ -2342,7 +2324,7 @@
           <a:p>
             <a:pPr lvl="0"/>
             <a:r>
-              <a:rPr lang="en-US" smtClean="0"/>
+              <a:rPr lang="en-US"/>
               <a:t>Click to edit Master text styles</a:t>
             </a:r>
           </a:p>
@@ -2398,38 +2380,37 @@
           <a:p>
             <a:pPr lvl="0"/>
             <a:r>
-              <a:rPr lang="en-US" smtClean="0"/>
+              <a:rPr lang="en-US"/>
               <a:t>Click to edit Master text styles</a:t>
             </a:r>
           </a:p>
           <a:p>
             <a:pPr lvl="1"/>
             <a:r>
-              <a:rPr lang="en-US" smtClean="0"/>
+              <a:rPr lang="en-US"/>
               <a:t>Second level</a:t>
             </a:r>
           </a:p>
           <a:p>
             <a:pPr lvl="2"/>
             <a:r>
-              <a:rPr lang="en-US" smtClean="0"/>
+              <a:rPr lang="en-US"/>
               <a:t>Third level</a:t>
             </a:r>
           </a:p>
           <a:p>
             <a:pPr lvl="3"/>
             <a:r>
-              <a:rPr lang="en-US" smtClean="0"/>
+              <a:rPr lang="en-US"/>
               <a:t>Fourth level</a:t>
             </a:r>
           </a:p>
           <a:p>
             <a:pPr lvl="4"/>
             <a:r>
-              <a:rPr lang="en-US" smtClean="0"/>
+              <a:rPr lang="en-US"/>
               <a:t>Fifth level</a:t>
             </a:r>
-            <a:endParaRPr lang="en-US"/>
           </a:p>
         </p:txBody>
       </p:sp>
@@ -2450,7 +2431,7 @@
           <a:p>
             <a:fld id="{699DC775-C286-4358-8C92-D7E584E969B3}" type="datetimeFigureOut">
               <a:rPr lang="en-US" smtClean="0"/>
-              <a:t>3/12/2017</a:t>
+              <a:t>3/20/2017</a:t>
             </a:fld>
             <a:endParaRPr lang="en-US"/>
           </a:p>
@@ -2544,10 +2525,9 @@
           <a:lstStyle/>
           <a:p>
             <a:r>
-              <a:rPr lang="en-US" smtClean="0"/>
+              <a:rPr lang="en-US"/>
               <a:t>Click to edit Master title style</a:t>
             </a:r>
-            <a:endParaRPr lang="en-US"/>
           </a:p>
         </p:txBody>
       </p:sp>
@@ -2568,7 +2548,7 @@
           <a:p>
             <a:fld id="{699DC775-C286-4358-8C92-D7E584E969B3}" type="datetimeFigureOut">
               <a:rPr lang="en-US" smtClean="0"/>
-              <a:t>3/12/2017</a:t>
+              <a:t>3/20/2017</a:t>
             </a:fld>
             <a:endParaRPr lang="en-US"/>
           </a:p>
@@ -2663,7 +2643,7 @@
           <a:p>
             <a:fld id="{699DC775-C286-4358-8C92-D7E584E969B3}" type="datetimeFigureOut">
               <a:rPr lang="en-US" smtClean="0"/>
-              <a:t>3/12/2017</a:t>
+              <a:t>3/20/2017</a:t>
             </a:fld>
             <a:endParaRPr lang="en-US"/>
           </a:p>
@@ -2766,10 +2746,9 @@
           </a:lstStyle>
           <a:p>
             <a:r>
-              <a:rPr lang="en-US" smtClean="0"/>
+              <a:rPr lang="en-US"/>
               <a:t>Click to edit Master title style</a:t>
             </a:r>
-            <a:endParaRPr lang="en-US"/>
           </a:p>
         </p:txBody>
       </p:sp>
@@ -2823,38 +2802,37 @@
           <a:p>
             <a:pPr lvl="0"/>
             <a:r>
-              <a:rPr lang="en-US" smtClean="0"/>
+              <a:rPr lang="en-US"/>
               <a:t>Click to edit Master text styles</a:t>
             </a:r>
           </a:p>
           <a:p>
             <a:pPr lvl="1"/>
             <a:r>
-              <a:rPr lang="en-US" smtClean="0"/>
+              <a:rPr lang="en-US"/>
               <a:t>Second level</a:t>
             </a:r>
           </a:p>
           <a:p>
             <a:pPr lvl="2"/>
             <a:r>
-              <a:rPr lang="en-US" smtClean="0"/>
+              <a:rPr lang="en-US"/>
               <a:t>Third level</a:t>
             </a:r>
           </a:p>
           <a:p>
             <a:pPr lvl="3"/>
             <a:r>
-              <a:rPr lang="en-US" smtClean="0"/>
+              <a:rPr lang="en-US"/>
               <a:t>Fourth level</a:t>
             </a:r>
           </a:p>
           <a:p>
             <a:pPr lvl="4"/>
             <a:r>
-              <a:rPr lang="en-US" smtClean="0"/>
+              <a:rPr lang="en-US"/>
               <a:t>Fifth level</a:t>
             </a:r>
-            <a:endParaRPr lang="en-US"/>
           </a:p>
         </p:txBody>
       </p:sp>
@@ -2917,7 +2895,7 @@
           <a:p>
             <a:pPr lvl="0"/>
             <a:r>
-              <a:rPr lang="en-US" smtClean="0"/>
+              <a:rPr lang="en-US"/>
               <a:t>Click to edit Master text styles</a:t>
             </a:r>
           </a:p>
@@ -2940,7 +2918,7 @@
           <a:p>
             <a:fld id="{699DC775-C286-4358-8C92-D7E584E969B3}" type="datetimeFigureOut">
               <a:rPr lang="en-US" smtClean="0"/>
-              <a:t>3/12/2017</a:t>
+              <a:t>3/20/2017</a:t>
             </a:fld>
             <a:endParaRPr lang="en-US"/>
           </a:p>
@@ -3034,10 +3012,9 @@
           <a:lstStyle/>
           <a:p>
             <a:r>
-              <a:rPr lang="en-US" smtClean="0"/>
+              <a:rPr lang="en-US"/>
               <a:t>Click to edit Master title style</a:t>
             </a:r>
-            <a:endParaRPr lang="en-US"/>
           </a:p>
         </p:txBody>
       </p:sp>
@@ -3058,38 +3035,37 @@
           <a:p>
             <a:pPr lvl="0"/>
             <a:r>
-              <a:rPr lang="en-US" smtClean="0"/>
+              <a:rPr lang="en-US"/>
               <a:t>Click to edit Master text styles</a:t>
             </a:r>
           </a:p>
           <a:p>
             <a:pPr lvl="1"/>
             <a:r>
-              <a:rPr lang="en-US" smtClean="0"/>
+              <a:rPr lang="en-US"/>
               <a:t>Second level</a:t>
             </a:r>
           </a:p>
           <a:p>
             <a:pPr lvl="2"/>
             <a:r>
-              <a:rPr lang="en-US" smtClean="0"/>
+              <a:rPr lang="en-US"/>
               <a:t>Third level</a:t>
             </a:r>
           </a:p>
           <a:p>
             <a:pPr lvl="3"/>
             <a:r>
-              <a:rPr lang="en-US" smtClean="0"/>
+              <a:rPr lang="en-US"/>
               <a:t>Fourth level</a:t>
             </a:r>
           </a:p>
           <a:p>
             <a:pPr lvl="4"/>
             <a:r>
-              <a:rPr lang="en-US" smtClean="0"/>
+              <a:rPr lang="en-US"/>
               <a:t>Fifth level</a:t>
             </a:r>
-            <a:endParaRPr lang="en-US"/>
           </a:p>
         </p:txBody>
       </p:sp>
@@ -3110,7 +3086,7 @@
           <a:p>
             <a:fld id="{699DC775-C286-4358-8C92-D7E584E969B3}" type="datetimeFigureOut">
               <a:rPr lang="en-US" smtClean="0"/>
-              <a:t>3/12/2017</a:t>
+              <a:t>3/20/2017</a:t>
             </a:fld>
             <a:endParaRPr lang="en-US"/>
           </a:p>
@@ -3213,10 +3189,9 @@
           </a:lstStyle>
           <a:p>
             <a:r>
-              <a:rPr lang="en-US" smtClean="0"/>
+              <a:rPr lang="en-US"/>
               <a:t>Click to edit Master title style</a:t>
             </a:r>
-            <a:endParaRPr lang="en-US"/>
           </a:p>
         </p:txBody>
       </p:sp>
@@ -3340,7 +3315,7 @@
           <a:p>
             <a:pPr lvl="0"/>
             <a:r>
-              <a:rPr lang="en-US" smtClean="0"/>
+              <a:rPr lang="en-US"/>
               <a:t>Click to edit Master text styles</a:t>
             </a:r>
           </a:p>
@@ -3363,7 +3338,7 @@
           <a:p>
             <a:fld id="{699DC775-C286-4358-8C92-D7E584E969B3}" type="datetimeFigureOut">
               <a:rPr lang="en-US" smtClean="0"/>
-              <a:t>3/12/2017</a:t>
+              <a:t>3/20/2017</a:t>
             </a:fld>
             <a:endParaRPr lang="en-US"/>
           </a:p>
@@ -3457,10 +3432,9 @@
           <a:lstStyle/>
           <a:p>
             <a:r>
-              <a:rPr lang="en-US" smtClean="0"/>
+              <a:rPr lang="en-US"/>
               <a:t>Click to edit Master title style</a:t>
             </a:r>
-            <a:endParaRPr lang="en-US"/>
           </a:p>
         </p:txBody>
       </p:sp>
@@ -3481,38 +3455,37 @@
           <a:p>
             <a:pPr lvl="0"/>
             <a:r>
-              <a:rPr lang="en-US" smtClean="0"/>
+              <a:rPr lang="en-US"/>
               <a:t>Click to edit Master text styles</a:t>
             </a:r>
           </a:p>
           <a:p>
             <a:pPr lvl="1"/>
             <a:r>
-              <a:rPr lang="en-US" smtClean="0"/>
+              <a:rPr lang="en-US"/>
               <a:t>Second level</a:t>
             </a:r>
           </a:p>
           <a:p>
             <a:pPr lvl="2"/>
             <a:r>
-              <a:rPr lang="en-US" smtClean="0"/>
+              <a:rPr lang="en-US"/>
               <a:t>Third level</a:t>
             </a:r>
           </a:p>
           <a:p>
             <a:pPr lvl="3"/>
             <a:r>
-              <a:rPr lang="en-US" smtClean="0"/>
+              <a:rPr lang="en-US"/>
               <a:t>Fourth level</a:t>
             </a:r>
           </a:p>
           <a:p>
             <a:pPr lvl="4"/>
             <a:r>
-              <a:rPr lang="en-US" smtClean="0"/>
+              <a:rPr lang="en-US"/>
               <a:t>Fifth level</a:t>
             </a:r>
-            <a:endParaRPr lang="en-US"/>
           </a:p>
         </p:txBody>
       </p:sp>
@@ -3533,7 +3506,7 @@
           <a:p>
             <a:fld id="{699DC775-C286-4358-8C92-D7E584E969B3}" type="datetimeFigureOut">
               <a:rPr lang="en-US" smtClean="0"/>
-              <a:t>3/12/2017</a:t>
+              <a:t>3/20/2017</a:t>
             </a:fld>
             <a:endParaRPr lang="en-US"/>
           </a:p>
@@ -3632,10 +3605,9 @@
           <a:lstStyle/>
           <a:p>
             <a:r>
-              <a:rPr lang="en-US" smtClean="0"/>
+              <a:rPr lang="en-US"/>
               <a:t>Click to edit Master title style</a:t>
             </a:r>
-            <a:endParaRPr lang="en-US"/>
           </a:p>
         </p:txBody>
       </p:sp>
@@ -3661,38 +3633,37 @@
           <a:p>
             <a:pPr lvl="0"/>
             <a:r>
-              <a:rPr lang="en-US" smtClean="0"/>
+              <a:rPr lang="en-US"/>
               <a:t>Click to edit Master text styles</a:t>
             </a:r>
           </a:p>
           <a:p>
             <a:pPr lvl="1"/>
             <a:r>
-              <a:rPr lang="en-US" smtClean="0"/>
+              <a:rPr lang="en-US"/>
               <a:t>Second level</a:t>
             </a:r>
           </a:p>
           <a:p>
             <a:pPr lvl="2"/>
             <a:r>
-              <a:rPr lang="en-US" smtClean="0"/>
+              <a:rPr lang="en-US"/>
               <a:t>Third level</a:t>
             </a:r>
           </a:p>
           <a:p>
             <a:pPr lvl="3"/>
             <a:r>
-              <a:rPr lang="en-US" smtClean="0"/>
+              <a:rPr lang="en-US"/>
               <a:t>Fourth level</a:t>
             </a:r>
           </a:p>
           <a:p>
             <a:pPr lvl="4"/>
             <a:r>
-              <a:rPr lang="en-US" smtClean="0"/>
+              <a:rPr lang="en-US"/>
               <a:t>Fifth level</a:t>
             </a:r>
-            <a:endParaRPr lang="en-US"/>
           </a:p>
         </p:txBody>
       </p:sp>
@@ -3713,7 +3684,7 @@
           <a:p>
             <a:fld id="{699DC775-C286-4358-8C92-D7E584E969B3}" type="datetimeFigureOut">
               <a:rPr lang="en-US" smtClean="0"/>
-              <a:t>3/12/2017</a:t>
+              <a:t>3/20/2017</a:t>
             </a:fld>
             <a:endParaRPr lang="en-US"/>
           </a:p>
@@ -3820,10 +3791,9 @@
           <a:lstStyle/>
           <a:p>
             <a:r>
-              <a:rPr lang="en-US" smtClean="0"/>
+              <a:rPr lang="en-US"/>
               <a:t>Click to edit Master title style</a:t>
             </a:r>
-            <a:endParaRPr lang="en-US"/>
           </a:p>
         </p:txBody>
       </p:sp>
@@ -3939,10 +3909,9 @@
           </a:lstStyle>
           <a:p>
             <a:r>
-              <a:rPr lang="en-US" smtClean="0"/>
+              <a:rPr lang="en-US"/>
               <a:t>Click to edit Master subtitle style</a:t>
             </a:r>
-            <a:endParaRPr lang="en-US"/>
           </a:p>
         </p:txBody>
       </p:sp>
@@ -3963,7 +3932,7 @@
           <a:p>
             <a:fld id="{699DC775-C286-4358-8C92-D7E584E969B3}" type="datetimeFigureOut">
               <a:rPr lang="en-US" smtClean="0"/>
-              <a:t>3/12/2017</a:t>
+              <a:t>3/20/2017</a:t>
             </a:fld>
             <a:endParaRPr lang="en-US"/>
           </a:p>
@@ -4065,10 +4034,9 @@
           <a:lstStyle/>
           <a:p>
             <a:r>
-              <a:rPr lang="en-US" smtClean="0"/>
+              <a:rPr lang="en-US"/>
               <a:t>Click to edit Master title style</a:t>
             </a:r>
-            <a:endParaRPr lang="en-US"/>
           </a:p>
         </p:txBody>
       </p:sp>
@@ -4089,38 +4057,37 @@
           <a:p>
             <a:pPr lvl="0"/>
             <a:r>
-              <a:rPr lang="en-US" smtClean="0"/>
+              <a:rPr lang="en-US"/>
               <a:t>Click to edit Master text styles</a:t>
             </a:r>
           </a:p>
           <a:p>
             <a:pPr lvl="1"/>
             <a:r>
-              <a:rPr lang="en-US" smtClean="0"/>
+              <a:rPr lang="en-US"/>
               <a:t>Second level</a:t>
             </a:r>
           </a:p>
           <a:p>
             <a:pPr lvl="2"/>
             <a:r>
-              <a:rPr lang="en-US" smtClean="0"/>
+              <a:rPr lang="en-US"/>
               <a:t>Third level</a:t>
             </a:r>
           </a:p>
           <a:p>
             <a:pPr lvl="3"/>
             <a:r>
-              <a:rPr lang="en-US" smtClean="0"/>
+              <a:rPr lang="en-US"/>
               <a:t>Fourth level</a:t>
             </a:r>
           </a:p>
           <a:p>
             <a:pPr lvl="4"/>
             <a:r>
-              <a:rPr lang="en-US" smtClean="0"/>
+              <a:rPr lang="en-US"/>
               <a:t>Fifth level</a:t>
             </a:r>
-            <a:endParaRPr lang="en-US"/>
           </a:p>
         </p:txBody>
       </p:sp>
@@ -4141,7 +4108,7 @@
           <a:p>
             <a:fld id="{699DC775-C286-4358-8C92-D7E584E969B3}" type="datetimeFigureOut">
               <a:rPr lang="en-US" smtClean="0"/>
-              <a:t>3/12/2017</a:t>
+              <a:t>3/20/2017</a:t>
             </a:fld>
             <a:endParaRPr lang="en-US"/>
           </a:p>
@@ -4252,10 +4219,9 @@
           </a:lstStyle>
           <a:p>
             <a:r>
-              <a:rPr lang="en-US" smtClean="0"/>
+              <a:rPr lang="en-US"/>
               <a:t>Click to edit Master title style</a:t>
             </a:r>
-            <a:endParaRPr lang="en-US"/>
           </a:p>
         </p:txBody>
       </p:sp>
@@ -4372,7 +4338,7 @@
           <a:p>
             <a:pPr lvl="0"/>
             <a:r>
-              <a:rPr lang="en-US" smtClean="0"/>
+              <a:rPr lang="en-US"/>
               <a:t>Click to edit Master text styles</a:t>
             </a:r>
           </a:p>
@@ -4395,7 +4361,7 @@
           <a:p>
             <a:fld id="{699DC775-C286-4358-8C92-D7E584E969B3}" type="datetimeFigureOut">
               <a:rPr lang="en-US" smtClean="0"/>
-              <a:t>3/12/2017</a:t>
+              <a:t>3/20/2017</a:t>
             </a:fld>
             <a:endParaRPr lang="en-US"/>
           </a:p>
@@ -4497,10 +4463,9 @@
           <a:lstStyle/>
           <a:p>
             <a:r>
-              <a:rPr lang="en-US" smtClean="0"/>
+              <a:rPr lang="en-US"/>
               <a:t>Click to edit Master title style</a:t>
             </a:r>
-            <a:endParaRPr lang="en-US"/>
           </a:p>
         </p:txBody>
       </p:sp>
@@ -4554,38 +4519,37 @@
           <a:p>
             <a:pPr lvl="0"/>
             <a:r>
-              <a:rPr lang="en-US" smtClean="0"/>
+              <a:rPr lang="en-US"/>
               <a:t>Click to edit Master text styles</a:t>
             </a:r>
           </a:p>
           <a:p>
             <a:pPr lvl="1"/>
             <a:r>
-              <a:rPr lang="en-US" smtClean="0"/>
+              <a:rPr lang="en-US"/>
               <a:t>Second level</a:t>
             </a:r>
           </a:p>
           <a:p>
             <a:pPr lvl="2"/>
             <a:r>
-              <a:rPr lang="en-US" smtClean="0"/>
+              <a:rPr lang="en-US"/>
               <a:t>Third level</a:t>
             </a:r>
           </a:p>
           <a:p>
             <a:pPr lvl="3"/>
             <a:r>
-              <a:rPr lang="en-US" smtClean="0"/>
+              <a:rPr lang="en-US"/>
               <a:t>Fourth level</a:t>
             </a:r>
           </a:p>
           <a:p>
             <a:pPr lvl="4"/>
             <a:r>
-              <a:rPr lang="en-US" smtClean="0"/>
+              <a:rPr lang="en-US"/>
               <a:t>Fifth level</a:t>
             </a:r>
-            <a:endParaRPr lang="en-US"/>
           </a:p>
         </p:txBody>
       </p:sp>
@@ -4639,38 +4603,37 @@
           <a:p>
             <a:pPr lvl="0"/>
             <a:r>
-              <a:rPr lang="en-US" smtClean="0"/>
+              <a:rPr lang="en-US"/>
               <a:t>Click to edit Master text styles</a:t>
             </a:r>
           </a:p>
           <a:p>
             <a:pPr lvl="1"/>
             <a:r>
-              <a:rPr lang="en-US" smtClean="0"/>
+              <a:rPr lang="en-US"/>
               <a:t>Second level</a:t>
             </a:r>
           </a:p>
           <a:p>
             <a:pPr lvl="2"/>
             <a:r>
-              <a:rPr lang="en-US" smtClean="0"/>
+              <a:rPr lang="en-US"/>
               <a:t>Third level</a:t>
             </a:r>
           </a:p>
           <a:p>
             <a:pPr lvl="3"/>
             <a:r>
-              <a:rPr lang="en-US" smtClean="0"/>
+              <a:rPr lang="en-US"/>
               <a:t>Fourth level</a:t>
             </a:r>
           </a:p>
           <a:p>
             <a:pPr lvl="4"/>
             <a:r>
-              <a:rPr lang="en-US" smtClean="0"/>
+              <a:rPr lang="en-US"/>
               <a:t>Fifth level</a:t>
             </a:r>
-            <a:endParaRPr lang="en-US"/>
           </a:p>
         </p:txBody>
       </p:sp>
@@ -4691,7 +4654,7 @@
           <a:p>
             <a:fld id="{699DC775-C286-4358-8C92-D7E584E969B3}" type="datetimeFigureOut">
               <a:rPr lang="en-US" smtClean="0"/>
-              <a:t>3/12/2017</a:t>
+              <a:t>3/20/2017</a:t>
             </a:fld>
             <a:endParaRPr lang="en-US"/>
           </a:p>
@@ -4797,10 +4760,9 @@
           </a:lstStyle>
           <a:p>
             <a:r>
-              <a:rPr lang="en-US" smtClean="0"/>
+              <a:rPr lang="en-US"/>
               <a:t>Click to edit Master title style</a:t>
             </a:r>
-            <a:endParaRPr lang="en-US"/>
           </a:p>
         </p:txBody>
       </p:sp>
@@ -4863,7 +4825,7 @@
           <a:p>
             <a:pPr lvl="0"/>
             <a:r>
-              <a:rPr lang="en-US" smtClean="0"/>
+              <a:rPr lang="en-US"/>
               <a:t>Click to edit Master text styles</a:t>
             </a:r>
           </a:p>
@@ -4919,38 +4881,37 @@
           <a:p>
             <a:pPr lvl="0"/>
             <a:r>
-              <a:rPr lang="en-US" smtClean="0"/>
+              <a:rPr lang="en-US"/>
               <a:t>Click to edit Master text styles</a:t>
             </a:r>
           </a:p>
           <a:p>
             <a:pPr lvl="1"/>
             <a:r>
-              <a:rPr lang="en-US" smtClean="0"/>
+              <a:rPr lang="en-US"/>
               <a:t>Second level</a:t>
             </a:r>
           </a:p>
           <a:p>
             <a:pPr lvl="2"/>
             <a:r>
-              <a:rPr lang="en-US" smtClean="0"/>
+              <a:rPr lang="en-US"/>
               <a:t>Third level</a:t>
             </a:r>
           </a:p>
           <a:p>
             <a:pPr lvl="3"/>
             <a:r>
-              <a:rPr lang="en-US" smtClean="0"/>
+              <a:rPr lang="en-US"/>
               <a:t>Fourth level</a:t>
             </a:r>
           </a:p>
           <a:p>
             <a:pPr lvl="4"/>
             <a:r>
-              <a:rPr lang="en-US" smtClean="0"/>
+              <a:rPr lang="en-US"/>
               <a:t>Fifth level</a:t>
             </a:r>
-            <a:endParaRPr lang="en-US"/>
           </a:p>
         </p:txBody>
       </p:sp>
@@ -5013,7 +4974,7 @@
           <a:p>
             <a:pPr lvl="0"/>
             <a:r>
-              <a:rPr lang="en-US" smtClean="0"/>
+              <a:rPr lang="en-US"/>
               <a:t>Click to edit Master text styles</a:t>
             </a:r>
           </a:p>
@@ -5069,38 +5030,37 @@
           <a:p>
             <a:pPr lvl="0"/>
             <a:r>
-              <a:rPr lang="en-US" smtClean="0"/>
+              <a:rPr lang="en-US"/>
               <a:t>Click to edit Master text styles</a:t>
             </a:r>
           </a:p>
           <a:p>
             <a:pPr lvl="1"/>
             <a:r>
-              <a:rPr lang="en-US" smtClean="0"/>
+              <a:rPr lang="en-US"/>
               <a:t>Second level</a:t>
             </a:r>
           </a:p>
           <a:p>
             <a:pPr lvl="2"/>
             <a:r>
-              <a:rPr lang="en-US" smtClean="0"/>
+              <a:rPr lang="en-US"/>
               <a:t>Third level</a:t>
             </a:r>
           </a:p>
           <a:p>
             <a:pPr lvl="3"/>
             <a:r>
-              <a:rPr lang="en-US" smtClean="0"/>
+              <a:rPr lang="en-US"/>
               <a:t>Fourth level</a:t>
             </a:r>
           </a:p>
           <a:p>
             <a:pPr lvl="4"/>
             <a:r>
-              <a:rPr lang="en-US" smtClean="0"/>
+              <a:rPr lang="en-US"/>
               <a:t>Fifth level</a:t>
             </a:r>
-            <a:endParaRPr lang="en-US"/>
           </a:p>
         </p:txBody>
       </p:sp>
@@ -5121,7 +5081,7 @@
           <a:p>
             <a:fld id="{699DC775-C286-4358-8C92-D7E584E969B3}" type="datetimeFigureOut">
               <a:rPr lang="en-US" smtClean="0"/>
-              <a:t>3/12/2017</a:t>
+              <a:t>3/20/2017</a:t>
             </a:fld>
             <a:endParaRPr lang="en-US"/>
           </a:p>
@@ -5223,10 +5183,9 @@
           <a:lstStyle/>
           <a:p>
             <a:r>
-              <a:rPr lang="en-US" smtClean="0"/>
+              <a:rPr lang="en-US"/>
               <a:t>Click to edit Master title style</a:t>
             </a:r>
-            <a:endParaRPr lang="en-US"/>
           </a:p>
         </p:txBody>
       </p:sp>
@@ -5247,7 +5206,7 @@
           <a:p>
             <a:fld id="{699DC775-C286-4358-8C92-D7E584E969B3}" type="datetimeFigureOut">
               <a:rPr lang="en-US" smtClean="0"/>
-              <a:t>3/12/2017</a:t>
+              <a:t>3/20/2017</a:t>
             </a:fld>
             <a:endParaRPr lang="en-US"/>
           </a:p>
@@ -5350,7 +5309,7 @@
           <a:p>
             <a:fld id="{699DC775-C286-4358-8C92-D7E584E969B3}" type="datetimeFigureOut">
               <a:rPr lang="en-US" smtClean="0"/>
-              <a:t>3/12/2017</a:t>
+              <a:t>3/20/2017</a:t>
             </a:fld>
             <a:endParaRPr lang="en-US"/>
           </a:p>
@@ -5453,10 +5412,9 @@
           </a:lstStyle>
           <a:p>
             <a:r>
-              <a:rPr lang="en-US" smtClean="0"/>
+              <a:rPr lang="en-US"/>
               <a:t>Click to edit Master title style</a:t>
             </a:r>
-            <a:endParaRPr lang="en-US"/>
           </a:p>
         </p:txBody>
       </p:sp>
@@ -5573,7 +5531,7 @@
           <a:p>
             <a:pPr lvl="0"/>
             <a:r>
-              <a:rPr lang="en-US" smtClean="0"/>
+              <a:rPr lang="en-US"/>
               <a:t>Click to edit Master text styles</a:t>
             </a:r>
           </a:p>
@@ -5596,7 +5554,7 @@
           <a:p>
             <a:fld id="{699DC775-C286-4358-8C92-D7E584E969B3}" type="datetimeFigureOut">
               <a:rPr lang="en-US" smtClean="0"/>
-              <a:t>3/12/2017</a:t>
+              <a:t>3/20/2017</a:t>
             </a:fld>
             <a:endParaRPr lang="en-US"/>
           </a:p>
@@ -5707,10 +5665,9 @@
           </a:lstStyle>
           <a:p>
             <a:r>
-              <a:rPr lang="en-US" smtClean="0"/>
+              <a:rPr lang="en-US"/>
               <a:t>Click to edit Master title style</a:t>
             </a:r>
-            <a:endParaRPr lang="en-US"/>
           </a:p>
         </p:txBody>
       </p:sp>
@@ -5764,38 +5721,37 @@
           <a:p>
             <a:pPr lvl="0"/>
             <a:r>
-              <a:rPr lang="en-US" smtClean="0"/>
+              <a:rPr lang="en-US"/>
               <a:t>Click to edit Master text styles</a:t>
             </a:r>
           </a:p>
           <a:p>
             <a:pPr lvl="1"/>
             <a:r>
-              <a:rPr lang="en-US" smtClean="0"/>
+              <a:rPr lang="en-US"/>
               <a:t>Second level</a:t>
             </a:r>
           </a:p>
           <a:p>
             <a:pPr lvl="2"/>
             <a:r>
-              <a:rPr lang="en-US" smtClean="0"/>
+              <a:rPr lang="en-US"/>
               <a:t>Third level</a:t>
             </a:r>
           </a:p>
           <a:p>
             <a:pPr lvl="3"/>
             <a:r>
-              <a:rPr lang="en-US" smtClean="0"/>
+              <a:rPr lang="en-US"/>
               <a:t>Fourth level</a:t>
             </a:r>
           </a:p>
           <a:p>
             <a:pPr lvl="4"/>
             <a:r>
-              <a:rPr lang="en-US" smtClean="0"/>
+              <a:rPr lang="en-US"/>
               <a:t>Fifth level</a:t>
             </a:r>
-            <a:endParaRPr lang="en-US"/>
           </a:p>
         </p:txBody>
       </p:sp>
@@ -5858,7 +5814,7 @@
           <a:p>
             <a:pPr lvl="0"/>
             <a:r>
-              <a:rPr lang="en-US" smtClean="0"/>
+              <a:rPr lang="en-US"/>
               <a:t>Click to edit Master text styles</a:t>
             </a:r>
           </a:p>
@@ -5881,7 +5837,7 @@
           <a:p>
             <a:fld id="{699DC775-C286-4358-8C92-D7E584E969B3}" type="datetimeFigureOut">
               <a:rPr lang="en-US" smtClean="0"/>
-              <a:t>3/12/2017</a:t>
+              <a:t>3/20/2017</a:t>
             </a:fld>
             <a:endParaRPr lang="en-US"/>
           </a:p>
@@ -5992,10 +5948,9 @@
           </a:lstStyle>
           <a:p>
             <a:r>
-              <a:rPr lang="en-US" smtClean="0"/>
+              <a:rPr lang="en-US"/>
               <a:t>Click to edit Master title style</a:t>
             </a:r>
-            <a:endParaRPr lang="en-US"/>
           </a:p>
         </p:txBody>
       </p:sp>
@@ -6119,7 +6074,7 @@
           <a:p>
             <a:pPr lvl="0"/>
             <a:r>
-              <a:rPr lang="en-US" smtClean="0"/>
+              <a:rPr lang="en-US"/>
               <a:t>Click to edit Master text styles</a:t>
             </a:r>
           </a:p>
@@ -6142,7 +6097,7 @@
           <a:p>
             <a:fld id="{699DC775-C286-4358-8C92-D7E584E969B3}" type="datetimeFigureOut">
               <a:rPr lang="en-US" smtClean="0"/>
-              <a:t>3/12/2017</a:t>
+              <a:t>3/20/2017</a:t>
             </a:fld>
             <a:endParaRPr lang="en-US"/>
           </a:p>
@@ -6244,10 +6199,9 @@
           <a:lstStyle/>
           <a:p>
             <a:r>
-              <a:rPr lang="en-US" smtClean="0"/>
+              <a:rPr lang="en-US"/>
               <a:t>Click to edit Master title style</a:t>
             </a:r>
-            <a:endParaRPr lang="en-US"/>
           </a:p>
         </p:txBody>
       </p:sp>
@@ -6268,38 +6222,37 @@
           <a:p>
             <a:pPr lvl="0"/>
             <a:r>
-              <a:rPr lang="en-US" smtClean="0"/>
+              <a:rPr lang="en-US"/>
               <a:t>Click to edit Master text styles</a:t>
             </a:r>
           </a:p>
           <a:p>
             <a:pPr lvl="1"/>
             <a:r>
-              <a:rPr lang="en-US" smtClean="0"/>
+              <a:rPr lang="en-US"/>
               <a:t>Second level</a:t>
             </a:r>
           </a:p>
           <a:p>
             <a:pPr lvl="2"/>
             <a:r>
-              <a:rPr lang="en-US" smtClean="0"/>
+              <a:rPr lang="en-US"/>
               <a:t>Third level</a:t>
             </a:r>
           </a:p>
           <a:p>
             <a:pPr lvl="3"/>
             <a:r>
-              <a:rPr lang="en-US" smtClean="0"/>
+              <a:rPr lang="en-US"/>
               <a:t>Fourth level</a:t>
             </a:r>
           </a:p>
           <a:p>
             <a:pPr lvl="4"/>
             <a:r>
-              <a:rPr lang="en-US" smtClean="0"/>
+              <a:rPr lang="en-US"/>
               <a:t>Fifth level</a:t>
             </a:r>
-            <a:endParaRPr lang="en-US"/>
           </a:p>
         </p:txBody>
       </p:sp>
@@ -6320,7 +6273,7 @@
           <a:p>
             <a:fld id="{699DC775-C286-4358-8C92-D7E584E969B3}" type="datetimeFigureOut">
               <a:rPr lang="en-US" smtClean="0"/>
-              <a:t>3/12/2017</a:t>
+              <a:t>3/20/2017</a:t>
             </a:fld>
             <a:endParaRPr lang="en-US"/>
           </a:p>
@@ -6427,10 +6380,9 @@
           <a:lstStyle/>
           <a:p>
             <a:r>
-              <a:rPr lang="en-US" smtClean="0"/>
+              <a:rPr lang="en-US"/>
               <a:t>Click to edit Master title style</a:t>
             </a:r>
-            <a:endParaRPr lang="en-US"/>
           </a:p>
         </p:txBody>
       </p:sp>
@@ -6456,38 +6408,37 @@
           <a:p>
             <a:pPr lvl="0"/>
             <a:r>
-              <a:rPr lang="en-US" smtClean="0"/>
+              <a:rPr lang="en-US"/>
               <a:t>Click to edit Master text styles</a:t>
             </a:r>
           </a:p>
           <a:p>
             <a:pPr lvl="1"/>
             <a:r>
-              <a:rPr lang="en-US" smtClean="0"/>
+              <a:rPr lang="en-US"/>
               <a:t>Second level</a:t>
             </a:r>
           </a:p>
           <a:p>
             <a:pPr lvl="2"/>
             <a:r>
-              <a:rPr lang="en-US" smtClean="0"/>
+              <a:rPr lang="en-US"/>
               <a:t>Third level</a:t>
             </a:r>
           </a:p>
           <a:p>
             <a:pPr lvl="3"/>
             <a:r>
-              <a:rPr lang="en-US" smtClean="0"/>
+              <a:rPr lang="en-US"/>
               <a:t>Fourth level</a:t>
             </a:r>
           </a:p>
           <a:p>
             <a:pPr lvl="4"/>
             <a:r>
-              <a:rPr lang="en-US" smtClean="0"/>
+              <a:rPr lang="en-US"/>
               <a:t>Fifth level</a:t>
             </a:r>
-            <a:endParaRPr lang="en-US"/>
           </a:p>
         </p:txBody>
       </p:sp>
@@ -6508,7 +6459,7 @@
           <a:p>
             <a:fld id="{699DC775-C286-4358-8C92-D7E584E969B3}" type="datetimeFigureOut">
               <a:rPr lang="en-US" smtClean="0"/>
-              <a:t>3/12/2017</a:t>
+              <a:t>3/20/2017</a:t>
             </a:fld>
             <a:endParaRPr lang="en-US"/>
           </a:p>
@@ -6602,10 +6553,9 @@
           <a:lstStyle/>
           <a:p>
             <a:r>
-              <a:rPr lang="en-US" smtClean="0"/>
+              <a:rPr lang="en-US"/>
               <a:t>Click to edit Master title style</a:t>
             </a:r>
-            <a:endParaRPr lang="en-US"/>
           </a:p>
         </p:txBody>
       </p:sp>
@@ -6659,38 +6609,37 @@
           <a:p>
             <a:pPr lvl="0"/>
             <a:r>
-              <a:rPr lang="en-US" smtClean="0"/>
+              <a:rPr lang="en-US"/>
               <a:t>Click to edit Master text styles</a:t>
             </a:r>
           </a:p>
           <a:p>
             <a:pPr lvl="1"/>
             <a:r>
-              <a:rPr lang="en-US" smtClean="0"/>
+              <a:rPr lang="en-US"/>
               <a:t>Second level</a:t>
             </a:r>
           </a:p>
           <a:p>
             <a:pPr lvl="2"/>
             <a:r>
-              <a:rPr lang="en-US" smtClean="0"/>
+              <a:rPr lang="en-US"/>
               <a:t>Third level</a:t>
             </a:r>
           </a:p>
           <a:p>
             <a:pPr lvl="3"/>
             <a:r>
-              <a:rPr lang="en-US" smtClean="0"/>
+              <a:rPr lang="en-US"/>
               <a:t>Fourth level</a:t>
             </a:r>
           </a:p>
           <a:p>
             <a:pPr lvl="4"/>
             <a:r>
-              <a:rPr lang="en-US" smtClean="0"/>
+              <a:rPr lang="en-US"/>
               <a:t>Fifth level</a:t>
             </a:r>
-            <a:endParaRPr lang="en-US"/>
           </a:p>
         </p:txBody>
       </p:sp>
@@ -6744,38 +6693,37 @@
           <a:p>
             <a:pPr lvl="0"/>
             <a:r>
-              <a:rPr lang="en-US" smtClean="0"/>
+              <a:rPr lang="en-US"/>
               <a:t>Click to edit Master text styles</a:t>
             </a:r>
           </a:p>
           <a:p>
             <a:pPr lvl="1"/>
             <a:r>
-              <a:rPr lang="en-US" smtClean="0"/>
+              <a:rPr lang="en-US"/>
               <a:t>Second level</a:t>
             </a:r>
           </a:p>
           <a:p>
             <a:pPr lvl="2"/>
             <a:r>
-              <a:rPr lang="en-US" smtClean="0"/>
+              <a:rPr lang="en-US"/>
               <a:t>Third level</a:t>
             </a:r>
           </a:p>
           <a:p>
             <a:pPr lvl="3"/>
             <a:r>
-              <a:rPr lang="en-US" smtClean="0"/>
+              <a:rPr lang="en-US"/>
               <a:t>Fourth level</a:t>
             </a:r>
           </a:p>
           <a:p>
             <a:pPr lvl="4"/>
             <a:r>
-              <a:rPr lang="en-US" smtClean="0"/>
+              <a:rPr lang="en-US"/>
               <a:t>Fifth level</a:t>
             </a:r>
-            <a:endParaRPr lang="en-US"/>
           </a:p>
         </p:txBody>
       </p:sp>
@@ -6796,7 +6744,7 @@
           <a:p>
             <a:fld id="{699DC775-C286-4358-8C92-D7E584E969B3}" type="datetimeFigureOut">
               <a:rPr lang="en-US" smtClean="0"/>
-              <a:t>3/12/2017</a:t>
+              <a:t>3/20/2017</a:t>
             </a:fld>
             <a:endParaRPr lang="en-US"/>
           </a:p>
@@ -6894,10 +6842,9 @@
           </a:lstStyle>
           <a:p>
             <a:r>
-              <a:rPr lang="en-US" smtClean="0"/>
+              <a:rPr lang="en-US"/>
               <a:t>Click to edit Master title style</a:t>
             </a:r>
-            <a:endParaRPr lang="en-US"/>
           </a:p>
         </p:txBody>
       </p:sp>
@@ -6960,7 +6907,7 @@
           <a:p>
             <a:pPr lvl="0"/>
             <a:r>
-              <a:rPr lang="en-US" smtClean="0"/>
+              <a:rPr lang="en-US"/>
               <a:t>Click to edit Master text styles</a:t>
             </a:r>
           </a:p>
@@ -7016,38 +6963,37 @@
           <a:p>
             <a:pPr lvl="0"/>
             <a:r>
-              <a:rPr lang="en-US" smtClean="0"/>
+              <a:rPr lang="en-US"/>
               <a:t>Click to edit Master text styles</a:t>
             </a:r>
           </a:p>
           <a:p>
             <a:pPr lvl="1"/>
             <a:r>
-              <a:rPr lang="en-US" smtClean="0"/>
+              <a:rPr lang="en-US"/>
               <a:t>Second level</a:t>
             </a:r>
           </a:p>
           <a:p>
             <a:pPr lvl="2"/>
             <a:r>
-              <a:rPr lang="en-US" smtClean="0"/>
+              <a:rPr lang="en-US"/>
               <a:t>Third level</a:t>
             </a:r>
           </a:p>
           <a:p>
             <a:pPr lvl="3"/>
             <a:r>
-              <a:rPr lang="en-US" smtClean="0"/>
+              <a:rPr lang="en-US"/>
               <a:t>Fourth level</a:t>
             </a:r>
           </a:p>
           <a:p>
             <a:pPr lvl="4"/>
             <a:r>
-              <a:rPr lang="en-US" smtClean="0"/>
+              <a:rPr lang="en-US"/>
               <a:t>Fifth level</a:t>
             </a:r>
-            <a:endParaRPr lang="en-US"/>
           </a:p>
         </p:txBody>
       </p:sp>
@@ -7110,7 +7056,7 @@
           <a:p>
             <a:pPr lvl="0"/>
             <a:r>
-              <a:rPr lang="en-US" smtClean="0"/>
+              <a:rPr lang="en-US"/>
               <a:t>Click to edit Master text styles</a:t>
             </a:r>
           </a:p>
@@ -7166,38 +7112,37 @@
           <a:p>
             <a:pPr lvl="0"/>
             <a:r>
-              <a:rPr lang="en-US" smtClean="0"/>
+              <a:rPr lang="en-US"/>
               <a:t>Click to edit Master text styles</a:t>
             </a:r>
           </a:p>
           <a:p>
             <a:pPr lvl="1"/>
             <a:r>
-              <a:rPr lang="en-US" smtClean="0"/>
+              <a:rPr lang="en-US"/>
               <a:t>Second level</a:t>
             </a:r>
           </a:p>
           <a:p>
             <a:pPr lvl="2"/>
             <a:r>
-              <a:rPr lang="en-US" smtClean="0"/>
+              <a:rPr lang="en-US"/>
               <a:t>Third level</a:t>
             </a:r>
           </a:p>
           <a:p>
             <a:pPr lvl="3"/>
             <a:r>
-              <a:rPr lang="en-US" smtClean="0"/>
+              <a:rPr lang="en-US"/>
               <a:t>Fourth level</a:t>
             </a:r>
           </a:p>
           <a:p>
             <a:pPr lvl="4"/>
             <a:r>
-              <a:rPr lang="en-US" smtClean="0"/>
+              <a:rPr lang="en-US"/>
               <a:t>Fifth level</a:t>
             </a:r>
-            <a:endParaRPr lang="en-US"/>
           </a:p>
         </p:txBody>
       </p:sp>
@@ -7218,7 +7163,7 @@
           <a:p>
             <a:fld id="{699DC775-C286-4358-8C92-D7E584E969B3}" type="datetimeFigureOut">
               <a:rPr lang="en-US" smtClean="0"/>
-              <a:t>3/12/2017</a:t>
+              <a:t>3/20/2017</a:t>
             </a:fld>
             <a:endParaRPr lang="en-US"/>
           </a:p>
@@ -7312,10 +7257,9 @@
           <a:lstStyle/>
           <a:p>
             <a:r>
-              <a:rPr lang="en-US" smtClean="0"/>
+              <a:rPr lang="en-US"/>
               <a:t>Click to edit Master title style</a:t>
             </a:r>
-            <a:endParaRPr lang="en-US"/>
           </a:p>
         </p:txBody>
       </p:sp>
@@ -7336,7 +7280,7 @@
           <a:p>
             <a:fld id="{699DC775-C286-4358-8C92-D7E584E969B3}" type="datetimeFigureOut">
               <a:rPr lang="en-US" smtClean="0"/>
-              <a:t>3/12/2017</a:t>
+              <a:t>3/20/2017</a:t>
             </a:fld>
             <a:endParaRPr lang="en-US"/>
           </a:p>
@@ -7431,7 +7375,7 @@
           <a:p>
             <a:fld id="{699DC775-C286-4358-8C92-D7E584E969B3}" type="datetimeFigureOut">
               <a:rPr lang="en-US" smtClean="0"/>
-              <a:t>3/12/2017</a:t>
+              <a:t>3/20/2017</a:t>
             </a:fld>
             <a:endParaRPr lang="en-US"/>
           </a:p>
@@ -7534,10 +7478,9 @@
           </a:lstStyle>
           <a:p>
             <a:r>
-              <a:rPr lang="en-US" smtClean="0"/>
+              <a:rPr lang="en-US"/>
               <a:t>Click to edit Master title style</a:t>
             </a:r>
-            <a:endParaRPr lang="en-US"/>
           </a:p>
         </p:txBody>
       </p:sp>
@@ -7591,38 +7534,37 @@
           <a:p>
             <a:pPr lvl="0"/>
             <a:r>
-              <a:rPr lang="en-US" smtClean="0"/>
+              <a:rPr lang="en-US"/>
               <a:t>Click to edit Master text styles</a:t>
             </a:r>
           </a:p>
           <a:p>
             <a:pPr lvl="1"/>
             <a:r>
-              <a:rPr lang="en-US" smtClean="0"/>
+              <a:rPr lang="en-US"/>
               <a:t>Second level</a:t>
             </a:r>
           </a:p>
           <a:p>
             <a:pPr lvl="2"/>
             <a:r>
-              <a:rPr lang="en-US" smtClean="0"/>
+              <a:rPr lang="en-US"/>
               <a:t>Third level</a:t>
             </a:r>
           </a:p>
           <a:p>
             <a:pPr lvl="3"/>
             <a:r>
-              <a:rPr lang="en-US" smtClean="0"/>
+              <a:rPr lang="en-US"/>
               <a:t>Fourth level</a:t>
             </a:r>
           </a:p>
           <a:p>
             <a:pPr lvl="4"/>
             <a:r>
-              <a:rPr lang="en-US" smtClean="0"/>
+              <a:rPr lang="en-US"/>
               <a:t>Fifth level</a:t>
             </a:r>
-            <a:endParaRPr lang="en-US"/>
           </a:p>
         </p:txBody>
       </p:sp>
@@ -7685,7 +7627,7 @@
           <a:p>
             <a:pPr lvl="0"/>
             <a:r>
-              <a:rPr lang="en-US" smtClean="0"/>
+              <a:rPr lang="en-US"/>
               <a:t>Click to edit Master text styles</a:t>
             </a:r>
           </a:p>
@@ -7708,7 +7650,7 @@
           <a:p>
             <a:fld id="{699DC775-C286-4358-8C92-D7E584E969B3}" type="datetimeFigureOut">
               <a:rPr lang="en-US" smtClean="0"/>
-              <a:t>3/12/2017</a:t>
+              <a:t>3/20/2017</a:t>
             </a:fld>
             <a:endParaRPr lang="en-US"/>
           </a:p>
@@ -7811,10 +7753,9 @@
           </a:lstStyle>
           <a:p>
             <a:r>
-              <a:rPr lang="en-US" smtClean="0"/>
+              <a:rPr lang="en-US"/>
               <a:t>Click to edit Master title style</a:t>
             </a:r>
-            <a:endParaRPr lang="en-US"/>
           </a:p>
         </p:txBody>
       </p:sp>
@@ -7938,7 +7879,7 @@
           <a:p>
             <a:pPr lvl="0"/>
             <a:r>
-              <a:rPr lang="en-US" smtClean="0"/>
+              <a:rPr lang="en-US"/>
               <a:t>Click to edit Master text styles</a:t>
             </a:r>
           </a:p>
@@ -7961,7 +7902,7 @@
           <a:p>
             <a:fld id="{699DC775-C286-4358-8C92-D7E584E969B3}" type="datetimeFigureOut">
               <a:rPr lang="en-US" smtClean="0"/>
-              <a:t>3/12/2017</a:t>
+              <a:t>3/20/2017</a:t>
             </a:fld>
             <a:endParaRPr lang="en-US"/>
           </a:p>
@@ -8070,10 +8011,9 @@
           <a:lstStyle/>
           <a:p>
             <a:r>
-              <a:rPr lang="en-US" smtClean="0"/>
+              <a:rPr lang="en-US"/>
               <a:t>Click to edit Master title style</a:t>
             </a:r>
-            <a:endParaRPr lang="en-US"/>
           </a:p>
         </p:txBody>
       </p:sp>
@@ -8104,38 +8044,37 @@
           <a:p>
             <a:pPr lvl="0"/>
             <a:r>
-              <a:rPr lang="en-US" smtClean="0"/>
+              <a:rPr lang="en-US"/>
               <a:t>Click to edit Master text styles</a:t>
             </a:r>
           </a:p>
           <a:p>
             <a:pPr lvl="1"/>
             <a:r>
-              <a:rPr lang="en-US" smtClean="0"/>
+              <a:rPr lang="en-US"/>
               <a:t>Second level</a:t>
             </a:r>
           </a:p>
           <a:p>
             <a:pPr lvl="2"/>
             <a:r>
-              <a:rPr lang="en-US" smtClean="0"/>
+              <a:rPr lang="en-US"/>
               <a:t>Third level</a:t>
             </a:r>
           </a:p>
           <a:p>
             <a:pPr lvl="3"/>
             <a:r>
-              <a:rPr lang="en-US" smtClean="0"/>
+              <a:rPr lang="en-US"/>
               <a:t>Fourth level</a:t>
             </a:r>
           </a:p>
           <a:p>
             <a:pPr lvl="4"/>
             <a:r>
-              <a:rPr lang="en-US" smtClean="0"/>
+              <a:rPr lang="en-US"/>
               <a:t>Fifth level</a:t>
             </a:r>
-            <a:endParaRPr lang="en-US"/>
           </a:p>
         </p:txBody>
       </p:sp>
@@ -8174,7 +8113,7 @@
           <a:p>
             <a:fld id="{699DC775-C286-4358-8C92-D7E584E969B3}" type="datetimeFigureOut">
               <a:rPr lang="en-US" smtClean="0"/>
-              <a:t>3/12/2017</a:t>
+              <a:t>3/20/2017</a:t>
             </a:fld>
             <a:endParaRPr lang="en-US"/>
           </a:p>
@@ -8585,10 +8524,9 @@
           <a:lstStyle/>
           <a:p>
             <a:r>
-              <a:rPr lang="en-US" smtClean="0"/>
+              <a:rPr lang="en-US"/>
               <a:t>Click to edit Master title style</a:t>
             </a:r>
-            <a:endParaRPr lang="en-US"/>
           </a:p>
         </p:txBody>
       </p:sp>
@@ -8619,38 +8557,37 @@
           <a:p>
             <a:pPr lvl="0"/>
             <a:r>
-              <a:rPr lang="en-US" smtClean="0"/>
+              <a:rPr lang="en-US"/>
               <a:t>Click to edit Master text styles</a:t>
             </a:r>
           </a:p>
           <a:p>
             <a:pPr lvl="1"/>
             <a:r>
-              <a:rPr lang="en-US" smtClean="0"/>
+              <a:rPr lang="en-US"/>
               <a:t>Second level</a:t>
             </a:r>
           </a:p>
           <a:p>
             <a:pPr lvl="2"/>
             <a:r>
-              <a:rPr lang="en-US" smtClean="0"/>
+              <a:rPr lang="en-US"/>
               <a:t>Third level</a:t>
             </a:r>
           </a:p>
           <a:p>
             <a:pPr lvl="3"/>
             <a:r>
-              <a:rPr lang="en-US" smtClean="0"/>
+              <a:rPr lang="en-US"/>
               <a:t>Fourth level</a:t>
             </a:r>
           </a:p>
           <a:p>
             <a:pPr lvl="4"/>
             <a:r>
-              <a:rPr lang="en-US" smtClean="0"/>
+              <a:rPr lang="en-US"/>
               <a:t>Fifth level</a:t>
             </a:r>
-            <a:endParaRPr lang="en-US"/>
           </a:p>
         </p:txBody>
       </p:sp>
@@ -8689,7 +8626,7 @@
           <a:p>
             <a:fld id="{699DC775-C286-4358-8C92-D7E584E969B3}" type="datetimeFigureOut">
               <a:rPr lang="en-US" smtClean="0"/>
-              <a:t>3/12/2017</a:t>
+              <a:t>3/20/2017</a:t>
             </a:fld>
             <a:endParaRPr lang="en-US"/>
           </a:p>
@@ -9098,10 +9035,9 @@
           <a:lstStyle/>
           <a:p>
             <a:r>
-              <a:rPr lang="en-US" dirty="0" smtClean="0"/>
+              <a:rPr lang="en-US" dirty="0"/>
               <a:t>Click to edit Master title style</a:t>
             </a:r>
-            <a:endParaRPr lang="en-US" dirty="0"/>
           </a:p>
         </p:txBody>
       </p:sp>
@@ -9132,38 +9068,37 @@
           <a:p>
             <a:pPr lvl="0"/>
             <a:r>
-              <a:rPr lang="en-US" smtClean="0"/>
+              <a:rPr lang="en-US"/>
               <a:t>Click to edit Master text styles</a:t>
             </a:r>
           </a:p>
           <a:p>
             <a:pPr lvl="1"/>
             <a:r>
-              <a:rPr lang="en-US" smtClean="0"/>
+              <a:rPr lang="en-US"/>
               <a:t>Second level</a:t>
             </a:r>
           </a:p>
           <a:p>
             <a:pPr lvl="2"/>
             <a:r>
-              <a:rPr lang="en-US" smtClean="0"/>
+              <a:rPr lang="en-US"/>
               <a:t>Third level</a:t>
             </a:r>
           </a:p>
           <a:p>
             <a:pPr lvl="3"/>
             <a:r>
-              <a:rPr lang="en-US" smtClean="0"/>
+              <a:rPr lang="en-US"/>
               <a:t>Fourth level</a:t>
             </a:r>
           </a:p>
           <a:p>
             <a:pPr lvl="4"/>
             <a:r>
-              <a:rPr lang="en-US" smtClean="0"/>
+              <a:rPr lang="en-US"/>
               <a:t>Fifth level</a:t>
             </a:r>
-            <a:endParaRPr lang="en-US"/>
           </a:p>
         </p:txBody>
       </p:sp>
@@ -9202,7 +9137,7 @@
           <a:p>
             <a:fld id="{699DC775-C286-4358-8C92-D7E584E969B3}" type="datetimeFigureOut">
               <a:rPr lang="en-US" smtClean="0"/>
-              <a:t>3/12/2017</a:t>
+              <a:t>3/20/2017</a:t>
             </a:fld>
             <a:endParaRPr lang="en-US"/>
           </a:p>
@@ -9595,7 +9530,7 @@
           <a:lstStyle/>
           <a:p>
             <a:r>
-              <a:rPr lang="en-US" sz="5400" b="1" dirty="0" err="1" smtClean="0">
+              <a:rPr lang="en-US" sz="5400" b="1" dirty="0" err="1">
                 <a:solidFill>
                   <a:schemeClr val="accent6">
                     <a:lumMod val="75000"/>
@@ -9605,7 +9540,7 @@
               <a:t>PowerPointLabs</a:t>
             </a:r>
             <a:r>
-              <a:rPr lang="en-US" sz="5400" b="1" dirty="0" smtClean="0">
+              <a:rPr lang="en-US" sz="5400" b="1" dirty="0">
                 <a:solidFill>
                   <a:schemeClr val="accent6">
                     <a:lumMod val="75000"/>
@@ -9643,7 +9578,7 @@
               <a:buNone/>
             </a:pPr>
             <a:r>
-              <a:rPr lang="en-US" b="1" dirty="0" smtClean="0">
+              <a:rPr lang="en-US" b="1" dirty="0">
                 <a:solidFill>
                   <a:srgbClr val="0070C0"/>
                 </a:solidFill>
@@ -9654,34 +9589,21 @@
           <a:p>
             <a:pPr marL="285750" indent="-285750"/>
             <a:r>
-              <a:rPr lang="en-US" b="1" dirty="0" smtClean="0">
-                <a:solidFill>
-                  <a:srgbClr val="0070C0"/>
-                </a:solidFill>
-              </a:rPr>
-              <a:t>DO </a:t>
-            </a:r>
-            <a:r>
               <a:rPr lang="en-US" b="1" dirty="0">
                 <a:solidFill>
                   <a:srgbClr val="0070C0"/>
                 </a:solidFill>
               </a:rPr>
-              <a:t>NOT SAVE </a:t>
-            </a:r>
-            <a:r>
-              <a:rPr lang="en-US" dirty="0" smtClean="0">
+              <a:t>DO NOT SAVE </a:t>
+            </a:r>
+            <a:r>
+              <a:rPr lang="en-US" dirty="0">
                 <a:solidFill>
                   <a:srgbClr val="0070C0"/>
                 </a:solidFill>
               </a:rPr>
               <a:t>these slides after testing. Keep this file in its original form.</a:t>
             </a:r>
-            <a:endParaRPr lang="en-US" dirty="0">
-              <a:solidFill>
-                <a:srgbClr val="0070C0"/>
-              </a:solidFill>
-            </a:endParaRPr>
           </a:p>
           <a:p>
             <a:pPr marL="285750" indent="-285750"/>
@@ -9691,47 +9613,7 @@
                   <a:srgbClr val="0070C0"/>
                 </a:solidFill>
               </a:rPr>
-              <a:t>If </a:t>
-            </a:r>
-            <a:r>
-              <a:rPr lang="en-US" dirty="0" smtClean="0">
-                <a:solidFill>
-                  <a:srgbClr val="0070C0"/>
-                </a:solidFill>
-              </a:rPr>
-              <a:t>your </a:t>
-            </a:r>
-            <a:r>
-              <a:rPr lang="en-US" dirty="0">
-                <a:solidFill>
-                  <a:srgbClr val="0070C0"/>
-                </a:solidFill>
-              </a:rPr>
-              <a:t>result </a:t>
-            </a:r>
-            <a:r>
-              <a:rPr lang="en-US" dirty="0" smtClean="0">
-                <a:solidFill>
-                  <a:srgbClr val="0070C0"/>
-                </a:solidFill>
-              </a:rPr>
-              <a:t>is different from the </a:t>
-            </a:r>
-            <a:r>
-              <a:rPr lang="en-US" dirty="0">
-                <a:solidFill>
-                  <a:srgbClr val="0070C0"/>
-                </a:solidFill>
-              </a:rPr>
-              <a:t>expected output, </a:t>
-            </a:r>
-            <a:r>
-              <a:rPr lang="en-US" dirty="0" smtClean="0">
-                <a:solidFill>
-                  <a:srgbClr val="0070C0"/>
-                </a:solidFill>
-              </a:rPr>
-              <a:t>please submit a bug report (attach slides/screenshots as necessary).</a:t>
+              <a:t>If your result is different from the expected output, please submit a bug report (attach slides/screenshots as necessary).</a:t>
             </a:r>
             <a:endParaRPr lang="en-SG" dirty="0">
               <a:solidFill>
@@ -9758,227 +9640,6 @@
 </file>
 
 <file path=ppt/slides/slide10.xml><?xml version="1.0" encoding="utf-8"?>
-<p:sld xmlns:a="http://schemas.openxmlformats.org/drawingml/2006/main" xmlns:r="http://schemas.openxmlformats.org/officeDocument/2006/relationships" xmlns:p="http://schemas.openxmlformats.org/presentationml/2006/main">
-  <p:cSld>
-    <p:spTree>
-      <p:nvGrpSpPr>
-        <p:cNvPr id="1" name=""/>
-        <p:cNvGrpSpPr/>
-        <p:nvPr/>
-      </p:nvGrpSpPr>
-      <p:grpSpPr>
-        <a:xfrm>
-          <a:off x="0" y="0"/>
-          <a:ext cx="0" cy="0"/>
-          <a:chOff x="0" y="0"/>
-          <a:chExt cx="0" cy="0"/>
-        </a:xfrm>
-      </p:grpSpPr>
-      <p:pic>
-        <p:nvPicPr>
-          <p:cNvPr id="5" name="selectMe"/>
-          <p:cNvPicPr>
-            <a:picLocks noChangeAspect="1"/>
-          </p:cNvPicPr>
-          <p:nvPr/>
-        </p:nvPicPr>
-        <p:blipFill>
-          <a:blip r:embed="rId2">
-            <a:extLst>
-              <a:ext uri="{28A0092B-C50C-407E-A947-70E740481C1C}">
-                <a14:useLocalDpi xmlns:a14="http://schemas.microsoft.com/office/drawing/2010/main" val="0"/>
-              </a:ext>
-            </a:extLst>
-          </a:blip>
-          <a:stretch>
-            <a:fillRect/>
-          </a:stretch>
-        </p:blipFill>
-        <p:spPr>
-          <a:xfrm>
-            <a:off x="-1676400" y="-2819400"/>
-            <a:ext cx="12420600" cy="8308702"/>
-          </a:xfrm>
-          <a:prstGeom prst="rect">
-            <a:avLst/>
-          </a:prstGeom>
-        </p:spPr>
-      </p:pic>
-    </p:spTree>
-    <p:extLst>
-      <p:ext uri="{BB962C8B-B14F-4D97-AF65-F5344CB8AC3E}">
-        <p14:creationId xmlns:p14="http://schemas.microsoft.com/office/powerpoint/2010/main" val="2566138312"/>
-      </p:ext>
-    </p:extLst>
-  </p:cSld>
-  <p:clrMapOvr>
-    <a:masterClrMapping/>
-  </p:clrMapOvr>
-</p:sld>
-</file>
-
-<file path=ppt/slides/slide11.xml><?xml version="1.0" encoding="utf-8"?>
-<p:sld xmlns:a="http://schemas.openxmlformats.org/drawingml/2006/main" xmlns:r="http://schemas.openxmlformats.org/officeDocument/2006/relationships" xmlns:p="http://schemas.openxmlformats.org/presentationml/2006/main">
-  <p:cSld>
-    <p:spTree>
-      <p:nvGrpSpPr>
-        <p:cNvPr id="1" name=""/>
-        <p:cNvGrpSpPr/>
-        <p:nvPr/>
-      </p:nvGrpSpPr>
-      <p:grpSpPr>
-        <a:xfrm>
-          <a:off x="0" y="0"/>
-          <a:ext cx="0" cy="0"/>
-          <a:chOff x="0" y="0"/>
-          <a:chExt cx="0" cy="0"/>
-        </a:xfrm>
-      </p:grpSpPr>
-      <p:pic>
-        <p:nvPicPr>
-          <p:cNvPr id="5" name="selectMe"/>
-          <p:cNvPicPr>
-            <a:picLocks noChangeAspect="1"/>
-          </p:cNvPicPr>
-          <p:nvPr/>
-        </p:nvPicPr>
-        <p:blipFill rotWithShape="1">
-          <a:blip r:embed="rId2">
-            <a:extLst>
-              <a:ext uri="{28A0092B-C50C-407E-A947-70E740481C1C}">
-                <a14:useLocalDpi xmlns:a14="http://schemas.microsoft.com/office/drawing/2010/main" val="0"/>
-              </a:ext>
-            </a:extLst>
-          </a:blip>
-          <a:srcRect l="13497" t="33933" r="12884"/>
-          <a:stretch/>
-        </p:blipFill>
-        <p:spPr>
-          <a:xfrm>
-            <a:off x="0" y="0"/>
-            <a:ext cx="9144000" cy="5489302"/>
-          </a:xfrm>
-          <a:prstGeom prst="rect">
-            <a:avLst/>
-          </a:prstGeom>
-        </p:spPr>
-      </p:pic>
-      <p:sp>
-        <p:nvSpPr>
-          <p:cNvPr id="3" name="text"/>
-          <p:cNvSpPr txBox="1"/>
-          <p:nvPr/>
-        </p:nvSpPr>
-        <p:spPr>
-          <a:xfrm>
-            <a:off x="8101022" y="0"/>
-            <a:ext cx="1042978" cy="369332"/>
-          </a:xfrm>
-          <a:prstGeom prst="rect">
-            <a:avLst/>
-          </a:prstGeom>
-          <a:noFill/>
-        </p:spPr>
-        <p:txBody>
-          <a:bodyPr wrap="none" rtlCol="0">
-            <a:spAutoFit/>
-          </a:bodyPr>
-          <a:lstStyle/>
-          <a:p>
-            <a:r>
-              <a:rPr lang="en-SG" dirty="0" smtClean="0"/>
-              <a:t>Expected</a:t>
-            </a:r>
-            <a:endParaRPr lang="en-SG" dirty="0"/>
-          </a:p>
-        </p:txBody>
-      </p:sp>
-    </p:spTree>
-    <p:extLst>
-      <p:ext uri="{BB962C8B-B14F-4D97-AF65-F5344CB8AC3E}">
-        <p14:creationId xmlns:p14="http://schemas.microsoft.com/office/powerpoint/2010/main" val="2188246822"/>
-      </p:ext>
-    </p:extLst>
-  </p:cSld>
-  <p:clrMapOvr>
-    <a:masterClrMapping/>
-  </p:clrMapOvr>
-</p:sld>
-</file>
-
-<file path=ppt/slides/slide12.xml><?xml version="1.0" encoding="utf-8"?>
-<p:sld xmlns:a="http://schemas.openxmlformats.org/drawingml/2006/main" xmlns:r="http://schemas.openxmlformats.org/officeDocument/2006/relationships" xmlns:p="http://schemas.openxmlformats.org/presentationml/2006/main">
-  <p:cSld>
-    <p:spTree>
-      <p:nvGrpSpPr>
-        <p:cNvPr id="1" name=""/>
-        <p:cNvGrpSpPr/>
-        <p:nvPr/>
-      </p:nvGrpSpPr>
-      <p:grpSpPr>
-        <a:xfrm>
-          <a:off x="0" y="0"/>
-          <a:ext cx="0" cy="0"/>
-          <a:chOff x="0" y="0"/>
-          <a:chExt cx="0" cy="0"/>
-        </a:xfrm>
-      </p:grpSpPr>
-      <p:sp>
-        <p:nvSpPr>
-          <p:cNvPr id="2" name="Title 1"/>
-          <p:cNvSpPr>
-            <a:spLocks noGrp="1"/>
-          </p:cNvSpPr>
-          <p:nvPr>
-            <p:ph type="title"/>
-          </p:nvPr>
-        </p:nvSpPr>
-        <p:spPr/>
-        <p:txBody>
-          <a:bodyPr/>
-          <a:lstStyle/>
-          <a:p>
-            <a:r>
-              <a:rPr lang="en-US" dirty="0" smtClean="0"/>
-              <a:t>Auto Crop:: rotated picture crosses one edge</a:t>
-            </a:r>
-            <a:endParaRPr lang="en-SG" dirty="0"/>
-          </a:p>
-        </p:txBody>
-      </p:sp>
-      <p:sp>
-        <p:nvSpPr>
-          <p:cNvPr id="3" name="Content Placeholder 2"/>
-          <p:cNvSpPr>
-            <a:spLocks noGrp="1"/>
-          </p:cNvSpPr>
-          <p:nvPr>
-            <p:ph idx="1"/>
-          </p:nvPr>
-        </p:nvSpPr>
-        <p:spPr/>
-        <p:txBody>
-          <a:bodyPr/>
-          <a:lstStyle/>
-          <a:p>
-            <a:endParaRPr lang="en-SG" dirty="0"/>
-          </a:p>
-        </p:txBody>
-      </p:sp>
-    </p:spTree>
-    <p:extLst>
-      <p:ext uri="{BB962C8B-B14F-4D97-AF65-F5344CB8AC3E}">
-        <p14:creationId xmlns:p14="http://schemas.microsoft.com/office/powerpoint/2010/main" val="3585701570"/>
-      </p:ext>
-    </p:extLst>
-  </p:cSld>
-  <p:clrMapOvr>
-    <a:masterClrMapping/>
-  </p:clrMapOvr>
-</p:sld>
-</file>
-
-<file path=ppt/slides/slide13.xml><?xml version="1.0" encoding="utf-8"?>
 <p:sld xmlns:a="http://schemas.openxmlformats.org/drawingml/2006/main" xmlns:r="http://schemas.openxmlformats.org/officeDocument/2006/relationships" xmlns:p="http://schemas.openxmlformats.org/presentationml/2006/main">
   <p:cSld>
     <p:spTree>
@@ -10038,7 +9699,7 @@
 </p:sld>
 </file>
 
-<file path=ppt/slides/slide14.xml><?xml version="1.0" encoding="utf-8"?>
+<file path=ppt/slides/slide11.xml><?xml version="1.0" encoding="utf-8"?>
 <p:sld xmlns:a="http://schemas.openxmlformats.org/drawingml/2006/main" xmlns:r="http://schemas.openxmlformats.org/officeDocument/2006/relationships" xmlns:p="http://schemas.openxmlformats.org/presentationml/2006/main">
   <p:cSld>
     <p:spTree>
@@ -10078,10 +9739,9 @@
           <a:lstStyle/>
           <a:p>
             <a:r>
-              <a:rPr lang="en-SG" dirty="0" smtClean="0"/>
+              <a:rPr lang="en-SG" dirty="0"/>
               <a:t>Expected</a:t>
             </a:r>
-            <a:endParaRPr lang="en-SG" dirty="0"/>
           </a:p>
         </p:txBody>
       </p:sp>
@@ -10127,7 +9787,7 @@
 </p:sld>
 </file>
 
-<file path=ppt/slides/slide15.xml><?xml version="1.0" encoding="utf-8"?>
+<file path=ppt/slides/slide12.xml><?xml version="1.0" encoding="utf-8"?>
 <p:sld xmlns:a="http://schemas.openxmlformats.org/drawingml/2006/main" xmlns:r="http://schemas.openxmlformats.org/officeDocument/2006/relationships" xmlns:p="http://schemas.openxmlformats.org/presentationml/2006/main">
   <p:cSld>
     <p:spTree>
@@ -10160,7 +9820,7 @@
           <a:lstStyle/>
           <a:p>
             <a:r>
-              <a:rPr lang="en-US" dirty="0" smtClean="0"/>
+              <a:rPr lang="en-US" dirty="0"/>
               <a:t>Auto Crop:: rotated picture crosses multiple edges</a:t>
             </a:r>
             <a:endParaRPr lang="en-SG" dirty="0"/>
@@ -10199,7 +9859,7 @@
 </p:sld>
 </file>
 
-<file path=ppt/slides/slide16.xml><?xml version="1.0" encoding="utf-8"?>
+<file path=ppt/slides/slide13.xml><?xml version="1.0" encoding="utf-8"?>
 <p:sld xmlns:a="http://schemas.openxmlformats.org/drawingml/2006/main" xmlns:r="http://schemas.openxmlformats.org/officeDocument/2006/relationships" xmlns:p="http://schemas.openxmlformats.org/presentationml/2006/main">
   <p:cSld>
     <p:spTree>
@@ -10259,7 +9919,7 @@
 </p:sld>
 </file>
 
-<file path=ppt/slides/slide17.xml><?xml version="1.0" encoding="utf-8"?>
+<file path=ppt/slides/slide14.xml><?xml version="1.0" encoding="utf-8"?>
 <p:sld xmlns:a="http://schemas.openxmlformats.org/drawingml/2006/main" xmlns:r="http://schemas.openxmlformats.org/officeDocument/2006/relationships" xmlns:p="http://schemas.openxmlformats.org/presentationml/2006/main">
   <p:cSld>
     <p:spTree>
@@ -10299,10 +9959,9 @@
           <a:lstStyle/>
           <a:p>
             <a:r>
-              <a:rPr lang="en-SG" dirty="0" smtClean="0"/>
+              <a:rPr lang="en-SG" dirty="0"/>
               <a:t>Expected</a:t>
             </a:r>
-            <a:endParaRPr lang="en-SG" dirty="0"/>
           </a:p>
         </p:txBody>
       </p:sp>
@@ -10348,7 +10007,7 @@
 </p:sld>
 </file>
 
-<file path=ppt/slides/slide18.xml><?xml version="1.0" encoding="utf-8"?>
+<file path=ppt/slides/slide15.xml><?xml version="1.0" encoding="utf-8"?>
 <p:sld xmlns:a="http://schemas.openxmlformats.org/drawingml/2006/main" xmlns:r="http://schemas.openxmlformats.org/officeDocument/2006/relationships" xmlns:p="http://schemas.openxmlformats.org/presentationml/2006/main">
   <p:cSld>
     <p:spTree>
@@ -10381,7 +10040,7 @@
           <a:lstStyle/>
           <a:p>
             <a:r>
-              <a:rPr lang="en-US" dirty="0" smtClean="0"/>
+              <a:rPr lang="en-US" dirty="0"/>
               <a:t>Auto Crop:: multiple pictures</a:t>
             </a:r>
             <a:endParaRPr lang="en-SG" dirty="0"/>
@@ -10420,7 +10079,7 @@
 </p:sld>
 </file>
 
-<file path=ppt/slides/slide19.xml><?xml version="1.0" encoding="utf-8"?>
+<file path=ppt/slides/slide16.xml><?xml version="1.0" encoding="utf-8"?>
 <p:sld xmlns:a="http://schemas.openxmlformats.org/drawingml/2006/main" xmlns:r="http://schemas.openxmlformats.org/officeDocument/2006/relationships" xmlns:p="http://schemas.openxmlformats.org/presentationml/2006/main">
   <p:cSld>
     <p:spTree>
@@ -10570,184 +10229,7 @@
 </p:sld>
 </file>
 
-<file path=ppt/slides/slide2.xml><?xml version="1.0" encoding="utf-8"?>
-<p:sld xmlns:a="http://schemas.openxmlformats.org/drawingml/2006/main" xmlns:r="http://schemas.openxmlformats.org/officeDocument/2006/relationships" xmlns:p="http://schemas.openxmlformats.org/presentationml/2006/main">
-  <p:cSld>
-    <p:bg>
-      <p:bgPr>
-        <a:solidFill>
-          <a:schemeClr val="accent6">
-            <a:lumMod val="75000"/>
-          </a:schemeClr>
-        </a:solidFill>
-        <a:effectLst/>
-      </p:bgPr>
-    </p:bg>
-    <p:spTree>
-      <p:nvGrpSpPr>
-        <p:cNvPr id="1" name=""/>
-        <p:cNvGrpSpPr/>
-        <p:nvPr/>
-      </p:nvGrpSpPr>
-      <p:grpSpPr>
-        <a:xfrm>
-          <a:off x="0" y="0"/>
-          <a:ext cx="0" cy="0"/>
-          <a:chOff x="0" y="0"/>
-          <a:chExt cx="0" cy="0"/>
-        </a:xfrm>
-      </p:grpSpPr>
-      <p:sp>
-        <p:nvSpPr>
-          <p:cNvPr id="2" name="Title 1"/>
-          <p:cNvSpPr>
-            <a:spLocks noGrp="1"/>
-          </p:cNvSpPr>
-          <p:nvPr>
-            <p:ph type="title"/>
-          </p:nvPr>
-        </p:nvSpPr>
-        <p:spPr>
-          <a:xfrm>
-            <a:off x="381000" y="609600"/>
-            <a:ext cx="8229600" cy="1143000"/>
-          </a:xfrm>
-        </p:spPr>
-        <p:txBody>
-          <a:bodyPr>
-            <a:noAutofit/>
-          </a:bodyPr>
-          <a:lstStyle/>
-          <a:p>
-            <a:pPr algn="l"/>
-            <a:r>
-              <a:rPr lang="en-US" sz="7200" dirty="0" smtClean="0">
-                <a:solidFill>
-                  <a:schemeClr val="bg1"/>
-                </a:solidFill>
-              </a:rPr>
-              <a:t>Crop To Slide</a:t>
-            </a:r>
-            <a:endParaRPr lang="en-SG" sz="7200" dirty="0">
-              <a:solidFill>
-                <a:schemeClr val="bg1"/>
-              </a:solidFill>
-            </a:endParaRPr>
-          </a:p>
-        </p:txBody>
-      </p:sp>
-      <p:sp>
-        <p:nvSpPr>
-          <p:cNvPr id="3" name="text 5"/>
-          <p:cNvSpPr txBox="1"/>
-          <p:nvPr/>
-        </p:nvSpPr>
-        <p:spPr>
-          <a:xfrm>
-            <a:off x="542636" y="2819400"/>
-            <a:ext cx="7620000" cy="1938992"/>
-          </a:xfrm>
-          <a:prstGeom prst="rect">
-            <a:avLst/>
-          </a:prstGeom>
-          <a:noFill/>
-        </p:spPr>
-        <p:txBody>
-          <a:bodyPr wrap="square" rtlCol="0">
-            <a:spAutoFit/>
-          </a:bodyPr>
-          <a:lstStyle/>
-          <a:p>
-            <a:r>
-              <a:rPr lang="en-US" sz="2400" b="1" dirty="0" smtClean="0">
-                <a:solidFill>
-                  <a:schemeClr val="bg1"/>
-                </a:solidFill>
-              </a:rPr>
-              <a:t>Additional instructions:</a:t>
-            </a:r>
-          </a:p>
-          <a:p>
-            <a:pPr marL="285750" indent="-285750">
-              <a:buFont typeface="Arial" panose="020B0604020202020204" pitchFamily="34" charset="0"/>
-              <a:buChar char="•"/>
-            </a:pPr>
-            <a:r>
-              <a:rPr lang="en-US" sz="2400" dirty="0" smtClean="0">
-                <a:solidFill>
-                  <a:schemeClr val="bg1"/>
-                </a:solidFill>
-              </a:rPr>
-              <a:t>Select the picture(s).</a:t>
-            </a:r>
-          </a:p>
-          <a:p>
-            <a:pPr marL="285750" indent="-285750">
-              <a:buFont typeface="Arial" panose="020B0604020202020204" pitchFamily="34" charset="0"/>
-              <a:buChar char="•"/>
-            </a:pPr>
-            <a:r>
-              <a:rPr lang="en-US" sz="2400" dirty="0" smtClean="0">
-                <a:solidFill>
-                  <a:schemeClr val="bg1"/>
-                </a:solidFill>
-              </a:rPr>
-              <a:t>Click it and then select </a:t>
-            </a:r>
-            <a:r>
-              <a:rPr lang="en-US" sz="2400" b="1" dirty="0" smtClean="0">
-                <a:solidFill>
-                  <a:schemeClr val="bg1"/>
-                </a:solidFill>
-              </a:rPr>
-              <a:t>“Crop to Slide” </a:t>
-            </a:r>
-            <a:r>
-              <a:rPr lang="en-US" sz="2400" dirty="0" smtClean="0">
-                <a:solidFill>
-                  <a:schemeClr val="bg1"/>
-                </a:solidFill>
-              </a:rPr>
-              <a:t>in the context menu. </a:t>
-            </a:r>
-          </a:p>
-          <a:p>
-            <a:pPr marL="285750" indent="-285750">
-              <a:buFont typeface="Arial" panose="020B0604020202020204" pitchFamily="34" charset="0"/>
-              <a:buChar char="•"/>
-            </a:pPr>
-            <a:r>
-              <a:rPr lang="en-US" sz="2400" dirty="0" smtClean="0">
-                <a:solidFill>
-                  <a:schemeClr val="bg1"/>
-                </a:solidFill>
-              </a:rPr>
-              <a:t>Compare the result with the expected output.</a:t>
-            </a:r>
-          </a:p>
-        </p:txBody>
-      </p:sp>
-    </p:spTree>
-    <p:extLst>
-      <p:ext uri="{BB962C8B-B14F-4D97-AF65-F5344CB8AC3E}">
-        <p14:creationId xmlns:p14="http://schemas.microsoft.com/office/powerpoint/2010/main" val="1569131388"/>
-      </p:ext>
-    </p:extLst>
-  </p:cSld>
-  <p:clrMapOvr>
-    <a:masterClrMapping/>
-  </p:clrMapOvr>
-  <p:timing>
-    <p:tnLst>
-      <p:par>
-        <p:cTn id="1" dur="indefinite" restart="never" nodeType="tmRoot"/>
-      </p:par>
-    </p:tnLst>
-  </p:timing>
-</p:sld>
-</file>
-
-<file path=ppt/slides/slide20.xml><?xml version="1.0" encoding="utf-8"?>
+<file path=ppt/slides/slide17.xml><?xml version="1.0" encoding="utf-8"?>
 <p:sld xmlns:a="http://schemas.openxmlformats.org/drawingml/2006/main" xmlns:r="http://schemas.openxmlformats.org/officeDocument/2006/relationships" xmlns:p="http://schemas.openxmlformats.org/presentationml/2006/main">
   <p:cSld>
     <p:spTree>
@@ -10903,10 +10385,9 @@
           <a:lstStyle/>
           <a:p>
             <a:r>
-              <a:rPr lang="en-SG" dirty="0" smtClean="0"/>
+              <a:rPr lang="en-SG" dirty="0"/>
               <a:t>Expected</a:t>
             </a:r>
-            <a:endParaRPr lang="en-SG" dirty="0"/>
           </a:p>
         </p:txBody>
       </p:sp>
@@ -10923,7 +10404,7 @@
 </p:sld>
 </file>
 
-<file path=ppt/slides/slide21.xml><?xml version="1.0" encoding="utf-8"?>
+<file path=ppt/slides/slide18.xml><?xml version="1.0" encoding="utf-8"?>
 <p:sld xmlns:a="http://schemas.openxmlformats.org/drawingml/2006/main" xmlns:r="http://schemas.openxmlformats.org/officeDocument/2006/relationships" xmlns:p="http://schemas.openxmlformats.org/presentationml/2006/main">
   <p:cSld>
     <p:spTree>
@@ -10956,7 +10437,7 @@
           <a:lstStyle/>
           <a:p>
             <a:r>
-              <a:rPr lang="en-US" dirty="0" smtClean="0"/>
+              <a:rPr lang="en-US" dirty="0"/>
               <a:t>Auto Crop:: multiple pictures rotated</a:t>
             </a:r>
             <a:endParaRPr lang="en-SG" dirty="0"/>
@@ -10995,7 +10476,7 @@
 </p:sld>
 </file>
 
-<file path=ppt/slides/slide22.xml><?xml version="1.0" encoding="utf-8"?>
+<file path=ppt/slides/slide19.xml><?xml version="1.0" encoding="utf-8"?>
 <p:sld xmlns:a="http://schemas.openxmlformats.org/drawingml/2006/main" xmlns:r="http://schemas.openxmlformats.org/officeDocument/2006/relationships" xmlns:p="http://schemas.openxmlformats.org/presentationml/2006/main">
   <p:cSld>
     <p:spTree>
@@ -11145,7 +10626,177 @@
 </p:sld>
 </file>
 
-<file path=ppt/slides/slide23.xml><?xml version="1.0" encoding="utf-8"?>
+<file path=ppt/slides/slide2.xml><?xml version="1.0" encoding="utf-8"?>
+<p:sld xmlns:a="http://schemas.openxmlformats.org/drawingml/2006/main" xmlns:r="http://schemas.openxmlformats.org/officeDocument/2006/relationships" xmlns:p="http://schemas.openxmlformats.org/presentationml/2006/main">
+  <p:cSld>
+    <p:bg>
+      <p:bgPr>
+        <a:solidFill>
+          <a:schemeClr val="accent6">
+            <a:lumMod val="75000"/>
+          </a:schemeClr>
+        </a:solidFill>
+        <a:effectLst/>
+      </p:bgPr>
+    </p:bg>
+    <p:spTree>
+      <p:nvGrpSpPr>
+        <p:cNvPr id="1" name=""/>
+        <p:cNvGrpSpPr/>
+        <p:nvPr/>
+      </p:nvGrpSpPr>
+      <p:grpSpPr>
+        <a:xfrm>
+          <a:off x="0" y="0"/>
+          <a:ext cx="0" cy="0"/>
+          <a:chOff x="0" y="0"/>
+          <a:chExt cx="0" cy="0"/>
+        </a:xfrm>
+      </p:grpSpPr>
+      <p:sp>
+        <p:nvSpPr>
+          <p:cNvPr id="2" name="Title 1"/>
+          <p:cNvSpPr>
+            <a:spLocks noGrp="1"/>
+          </p:cNvSpPr>
+          <p:nvPr>
+            <p:ph type="title"/>
+          </p:nvPr>
+        </p:nvSpPr>
+        <p:spPr>
+          <a:xfrm>
+            <a:off x="381000" y="609600"/>
+            <a:ext cx="8229600" cy="1143000"/>
+          </a:xfrm>
+        </p:spPr>
+        <p:txBody>
+          <a:bodyPr>
+            <a:noAutofit/>
+          </a:bodyPr>
+          <a:lstStyle/>
+          <a:p>
+            <a:pPr algn="l"/>
+            <a:r>
+              <a:rPr lang="en-US" sz="7200" dirty="0">
+                <a:solidFill>
+                  <a:schemeClr val="bg1"/>
+                </a:solidFill>
+              </a:rPr>
+              <a:t>Crop To Slide</a:t>
+            </a:r>
+            <a:endParaRPr lang="en-SG" sz="7200" dirty="0">
+              <a:solidFill>
+                <a:schemeClr val="bg1"/>
+              </a:solidFill>
+            </a:endParaRPr>
+          </a:p>
+        </p:txBody>
+      </p:sp>
+      <p:sp>
+        <p:nvSpPr>
+          <p:cNvPr id="3" name="text 5"/>
+          <p:cNvSpPr txBox="1"/>
+          <p:nvPr/>
+        </p:nvSpPr>
+        <p:spPr>
+          <a:xfrm>
+            <a:off x="542636" y="2819400"/>
+            <a:ext cx="7620000" cy="1938992"/>
+          </a:xfrm>
+          <a:prstGeom prst="rect">
+            <a:avLst/>
+          </a:prstGeom>
+          <a:noFill/>
+        </p:spPr>
+        <p:txBody>
+          <a:bodyPr wrap="square" rtlCol="0">
+            <a:spAutoFit/>
+          </a:bodyPr>
+          <a:lstStyle/>
+          <a:p>
+            <a:r>
+              <a:rPr lang="en-US" sz="2400" b="1" dirty="0">
+                <a:solidFill>
+                  <a:schemeClr val="bg1"/>
+                </a:solidFill>
+              </a:rPr>
+              <a:t>Additional instructions:</a:t>
+            </a:r>
+          </a:p>
+          <a:p>
+            <a:pPr marL="285750" indent="-285750">
+              <a:buFont typeface="Arial" panose="020B0604020202020204" pitchFamily="34" charset="0"/>
+              <a:buChar char="•"/>
+            </a:pPr>
+            <a:r>
+              <a:rPr lang="en-US" sz="2400" dirty="0">
+                <a:solidFill>
+                  <a:schemeClr val="bg1"/>
+                </a:solidFill>
+              </a:rPr>
+              <a:t>Select the picture(s).</a:t>
+            </a:r>
+          </a:p>
+          <a:p>
+            <a:pPr marL="285750" indent="-285750">
+              <a:buFont typeface="Arial" panose="020B0604020202020204" pitchFamily="34" charset="0"/>
+              <a:buChar char="•"/>
+            </a:pPr>
+            <a:r>
+              <a:rPr lang="en-US" sz="2400" dirty="0">
+                <a:solidFill>
+                  <a:schemeClr val="bg1"/>
+                </a:solidFill>
+              </a:rPr>
+              <a:t>Click it and then select </a:t>
+            </a:r>
+            <a:r>
+              <a:rPr lang="en-US" sz="2400" b="1" dirty="0">
+                <a:solidFill>
+                  <a:schemeClr val="bg1"/>
+                </a:solidFill>
+              </a:rPr>
+              <a:t>“Crop to Slide” </a:t>
+            </a:r>
+            <a:r>
+              <a:rPr lang="en-US" sz="2400" dirty="0">
+                <a:solidFill>
+                  <a:schemeClr val="bg1"/>
+                </a:solidFill>
+              </a:rPr>
+              <a:t>in the context menu. </a:t>
+            </a:r>
+          </a:p>
+          <a:p>
+            <a:pPr marL="285750" indent="-285750">
+              <a:buFont typeface="Arial" panose="020B0604020202020204" pitchFamily="34" charset="0"/>
+              <a:buChar char="•"/>
+            </a:pPr>
+            <a:r>
+              <a:rPr lang="en-US" sz="2400" dirty="0">
+                <a:solidFill>
+                  <a:schemeClr val="bg1"/>
+                </a:solidFill>
+              </a:rPr>
+              <a:t>Compare the result with the expected output.</a:t>
+            </a:r>
+          </a:p>
+        </p:txBody>
+      </p:sp>
+    </p:spTree>
+    <p:extLst>
+      <p:ext uri="{BB962C8B-B14F-4D97-AF65-F5344CB8AC3E}">
+        <p14:creationId xmlns:p14="http://schemas.microsoft.com/office/powerpoint/2010/main" val="1569131388"/>
+      </p:ext>
+    </p:extLst>
+  </p:cSld>
+  <p:clrMapOvr>
+    <a:masterClrMapping/>
+  </p:clrMapOvr>
+</p:sld>
+</file>
+
+<file path=ppt/slides/slide20.xml><?xml version="1.0" encoding="utf-8"?>
 <p:sld xmlns:a="http://schemas.openxmlformats.org/drawingml/2006/main" xmlns:r="http://schemas.openxmlformats.org/officeDocument/2006/relationships" xmlns:p="http://schemas.openxmlformats.org/presentationml/2006/main">
   <p:cSld>
     <p:spTree>
@@ -11301,10 +10952,9 @@
           <a:lstStyle/>
           <a:p>
             <a:r>
-              <a:rPr lang="en-SG" dirty="0" smtClean="0"/>
+              <a:rPr lang="en-SG" dirty="0"/>
               <a:t>Expected</a:t>
             </a:r>
-            <a:endParaRPr lang="en-SG" dirty="0"/>
           </a:p>
         </p:txBody>
       </p:sp>
@@ -11321,7 +10971,7 @@
 </p:sld>
 </file>
 
-<file path=ppt/slides/slide24.xml><?xml version="1.0" encoding="utf-8"?>
+<file path=ppt/slides/slide21.xml><?xml version="1.0" encoding="utf-8"?>
 <p:sld xmlns:a="http://schemas.openxmlformats.org/drawingml/2006/main" xmlns:r="http://schemas.openxmlformats.org/officeDocument/2006/relationships" xmlns:p="http://schemas.openxmlformats.org/presentationml/2006/main">
   <p:cSld>
     <p:spTree>
@@ -11354,7 +11004,7 @@
           <a:lstStyle/>
           <a:p>
             <a:r>
-              <a:rPr lang="en-US" dirty="0" smtClean="0"/>
+              <a:rPr lang="en-US" dirty="0"/>
               <a:t>Auto Crop:: multiple shapes rotated</a:t>
             </a:r>
             <a:endParaRPr lang="en-SG" dirty="0"/>
@@ -11393,7 +11043,7 @@
 </p:sld>
 </file>
 
-<file path=ppt/slides/slide25.xml><?xml version="1.0" encoding="utf-8"?>
+<file path=ppt/slides/slide22.xml><?xml version="1.0" encoding="utf-8"?>
 <p:sld xmlns:a="http://schemas.openxmlformats.org/drawingml/2006/main" xmlns:r="http://schemas.openxmlformats.org/officeDocument/2006/relationships" xmlns:p="http://schemas.openxmlformats.org/presentationml/2006/main">
   <p:cSld>
     <p:spTree>
@@ -11583,7 +11233,7 @@
 </p:sld>
 </file>
 
-<file path=ppt/slides/slide26.xml><?xml version="1.0" encoding="utf-8"?>
+<file path=ppt/slides/slide23.xml><?xml version="1.0" encoding="utf-8"?>
 <p:sld xmlns:a="http://schemas.openxmlformats.org/drawingml/2006/main" xmlns:r="http://schemas.openxmlformats.org/officeDocument/2006/relationships" xmlns:p="http://schemas.openxmlformats.org/presentationml/2006/main">
   <p:cSld>
     <p:spTree>
@@ -11623,10 +11273,9 @@
           <a:lstStyle/>
           <a:p>
             <a:r>
-              <a:rPr lang="en-SG" dirty="0" smtClean="0"/>
+              <a:rPr lang="en-SG" dirty="0"/>
               <a:t>Expected</a:t>
             </a:r>
-            <a:endParaRPr lang="en-SG" dirty="0"/>
           </a:p>
         </p:txBody>
       </p:sp>
@@ -11759,7 +11408,7 @@
 </p:sld>
 </file>
 
-<file path=ppt/slides/slide27.xml><?xml version="1.0" encoding="utf-8"?>
+<file path=ppt/slides/slide24.xml><?xml version="1.0" encoding="utf-8"?>
 <p:sld xmlns:a="http://schemas.openxmlformats.org/drawingml/2006/main" xmlns:r="http://schemas.openxmlformats.org/officeDocument/2006/relationships" xmlns:p="http://schemas.openxmlformats.org/presentationml/2006/main">
   <p:cSld>
     <p:spTree>
@@ -11792,7 +11441,7 @@
           <a:lstStyle/>
           <a:p>
             <a:r>
-              <a:rPr lang="en-US" dirty="0" smtClean="0"/>
+              <a:rPr lang="en-US" dirty="0"/>
               <a:t>Auto Crop:: non-picture/shape selected</a:t>
             </a:r>
             <a:endParaRPr lang="en-SG" dirty="0"/>
@@ -11815,10 +11464,9 @@
           <a:lstStyle/>
           <a:p>
             <a:r>
-              <a:rPr lang="en-SG" dirty="0" smtClean="0"/>
+              <a:rPr lang="en-SG" dirty="0"/>
               <a:t>Gives error message</a:t>
             </a:r>
-            <a:endParaRPr lang="en-SG" dirty="0"/>
           </a:p>
         </p:txBody>
       </p:sp>
@@ -11835,7 +11483,7 @@
 </p:sld>
 </file>
 
-<file path=ppt/slides/slide28.xml><?xml version="1.0" encoding="utf-8"?>
+<file path=ppt/slides/slide25.xml><?xml version="1.0" encoding="utf-8"?>
 <p:sld xmlns:a="http://schemas.openxmlformats.org/drawingml/2006/main" xmlns:r="http://schemas.openxmlformats.org/officeDocument/2006/relationships" xmlns:p="http://schemas.openxmlformats.org/presentationml/2006/main">
   <p:cSld>
     <p:spTree>
@@ -11875,7 +11523,7 @@
           <a:lstStyle/>
           <a:p>
             <a:r>
-              <a:rPr lang="en-SG" dirty="0" smtClean="0"/>
+              <a:rPr lang="en-SG" dirty="0"/>
               <a:t>Some non-picture/shape object</a:t>
             </a:r>
           </a:p>
@@ -11894,7 +11542,7 @@
 </p:sld>
 </file>
 
-<file path=ppt/slides/slide29.xml><?xml version="1.0" encoding="utf-8"?>
+<file path=ppt/slides/slide26.xml><?xml version="1.0" encoding="utf-8"?>
 <p:sld xmlns:a="http://schemas.openxmlformats.org/drawingml/2006/main" xmlns:r="http://schemas.openxmlformats.org/officeDocument/2006/relationships" xmlns:p="http://schemas.openxmlformats.org/presentationml/2006/main">
   <p:cSld>
     <p:spTree>
@@ -11927,7 +11575,7 @@
           <a:lstStyle/>
           <a:p>
             <a:r>
-              <a:rPr lang="en-US" dirty="0" smtClean="0"/>
+              <a:rPr lang="en-US" dirty="0"/>
               <a:t>Auto Crop:: nothing selected</a:t>
             </a:r>
             <a:endParaRPr lang="en-SG" dirty="0"/>
@@ -11972,79 +11620,7 @@
 </p:sld>
 </file>
 
-<file path=ppt/slides/slide3.xml><?xml version="1.0" encoding="utf-8"?>
-<p:sld xmlns:a="http://schemas.openxmlformats.org/drawingml/2006/main" xmlns:r="http://schemas.openxmlformats.org/officeDocument/2006/relationships" xmlns:p="http://schemas.openxmlformats.org/presentationml/2006/main">
-  <p:cSld>
-    <p:spTree>
-      <p:nvGrpSpPr>
-        <p:cNvPr id="1" name=""/>
-        <p:cNvGrpSpPr/>
-        <p:nvPr/>
-      </p:nvGrpSpPr>
-      <p:grpSpPr>
-        <a:xfrm>
-          <a:off x="0" y="0"/>
-          <a:ext cx="0" cy="0"/>
-          <a:chOff x="0" y="0"/>
-          <a:chExt cx="0" cy="0"/>
-        </a:xfrm>
-      </p:grpSpPr>
-      <p:sp>
-        <p:nvSpPr>
-          <p:cNvPr id="2" name="Title 1"/>
-          <p:cNvSpPr>
-            <a:spLocks noGrp="1"/>
-          </p:cNvSpPr>
-          <p:nvPr>
-            <p:ph type="title"/>
-          </p:nvPr>
-        </p:nvSpPr>
-        <p:spPr/>
-        <p:txBody>
-          <a:bodyPr/>
-          <a:lstStyle/>
-          <a:p>
-            <a:r>
-              <a:rPr lang="en-US" dirty="0" smtClean="0"/>
-              <a:t>Auto Crop:: picture in slide</a:t>
-            </a:r>
-            <a:endParaRPr lang="en-SG" dirty="0"/>
-          </a:p>
-        </p:txBody>
-      </p:sp>
-      <p:sp>
-        <p:nvSpPr>
-          <p:cNvPr id="3" name="Content Placeholder 2"/>
-          <p:cNvSpPr>
-            <a:spLocks noGrp="1"/>
-          </p:cNvSpPr>
-          <p:nvPr>
-            <p:ph idx="1"/>
-          </p:nvPr>
-        </p:nvSpPr>
-        <p:spPr/>
-        <p:txBody>
-          <a:bodyPr/>
-          <a:lstStyle/>
-          <a:p>
-            <a:endParaRPr lang="en-SG" dirty="0"/>
-          </a:p>
-        </p:txBody>
-      </p:sp>
-    </p:spTree>
-    <p:extLst>
-      <p:ext uri="{BB962C8B-B14F-4D97-AF65-F5344CB8AC3E}">
-        <p14:creationId xmlns:p14="http://schemas.microsoft.com/office/powerpoint/2010/main" val="1286891872"/>
-      </p:ext>
-    </p:extLst>
-  </p:cSld>
-  <p:clrMapOvr>
-    <a:masterClrMapping/>
-  </p:clrMapOvr>
-</p:sld>
-</file>
-
-<file path=ppt/slides/slide30.xml><?xml version="1.0" encoding="utf-8"?>
+<file path=ppt/slides/slide27.xml><?xml version="1.0" encoding="utf-8"?>
 <p:sld xmlns:a="http://schemas.openxmlformats.org/drawingml/2006/main" xmlns:r="http://schemas.openxmlformats.org/officeDocument/2006/relationships" xmlns:p="http://schemas.openxmlformats.org/presentationml/2006/main">
   <p:cSld>
     <p:spTree>
@@ -12074,8 +11650,8 @@
 </p:sld>
 </file>
 
-<file path=ppt/slides/slide31.xml><?xml version="1.0" encoding="utf-8"?>
-<p:sld xmlns:a="http://schemas.openxmlformats.org/drawingml/2006/main" xmlns:r="http://schemas.openxmlformats.org/officeDocument/2006/relationships" xmlns:p="http://schemas.openxmlformats.org/presentationml/2006/main" show="0">
+<file path=ppt/slides/slide28.xml><?xml version="1.0" encoding="utf-8"?>
+<p:sld xmlns:a="http://schemas.openxmlformats.org/drawingml/2006/main" xmlns:r="http://schemas.openxmlformats.org/officeDocument/2006/relationships" xmlns:p="http://schemas.openxmlformats.org/presentationml/2006/main">
   <p:cSld>
     <p:spTree>
       <p:nvGrpSpPr>
@@ -12093,7 +11669,7 @@
       </p:grpSpPr>
       <p:sp>
         <p:nvSpPr>
-          <p:cNvPr id="2" name="标题 1"/>
+          <p:cNvPr id="2" name="Title 1"/>
           <p:cNvSpPr>
             <a:spLocks noGrp="1"/>
           </p:cNvSpPr>
@@ -12106,78 +11682,55 @@
           <a:bodyPr/>
           <a:lstStyle/>
           <a:p>
-            <a:endParaRPr lang="en-SG"/>
-          </a:p>
-        </p:txBody>
-      </p:sp>
-      <p:pic>
-        <p:nvPicPr>
-          <p:cNvPr id="4" name="内容占位符 3"/>
-          <p:cNvPicPr>
-            <a:picLocks noGrp="1"/>
-          </p:cNvPicPr>
+            <a:r>
+              <a:rPr lang="en-US" dirty="0"/>
+              <a:t>Auto Crop:: nothing selected</a:t>
+            </a:r>
+            <a:endParaRPr lang="en-SG" dirty="0"/>
+          </a:p>
+        </p:txBody>
+      </p:sp>
+      <p:sp>
+        <p:nvSpPr>
+          <p:cNvPr id="3" name="Content Placeholder 2"/>
+          <p:cNvSpPr>
+            <a:spLocks noGrp="1"/>
+          </p:cNvSpPr>
           <p:nvPr>
             <p:ph idx="1"/>
           </p:nvPr>
-        </p:nvPicPr>
-        <p:blipFill>
-          <a:blip r:embed="rId2">
-            <a:extLst>
-              <a:ext uri="{28A0092B-C50C-407E-A947-70E740481C1C}">
-                <a14:useLocalDpi xmlns:a14="http://schemas.microsoft.com/office/drawing/2010/main" val="0"/>
-              </a:ext>
-            </a:extLst>
-          </a:blip>
-          <a:stretch>
-            <a:fillRect/>
-          </a:stretch>
-        </p:blipFill>
-        <p:spPr>
-          <a:xfrm>
-            <a:off x="1074665" y="1600200"/>
-            <a:ext cx="6994670" cy="4525963"/>
-          </a:xfrm>
-        </p:spPr>
-      </p:pic>
+        </p:nvSpPr>
+        <p:spPr/>
+        <p:txBody>
+          <a:bodyPr/>
+          <a:lstStyle/>
+          <a:p>
+            <a:r>
+              <a:rPr lang="en-SG" dirty="0"/>
+              <a:t>Gives error message</a:t>
+            </a:r>
+          </a:p>
+          <a:p>
+            <a:endParaRPr lang="en-SG" dirty="0"/>
+          </a:p>
+        </p:txBody>
+      </p:sp>
     </p:spTree>
     <p:extLst>
       <p:ext uri="{BB962C8B-B14F-4D97-AF65-F5344CB8AC3E}">
-        <p14:creationId xmlns:p14="http://schemas.microsoft.com/office/powerpoint/2010/main" val="2234878813"/>
+        <p14:creationId xmlns:p14="http://schemas.microsoft.com/office/powerpoint/2010/main" val="10243626"/>
       </p:ext>
     </p:extLst>
   </p:cSld>
   <p:clrMapOvr>
     <a:masterClrMapping/>
   </p:clrMapOvr>
-  <mc:AlternateContent xmlns:mc="http://schemas.openxmlformats.org/markup-compatibility/2006" xmlns:p14="http://schemas.microsoft.com/office/powerpoint/2010/main">
-    <mc:Choice Requires="p14">
-      <p:transition spd="slow" p14:dur="2000"/>
-    </mc:Choice>
-    <mc:Fallback xmlns="">
-      <p:transition spd="slow"/>
-    </mc:Fallback>
-  </mc:AlternateContent>
-  <p:timing>
-    <p:tnLst>
-      <p:par>
-        <p:cTn id="1" dur="indefinite" restart="never" nodeType="tmRoot"/>
-      </p:par>
-    </p:tnLst>
-  </p:timing>
 </p:sld>
 </file>
 
-<file path=ppt/slides/slide4.xml><?xml version="1.0" encoding="utf-8"?>
+<file path=ppt/slides/slide29.xml><?xml version="1.0" encoding="utf-8"?>
 <p:sld xmlns:a="http://schemas.openxmlformats.org/drawingml/2006/main" xmlns:r="http://schemas.openxmlformats.org/officeDocument/2006/relationships" xmlns:p="http://schemas.openxmlformats.org/presentationml/2006/main">
   <p:cSld>
-    <p:bg>
-      <p:bgPr>
-        <a:solidFill>
-          <a:schemeClr val="bg1"/>
-        </a:solidFill>
-        <a:effectLst/>
-      </p:bgPr>
-    </p:bg>
     <p:spTree>
       <p:nvGrpSpPr>
         <p:cNvPr id="1" name=""/>
@@ -12225,7 +11778,7 @@
     </p:spTree>
     <p:extLst>
       <p:ext uri="{BB962C8B-B14F-4D97-AF65-F5344CB8AC3E}">
-        <p14:creationId xmlns:p14="http://schemas.microsoft.com/office/powerpoint/2010/main" val="3976109174"/>
+        <p14:creationId xmlns:p14="http://schemas.microsoft.com/office/powerpoint/2010/main" val="17494933"/>
       </p:ext>
     </p:extLst>
   </p:cSld>
@@ -12235,104 +11788,7 @@
 </p:sld>
 </file>
 
-<file path=ppt/slides/slide5.xml><?xml version="1.0" encoding="utf-8"?>
-<p:sld xmlns:a="http://schemas.openxmlformats.org/drawingml/2006/main" xmlns:r="http://schemas.openxmlformats.org/officeDocument/2006/relationships" xmlns:p="http://schemas.openxmlformats.org/presentationml/2006/main">
-  <p:cSld>
-    <p:bg>
-      <p:bgPr>
-        <a:solidFill>
-          <a:schemeClr val="bg1"/>
-        </a:solidFill>
-        <a:effectLst/>
-      </p:bgPr>
-    </p:bg>
-    <p:spTree>
-      <p:nvGrpSpPr>
-        <p:cNvPr id="1" name=""/>
-        <p:cNvGrpSpPr/>
-        <p:nvPr/>
-      </p:nvGrpSpPr>
-      <p:grpSpPr>
-        <a:xfrm>
-          <a:off x="0" y="0"/>
-          <a:ext cx="0" cy="0"/>
-          <a:chOff x="0" y="0"/>
-          <a:chExt cx="0" cy="0"/>
-        </a:xfrm>
-      </p:grpSpPr>
-      <p:pic>
-        <p:nvPicPr>
-          <p:cNvPr id="5" name="selectMe"/>
-          <p:cNvPicPr>
-            <a:picLocks noChangeAspect="1"/>
-          </p:cNvPicPr>
-          <p:nvPr/>
-        </p:nvPicPr>
-        <p:blipFill rotWithShape="1">
-          <a:blip r:embed="rId2">
-            <a:extLst>
-              <a:ext uri="{28A0092B-C50C-407E-A947-70E740481C1C}">
-                <a14:useLocalDpi xmlns:a14="http://schemas.microsoft.com/office/drawing/2010/main" val="0"/>
-              </a:ext>
-            </a:extLst>
-          </a:blip>
-          <a:srcRect/>
-          <a:stretch/>
-        </p:blipFill>
-        <p:spPr>
-          <a:xfrm>
-            <a:off x="457200" y="990600"/>
-            <a:ext cx="4572000" cy="3058418"/>
-          </a:xfrm>
-          <a:prstGeom prst="rect">
-            <a:avLst/>
-          </a:prstGeom>
-        </p:spPr>
-      </p:pic>
-      <p:sp>
-        <p:nvSpPr>
-          <p:cNvPr id="3" name="text"/>
-          <p:cNvSpPr txBox="1"/>
-          <p:nvPr/>
-        </p:nvSpPr>
-        <p:spPr>
-          <a:xfrm>
-            <a:off x="8101022" y="0"/>
-            <a:ext cx="1042978" cy="369332"/>
-          </a:xfrm>
-          <a:prstGeom prst="rect">
-            <a:avLst/>
-          </a:prstGeom>
-          <a:noFill/>
-        </p:spPr>
-        <p:txBody>
-          <a:bodyPr wrap="none" rtlCol="0">
-            <a:spAutoFit/>
-          </a:bodyPr>
-          <a:lstStyle/>
-          <a:p>
-            <a:r>
-              <a:rPr lang="en-SG" dirty="0" smtClean="0"/>
-              <a:t>Expected</a:t>
-            </a:r>
-            <a:endParaRPr lang="en-SG" dirty="0"/>
-          </a:p>
-        </p:txBody>
-      </p:sp>
-    </p:spTree>
-    <p:extLst>
-      <p:ext uri="{BB962C8B-B14F-4D97-AF65-F5344CB8AC3E}">
-        <p14:creationId xmlns:p14="http://schemas.microsoft.com/office/powerpoint/2010/main" val="3283599107"/>
-      </p:ext>
-    </p:extLst>
-  </p:cSld>
-  <p:clrMapOvr>
-    <a:masterClrMapping/>
-  </p:clrMapOvr>
-</p:sld>
-</file>
-
-<file path=ppt/slides/slide6.xml><?xml version="1.0" encoding="utf-8"?>
+<file path=ppt/slides/slide3.xml><?xml version="1.0" encoding="utf-8"?>
 <p:sld xmlns:a="http://schemas.openxmlformats.org/drawingml/2006/main" xmlns:r="http://schemas.openxmlformats.org/officeDocument/2006/relationships" xmlns:p="http://schemas.openxmlformats.org/presentationml/2006/main">
   <p:cSld>
     <p:spTree>
@@ -12365,7 +11821,7 @@
           <a:lstStyle/>
           <a:p>
             <a:r>
-              <a:rPr lang="en-US" dirty="0" smtClean="0"/>
+              <a:rPr lang="en-US" dirty="0"/>
               <a:t>Auto Crop:: picture crosses edge</a:t>
             </a:r>
             <a:endParaRPr lang="en-SG" dirty="0"/>
@@ -12385,7 +11841,85 @@
 </p:sld>
 </file>
 
-<file path=ppt/slides/slide7.xml><?xml version="1.0" encoding="utf-8"?>
+<file path=ppt/slides/slide30.xml><?xml version="1.0" encoding="utf-8"?>
+<p:sld xmlns:a="http://schemas.openxmlformats.org/drawingml/2006/main" xmlns:r="http://schemas.openxmlformats.org/officeDocument/2006/relationships" xmlns:p="http://schemas.openxmlformats.org/presentationml/2006/main" show="0">
+  <p:cSld>
+    <p:spTree>
+      <p:nvGrpSpPr>
+        <p:cNvPr id="1" name=""/>
+        <p:cNvGrpSpPr/>
+        <p:nvPr/>
+      </p:nvGrpSpPr>
+      <p:grpSpPr>
+        <a:xfrm>
+          <a:off x="0" y="0"/>
+          <a:ext cx="0" cy="0"/>
+          <a:chOff x="0" y="0"/>
+          <a:chExt cx="0" cy="0"/>
+        </a:xfrm>
+      </p:grpSpPr>
+      <p:sp>
+        <p:nvSpPr>
+          <p:cNvPr id="2" name="标题 1"/>
+          <p:cNvSpPr>
+            <a:spLocks noGrp="1"/>
+          </p:cNvSpPr>
+          <p:nvPr>
+            <p:ph type="title"/>
+          </p:nvPr>
+        </p:nvSpPr>
+        <p:spPr/>
+        <p:txBody>
+          <a:bodyPr/>
+          <a:lstStyle/>
+          <a:p>
+            <a:endParaRPr lang="en-SG"/>
+          </a:p>
+        </p:txBody>
+      </p:sp>
+      <p:pic>
+        <p:nvPicPr>
+          <p:cNvPr id="4" name="内容占位符 3"/>
+          <p:cNvPicPr>
+            <a:picLocks noGrp="1"/>
+          </p:cNvPicPr>
+          <p:nvPr>
+            <p:ph idx="1"/>
+          </p:nvPr>
+        </p:nvPicPr>
+        <p:blipFill>
+          <a:blip r:embed="rId2">
+            <a:extLst>
+              <a:ext uri="{28A0092B-C50C-407E-A947-70E740481C1C}">
+                <a14:useLocalDpi xmlns:a14="http://schemas.microsoft.com/office/drawing/2010/main" val="0"/>
+              </a:ext>
+            </a:extLst>
+          </a:blip>
+          <a:stretch>
+            <a:fillRect/>
+          </a:stretch>
+        </p:blipFill>
+        <p:spPr>
+          <a:xfrm>
+            <a:off x="1074665" y="1600200"/>
+            <a:ext cx="6994670" cy="4525963"/>
+          </a:xfrm>
+        </p:spPr>
+      </p:pic>
+    </p:spTree>
+    <p:extLst>
+      <p:ext uri="{BB962C8B-B14F-4D97-AF65-F5344CB8AC3E}">
+        <p14:creationId xmlns:p14="http://schemas.microsoft.com/office/powerpoint/2010/main" val="2234878813"/>
+      </p:ext>
+    </p:extLst>
+  </p:cSld>
+  <p:clrMapOvr>
+    <a:masterClrMapping/>
+  </p:clrMapOvr>
+</p:sld>
+</file>
+
+<file path=ppt/slides/slide4.xml><?xml version="1.0" encoding="utf-8"?>
 <p:sld xmlns:a="http://schemas.openxmlformats.org/drawingml/2006/main" xmlns:r="http://schemas.openxmlformats.org/officeDocument/2006/relationships" xmlns:p="http://schemas.openxmlformats.org/presentationml/2006/main">
   <p:cSld>
     <p:bg>
@@ -12453,7 +11987,7 @@
 </p:sld>
 </file>
 
-<file path=ppt/slides/slide8.xml><?xml version="1.0" encoding="utf-8"?>
+<file path=ppt/slides/slide5.xml><?xml version="1.0" encoding="utf-8"?>
 <p:sld xmlns:a="http://schemas.openxmlformats.org/drawingml/2006/main" xmlns:r="http://schemas.openxmlformats.org/officeDocument/2006/relationships" xmlns:p="http://schemas.openxmlformats.org/presentationml/2006/main">
   <p:cSld>
     <p:bg>
@@ -12530,10 +12064,9 @@
           <a:lstStyle/>
           <a:p>
             <a:r>
-              <a:rPr lang="en-SG" dirty="0" smtClean="0"/>
+              <a:rPr lang="en-SG" dirty="0"/>
               <a:t>Expected</a:t>
             </a:r>
-            <a:endParaRPr lang="en-SG" dirty="0"/>
           </a:p>
         </p:txBody>
       </p:sp>
@@ -12541,6 +12074,226 @@
     <p:extLst>
       <p:ext uri="{BB962C8B-B14F-4D97-AF65-F5344CB8AC3E}">
         <p14:creationId xmlns:p14="http://schemas.microsoft.com/office/powerpoint/2010/main" val="2110116231"/>
+      </p:ext>
+    </p:extLst>
+  </p:cSld>
+  <p:clrMapOvr>
+    <a:masterClrMapping/>
+  </p:clrMapOvr>
+</p:sld>
+</file>
+
+<file path=ppt/slides/slide6.xml><?xml version="1.0" encoding="utf-8"?>
+<p:sld xmlns:a="http://schemas.openxmlformats.org/drawingml/2006/main" xmlns:r="http://schemas.openxmlformats.org/officeDocument/2006/relationships" xmlns:p="http://schemas.openxmlformats.org/presentationml/2006/main">
+  <p:cSld>
+    <p:spTree>
+      <p:nvGrpSpPr>
+        <p:cNvPr id="1" name=""/>
+        <p:cNvGrpSpPr/>
+        <p:nvPr/>
+      </p:nvGrpSpPr>
+      <p:grpSpPr>
+        <a:xfrm>
+          <a:off x="0" y="0"/>
+          <a:ext cx="0" cy="0"/>
+          <a:chOff x="0" y="0"/>
+          <a:chExt cx="0" cy="0"/>
+        </a:xfrm>
+      </p:grpSpPr>
+      <p:sp>
+        <p:nvSpPr>
+          <p:cNvPr id="2" name="Title 1"/>
+          <p:cNvSpPr>
+            <a:spLocks noGrp="1"/>
+          </p:cNvSpPr>
+          <p:nvPr>
+            <p:ph type="title"/>
+          </p:nvPr>
+        </p:nvSpPr>
+        <p:spPr/>
+        <p:txBody>
+          <a:bodyPr/>
+          <a:lstStyle/>
+          <a:p>
+            <a:r>
+              <a:rPr lang="en-US" dirty="0"/>
+              <a:t>Auto Crop:: picture crosses multiple edges</a:t>
+            </a:r>
+            <a:endParaRPr lang="en-SG" dirty="0"/>
+          </a:p>
+        </p:txBody>
+      </p:sp>
+      <p:sp>
+        <p:nvSpPr>
+          <p:cNvPr id="3" name="Content Placeholder 2"/>
+          <p:cNvSpPr>
+            <a:spLocks noGrp="1"/>
+          </p:cNvSpPr>
+          <p:nvPr>
+            <p:ph idx="1"/>
+          </p:nvPr>
+        </p:nvSpPr>
+        <p:spPr/>
+        <p:txBody>
+          <a:bodyPr/>
+          <a:lstStyle/>
+          <a:p>
+            <a:endParaRPr lang="en-SG" dirty="0"/>
+          </a:p>
+        </p:txBody>
+      </p:sp>
+    </p:spTree>
+    <p:extLst>
+      <p:ext uri="{BB962C8B-B14F-4D97-AF65-F5344CB8AC3E}">
+        <p14:creationId xmlns:p14="http://schemas.microsoft.com/office/powerpoint/2010/main" val="4026306467"/>
+      </p:ext>
+    </p:extLst>
+  </p:cSld>
+  <p:clrMapOvr>
+    <a:masterClrMapping/>
+  </p:clrMapOvr>
+</p:sld>
+</file>
+
+<file path=ppt/slides/slide7.xml><?xml version="1.0" encoding="utf-8"?>
+<p:sld xmlns:a="http://schemas.openxmlformats.org/drawingml/2006/main" xmlns:r="http://schemas.openxmlformats.org/officeDocument/2006/relationships" xmlns:p="http://schemas.openxmlformats.org/presentationml/2006/main">
+  <p:cSld>
+    <p:spTree>
+      <p:nvGrpSpPr>
+        <p:cNvPr id="1" name=""/>
+        <p:cNvGrpSpPr/>
+        <p:nvPr/>
+      </p:nvGrpSpPr>
+      <p:grpSpPr>
+        <a:xfrm>
+          <a:off x="0" y="0"/>
+          <a:ext cx="0" cy="0"/>
+          <a:chOff x="0" y="0"/>
+          <a:chExt cx="0" cy="0"/>
+        </a:xfrm>
+      </p:grpSpPr>
+      <p:pic>
+        <p:nvPicPr>
+          <p:cNvPr id="5" name="selectMe"/>
+          <p:cNvPicPr>
+            <a:picLocks noChangeAspect="1"/>
+          </p:cNvPicPr>
+          <p:nvPr/>
+        </p:nvPicPr>
+        <p:blipFill>
+          <a:blip r:embed="rId2">
+            <a:extLst>
+              <a:ext uri="{28A0092B-C50C-407E-A947-70E740481C1C}">
+                <a14:useLocalDpi xmlns:a14="http://schemas.microsoft.com/office/drawing/2010/main" val="0"/>
+              </a:ext>
+            </a:extLst>
+          </a:blip>
+          <a:stretch>
+            <a:fillRect/>
+          </a:stretch>
+        </p:blipFill>
+        <p:spPr>
+          <a:xfrm>
+            <a:off x="-1676400" y="-2819400"/>
+            <a:ext cx="12420600" cy="8308702"/>
+          </a:xfrm>
+          <a:prstGeom prst="rect">
+            <a:avLst/>
+          </a:prstGeom>
+        </p:spPr>
+      </p:pic>
+    </p:spTree>
+    <p:extLst>
+      <p:ext uri="{BB962C8B-B14F-4D97-AF65-F5344CB8AC3E}">
+        <p14:creationId xmlns:p14="http://schemas.microsoft.com/office/powerpoint/2010/main" val="2566138312"/>
+      </p:ext>
+    </p:extLst>
+  </p:cSld>
+  <p:clrMapOvr>
+    <a:masterClrMapping/>
+  </p:clrMapOvr>
+</p:sld>
+</file>
+
+<file path=ppt/slides/slide8.xml><?xml version="1.0" encoding="utf-8"?>
+<p:sld xmlns:a="http://schemas.openxmlformats.org/drawingml/2006/main" xmlns:r="http://schemas.openxmlformats.org/officeDocument/2006/relationships" xmlns:p="http://schemas.openxmlformats.org/presentationml/2006/main">
+  <p:cSld>
+    <p:spTree>
+      <p:nvGrpSpPr>
+        <p:cNvPr id="1" name=""/>
+        <p:cNvGrpSpPr/>
+        <p:nvPr/>
+      </p:nvGrpSpPr>
+      <p:grpSpPr>
+        <a:xfrm>
+          <a:off x="0" y="0"/>
+          <a:ext cx="0" cy="0"/>
+          <a:chOff x="0" y="0"/>
+          <a:chExt cx="0" cy="0"/>
+        </a:xfrm>
+      </p:grpSpPr>
+      <p:pic>
+        <p:nvPicPr>
+          <p:cNvPr id="5" name="selectMe"/>
+          <p:cNvPicPr>
+            <a:picLocks noChangeAspect="1"/>
+          </p:cNvPicPr>
+          <p:nvPr/>
+        </p:nvPicPr>
+        <p:blipFill rotWithShape="1">
+          <a:blip r:embed="rId2">
+            <a:extLst>
+              <a:ext uri="{28A0092B-C50C-407E-A947-70E740481C1C}">
+                <a14:useLocalDpi xmlns:a14="http://schemas.microsoft.com/office/drawing/2010/main" val="0"/>
+              </a:ext>
+            </a:extLst>
+          </a:blip>
+          <a:srcRect l="13497" t="33933" r="12884"/>
+          <a:stretch/>
+        </p:blipFill>
+        <p:spPr>
+          <a:xfrm>
+            <a:off x="0" y="0"/>
+            <a:ext cx="9144000" cy="5489302"/>
+          </a:xfrm>
+          <a:prstGeom prst="rect">
+            <a:avLst/>
+          </a:prstGeom>
+        </p:spPr>
+      </p:pic>
+      <p:sp>
+        <p:nvSpPr>
+          <p:cNvPr id="3" name="text"/>
+          <p:cNvSpPr txBox="1"/>
+          <p:nvPr/>
+        </p:nvSpPr>
+        <p:spPr>
+          <a:xfrm>
+            <a:off x="8101022" y="0"/>
+            <a:ext cx="1042978" cy="369332"/>
+          </a:xfrm>
+          <a:prstGeom prst="rect">
+            <a:avLst/>
+          </a:prstGeom>
+          <a:noFill/>
+        </p:spPr>
+        <p:txBody>
+          <a:bodyPr wrap="none" rtlCol="0">
+            <a:spAutoFit/>
+          </a:bodyPr>
+          <a:lstStyle/>
+          <a:p>
+            <a:r>
+              <a:rPr lang="en-SG" dirty="0"/>
+              <a:t>Expected</a:t>
+            </a:r>
+          </a:p>
+        </p:txBody>
+      </p:sp>
+    </p:spTree>
+    <p:extLst>
+      <p:ext uri="{BB962C8B-B14F-4D97-AF65-F5344CB8AC3E}">
+        <p14:creationId xmlns:p14="http://schemas.microsoft.com/office/powerpoint/2010/main" val="2188246822"/>
       </p:ext>
     </p:extLst>
   </p:cSld>
@@ -12583,8 +12336,8 @@
           <a:lstStyle/>
           <a:p>
             <a:r>
-              <a:rPr lang="en-US" dirty="0" smtClean="0"/>
-              <a:t>Auto Crop:: picture crosses multiple edges</a:t>
+              <a:rPr lang="en-US" dirty="0"/>
+              <a:t>Auto Crop:: rotated picture crosses one edge</a:t>
             </a:r>
             <a:endParaRPr lang="en-SG" dirty="0"/>
           </a:p>
@@ -12612,7 +12365,7 @@
     </p:spTree>
     <p:extLst>
       <p:ext uri="{BB962C8B-B14F-4D97-AF65-F5344CB8AC3E}">
-        <p14:creationId xmlns:p14="http://schemas.microsoft.com/office/powerpoint/2010/main" val="4026306467"/>
+        <p14:creationId xmlns:p14="http://schemas.microsoft.com/office/powerpoint/2010/main" val="3585701570"/>
       </p:ext>
     </p:extLst>
   </p:cSld>

</xml_diff>